<commit_message>
dependable computing term paper files
</commit_message>
<xml_diff>
--- a/CSED601 Dependable Computing/Sharding.pptx
+++ b/CSED601 Dependable Computing/Sharding.pptx
@@ -20,8 +20,14 @@
     <p:sldId id="269" r:id="rId14"/>
     <p:sldId id="270" r:id="rId15"/>
     <p:sldId id="272" r:id="rId16"/>
-    <p:sldId id="273" r:id="rId17"/>
-    <p:sldId id="274" r:id="rId18"/>
+    <p:sldId id="275" r:id="rId17"/>
+    <p:sldId id="276" r:id="rId18"/>
+    <p:sldId id="277" r:id="rId19"/>
+    <p:sldId id="278" r:id="rId20"/>
+    <p:sldId id="280" r:id="rId21"/>
+    <p:sldId id="281" r:id="rId22"/>
+    <p:sldId id="273" r:id="rId23"/>
+    <p:sldId id="274" r:id="rId24"/>
   </p:sldIdLst>
   <p:sldSz cx="12192000" cy="6858000"/>
   <p:notesSz cx="6858000" cy="9144000"/>
@@ -259,7 +265,7 @@
           <a:p>
             <a:fld id="{FC8C056E-3350-485A-AE5D-D46551D329A7}" type="datetimeFigureOut">
               <a:rPr lang="en-US" smtClean="0"/>
-              <a:t>12/17/2018</a:t>
+              <a:t>12/18/2018</a:t>
             </a:fld>
             <a:endParaRPr lang="en-US"/>
           </a:p>
@@ -429,7 +435,7 @@
           <a:p>
             <a:fld id="{FC8C056E-3350-485A-AE5D-D46551D329A7}" type="datetimeFigureOut">
               <a:rPr lang="en-US" smtClean="0"/>
-              <a:t>12/17/2018</a:t>
+              <a:t>12/18/2018</a:t>
             </a:fld>
             <a:endParaRPr lang="en-US"/>
           </a:p>
@@ -609,7 +615,7 @@
           <a:p>
             <a:fld id="{FC8C056E-3350-485A-AE5D-D46551D329A7}" type="datetimeFigureOut">
               <a:rPr lang="en-US" smtClean="0"/>
-              <a:t>12/17/2018</a:t>
+              <a:t>12/18/2018</a:t>
             </a:fld>
             <a:endParaRPr lang="en-US"/>
           </a:p>
@@ -779,7 +785,7 @@
           <a:p>
             <a:fld id="{FC8C056E-3350-485A-AE5D-D46551D329A7}" type="datetimeFigureOut">
               <a:rPr lang="en-US" smtClean="0"/>
-              <a:t>12/17/2018</a:t>
+              <a:t>12/18/2018</a:t>
             </a:fld>
             <a:endParaRPr lang="en-US"/>
           </a:p>
@@ -1025,7 +1031,7 @@
           <a:p>
             <a:fld id="{FC8C056E-3350-485A-AE5D-D46551D329A7}" type="datetimeFigureOut">
               <a:rPr lang="en-US" smtClean="0"/>
-              <a:t>12/17/2018</a:t>
+              <a:t>12/18/2018</a:t>
             </a:fld>
             <a:endParaRPr lang="en-US"/>
           </a:p>
@@ -1257,7 +1263,7 @@
           <a:p>
             <a:fld id="{FC8C056E-3350-485A-AE5D-D46551D329A7}" type="datetimeFigureOut">
               <a:rPr lang="en-US" smtClean="0"/>
-              <a:t>12/17/2018</a:t>
+              <a:t>12/18/2018</a:t>
             </a:fld>
             <a:endParaRPr lang="en-US"/>
           </a:p>
@@ -1624,7 +1630,7 @@
           <a:p>
             <a:fld id="{FC8C056E-3350-485A-AE5D-D46551D329A7}" type="datetimeFigureOut">
               <a:rPr lang="en-US" smtClean="0"/>
-              <a:t>12/17/2018</a:t>
+              <a:t>12/18/2018</a:t>
             </a:fld>
             <a:endParaRPr lang="en-US"/>
           </a:p>
@@ -1742,7 +1748,7 @@
           <a:p>
             <a:fld id="{FC8C056E-3350-485A-AE5D-D46551D329A7}" type="datetimeFigureOut">
               <a:rPr lang="en-US" smtClean="0"/>
-              <a:t>12/17/2018</a:t>
+              <a:t>12/18/2018</a:t>
             </a:fld>
             <a:endParaRPr lang="en-US"/>
           </a:p>
@@ -1837,7 +1843,7 @@
           <a:p>
             <a:fld id="{FC8C056E-3350-485A-AE5D-D46551D329A7}" type="datetimeFigureOut">
               <a:rPr lang="en-US" smtClean="0"/>
-              <a:t>12/17/2018</a:t>
+              <a:t>12/18/2018</a:t>
             </a:fld>
             <a:endParaRPr lang="en-US"/>
           </a:p>
@@ -2114,7 +2120,7 @@
           <a:p>
             <a:fld id="{FC8C056E-3350-485A-AE5D-D46551D329A7}" type="datetimeFigureOut">
               <a:rPr lang="en-US" smtClean="0"/>
-              <a:t>12/17/2018</a:t>
+              <a:t>12/18/2018</a:t>
             </a:fld>
             <a:endParaRPr lang="en-US"/>
           </a:p>
@@ -2367,7 +2373,7 @@
           <a:p>
             <a:fld id="{FC8C056E-3350-485A-AE5D-D46551D329A7}" type="datetimeFigureOut">
               <a:rPr lang="en-US" smtClean="0"/>
-              <a:t>12/17/2018</a:t>
+              <a:t>12/18/2018</a:t>
             </a:fld>
             <a:endParaRPr lang="en-US"/>
           </a:p>
@@ -2580,7 +2586,7 @@
           <a:p>
             <a:fld id="{FC8C056E-3350-485A-AE5D-D46551D329A7}" type="datetimeFigureOut">
               <a:rPr lang="en-US" smtClean="0"/>
-              <a:t>12/17/2018</a:t>
+              <a:t>12/18/2018</a:t>
             </a:fld>
             <a:endParaRPr lang="en-US"/>
           </a:p>
@@ -3193,10 +3199,6 @@
               </a:rPr>
               <a:t>…)</a:t>
             </a:r>
-            <a:endParaRPr lang="en-US" dirty="0">
-              <a:latin typeface="Times New Roman" panose="02020603050405020304" pitchFamily="18" charset="0"/>
-              <a:cs typeface="Times New Roman" panose="02020603050405020304" pitchFamily="18" charset="0"/>
-            </a:endParaRPr>
           </a:p>
         </p:txBody>
       </p:sp>
@@ -3220,14 +3222,7 @@
                 <a:latin typeface="Times New Roman" panose="02020603050405020304" pitchFamily="18" charset="0"/>
                 <a:cs typeface="Times New Roman" panose="02020603050405020304" pitchFamily="18" charset="0"/>
               </a:rPr>
-              <a:t>Step 1: Identity Establishment and Committee </a:t>
-            </a:r>
-            <a:r>
-              <a:rPr lang="en-US" dirty="0">
-                <a:latin typeface="Times New Roman" panose="02020603050405020304" pitchFamily="18" charset="0"/>
-                <a:cs typeface="Times New Roman" panose="02020603050405020304" pitchFamily="18" charset="0"/>
-              </a:rPr>
-              <a:t>Formation (</a:t>
+              <a:t>Step 1: Identity Establishment and Committee Formation (</a:t>
             </a:r>
             <a:r>
               <a:rPr lang="en-US" dirty="0" err="1">
@@ -3247,7 +3242,10 @@
           <a:p>
             <a:pPr lvl="1"/>
             <a:r>
-              <a:rPr lang="en-US" dirty="0" smtClean="0"/>
+              <a:rPr lang="en-US" dirty="0">
+                <a:latin typeface="Times New Roman" panose="02020603050405020304" pitchFamily="18" charset="0"/>
+                <a:cs typeface="Times New Roman" panose="02020603050405020304" pitchFamily="18" charset="0"/>
+              </a:rPr>
               <a:t>Completion </a:t>
             </a:r>
             <a:r>
@@ -3258,7 +3256,10 @@
               <a:t>of</a:t>
             </a:r>
             <a:r>
-              <a:rPr lang="en-US" dirty="0" smtClean="0"/>
+              <a:rPr lang="en-US" dirty="0">
+                <a:latin typeface="Times New Roman" panose="02020603050405020304" pitchFamily="18" charset="0"/>
+                <a:cs typeface="Times New Roman" panose="02020603050405020304" pitchFamily="18" charset="0"/>
+              </a:rPr>
               <a:t> DS Committee elections -&gt; Regular Nodes/Miner nodes elected</a:t>
             </a:r>
           </a:p>
@@ -3375,10 +3376,6 @@
               </a:rPr>
               <a:t>…)</a:t>
             </a:r>
-            <a:endParaRPr lang="en-US" dirty="0">
-              <a:latin typeface="Times New Roman" panose="02020603050405020304" pitchFamily="18" charset="0"/>
-              <a:cs typeface="Times New Roman" panose="02020603050405020304" pitchFamily="18" charset="0"/>
-            </a:endParaRPr>
           </a:p>
         </p:txBody>
       </p:sp>
@@ -3398,11 +3395,17 @@
           <a:lstStyle/>
           <a:p>
             <a:r>
-              <a:rPr lang="en-US" dirty="0"/>
+              <a:rPr lang="en-US" dirty="0">
+                <a:latin typeface="Times New Roman" panose="02020603050405020304" pitchFamily="18" charset="0"/>
+                <a:cs typeface="Times New Roman" panose="02020603050405020304" pitchFamily="18" charset="0"/>
+              </a:rPr>
               <a:t>Step </a:t>
             </a:r>
             <a:r>
-              <a:rPr lang="en-US" dirty="0" smtClean="0"/>
+              <a:rPr lang="en-US" dirty="0">
+                <a:latin typeface="Times New Roman" panose="02020603050405020304" pitchFamily="18" charset="0"/>
+                <a:cs typeface="Times New Roman" panose="02020603050405020304" pitchFamily="18" charset="0"/>
+              </a:rPr>
               <a:t>2: Shard Assignment</a:t>
             </a:r>
           </a:p>
@@ -3461,7 +3464,49 @@
                 <a:latin typeface="Times New Roman" panose="02020603050405020304" pitchFamily="18" charset="0"/>
                 <a:cs typeface="Times New Roman" panose="02020603050405020304" pitchFamily="18" charset="0"/>
               </a:rPr>
-              <a:t>If there are 2S different shards, use last S bits of H to assign to different shard</a:t>
+              <a:t>If there are </a:t>
+            </a:r>
+            <a:r>
+              <a:rPr lang="en-US" sz="2400" dirty="0" smtClean="0">
+                <a:latin typeface="Times New Roman" panose="02020603050405020304" pitchFamily="18" charset="0"/>
+                <a:cs typeface="Times New Roman" panose="02020603050405020304" pitchFamily="18" charset="0"/>
+              </a:rPr>
+              <a:t>2</a:t>
+            </a:r>
+            <a:r>
+              <a:rPr lang="en-US" sz="2400" baseline="30000" dirty="0">
+                <a:latin typeface="Times New Roman" panose="02020603050405020304" pitchFamily="18" charset="0"/>
+                <a:cs typeface="Times New Roman" panose="02020603050405020304" pitchFamily="18" charset="0"/>
+              </a:rPr>
+              <a:t>s</a:t>
+            </a:r>
+            <a:r>
+              <a:rPr lang="en-US" sz="2400" dirty="0" smtClean="0">
+                <a:latin typeface="Times New Roman" panose="02020603050405020304" pitchFamily="18" charset="0"/>
+                <a:cs typeface="Times New Roman" panose="02020603050405020304" pitchFamily="18" charset="0"/>
+              </a:rPr>
+              <a:t> </a:t>
+            </a:r>
+            <a:r>
+              <a:rPr lang="en-US" sz="2400" dirty="0">
+                <a:latin typeface="Times New Roman" panose="02020603050405020304" pitchFamily="18" charset="0"/>
+                <a:cs typeface="Times New Roman" panose="02020603050405020304" pitchFamily="18" charset="0"/>
+              </a:rPr>
+              <a:t>different shards, use last </a:t>
+            </a:r>
+            <a:r>
+              <a:rPr lang="en-US" sz="2400" dirty="0" smtClean="0">
+                <a:latin typeface="Times New Roman" panose="02020603050405020304" pitchFamily="18" charset="0"/>
+                <a:cs typeface="Times New Roman" panose="02020603050405020304" pitchFamily="18" charset="0"/>
+              </a:rPr>
+              <a:t>s-bits </a:t>
+            </a:r>
+            <a:r>
+              <a:rPr lang="en-US" sz="2400" dirty="0">
+                <a:latin typeface="Times New Roman" panose="02020603050405020304" pitchFamily="18" charset="0"/>
+                <a:cs typeface="Times New Roman" panose="02020603050405020304" pitchFamily="18" charset="0"/>
+              </a:rPr>
+              <a:t>of H to assign to different shard</a:t>
             </a:r>
           </a:p>
           <a:p>
@@ -3471,42 +3516,7 @@
                 <a:latin typeface="Times New Roman" panose="02020603050405020304" pitchFamily="18" charset="0"/>
                 <a:cs typeface="Times New Roman" panose="02020603050405020304" pitchFamily="18" charset="0"/>
               </a:rPr>
-              <a:t>H is random -&gt; last s-bits of H is random -&gt; assignment of a node to a particular </a:t>
-            </a:r>
-            <a:r>
-              <a:rPr lang="en-US" dirty="0">
-                <a:latin typeface="Times New Roman" panose="02020603050405020304" pitchFamily="18" charset="0"/>
-                <a:cs typeface="Times New Roman" panose="02020603050405020304" pitchFamily="18" charset="0"/>
-              </a:rPr>
-              <a:t>shard </a:t>
-            </a:r>
-            <a:r>
-              <a:rPr lang="en-US" dirty="0">
-                <a:latin typeface="Times New Roman" panose="02020603050405020304" pitchFamily="18" charset="0"/>
-                <a:cs typeface="Times New Roman" panose="02020603050405020304" pitchFamily="18" charset="0"/>
-              </a:rPr>
-              <a:t>is also random -&gt; each </a:t>
-            </a:r>
-            <a:r>
-              <a:rPr lang="en-US" dirty="0">
-                <a:latin typeface="Times New Roman" panose="02020603050405020304" pitchFamily="18" charset="0"/>
-                <a:cs typeface="Times New Roman" panose="02020603050405020304" pitchFamily="18" charset="0"/>
-              </a:rPr>
-              <a:t>shard </a:t>
-            </a:r>
-            <a:r>
-              <a:rPr lang="en-US" dirty="0">
-                <a:latin typeface="Times New Roman" panose="02020603050405020304" pitchFamily="18" charset="0"/>
-                <a:cs typeface="Times New Roman" panose="02020603050405020304" pitchFamily="18" charset="0"/>
-              </a:rPr>
-              <a:t>will have no more than 1/3 of malicious </a:t>
-            </a:r>
-            <a:r>
-              <a:rPr lang="en-US" dirty="0">
-                <a:latin typeface="Times New Roman" panose="02020603050405020304" pitchFamily="18" charset="0"/>
-                <a:cs typeface="Times New Roman" panose="02020603050405020304" pitchFamily="18" charset="0"/>
-              </a:rPr>
-              <a:t>nodes</a:t>
+              <a:t>H is random -&gt; last s-bits of H is random -&gt; assignment of a node to a particular shard is also random -&gt; each shard will have no more than 1/3 of malicious nodes</a:t>
             </a:r>
           </a:p>
           <a:p>
@@ -3608,10 +3618,6 @@
               </a:rPr>
               <a:t>…)</a:t>
             </a:r>
-            <a:endParaRPr lang="en-US" dirty="0">
-              <a:latin typeface="Times New Roman" panose="02020603050405020304" pitchFamily="18" charset="0"/>
-              <a:cs typeface="Times New Roman" panose="02020603050405020304" pitchFamily="18" charset="0"/>
-            </a:endParaRPr>
           </a:p>
         </p:txBody>
       </p:sp>
@@ -3635,14 +3641,7 @@
                 <a:latin typeface="Times New Roman" panose="02020603050405020304" pitchFamily="18" charset="0"/>
                 <a:cs typeface="Times New Roman" panose="02020603050405020304" pitchFamily="18" charset="0"/>
               </a:rPr>
-              <a:t>Step </a:t>
-            </a:r>
-            <a:r>
-              <a:rPr lang="en-US" dirty="0">
-                <a:latin typeface="Times New Roman" panose="02020603050405020304" pitchFamily="18" charset="0"/>
-                <a:cs typeface="Times New Roman" panose="02020603050405020304" pitchFamily="18" charset="0"/>
-              </a:rPr>
-              <a:t>3: Shard Logic Publishing</a:t>
+              <a:t>Step 3: Shard Logic Publishing</a:t>
             </a:r>
           </a:p>
           <a:p>
@@ -3712,32 +3711,32 @@
               <a:t>For a given transaction from A to B, and assuming there are </a:t>
             </a:r>
             <a:r>
+              <a:rPr lang="en-US" sz="2400" dirty="0" smtClean="0">
+                <a:latin typeface="Times New Roman" panose="02020603050405020304" pitchFamily="18" charset="0"/>
+                <a:cs typeface="Times New Roman" panose="02020603050405020304" pitchFamily="18" charset="0"/>
+              </a:rPr>
+              <a:t>2</a:t>
+            </a:r>
+            <a:r>
+              <a:rPr lang="en-US" sz="2400" baseline="30000" dirty="0">
+                <a:latin typeface="Times New Roman" panose="02020603050405020304" pitchFamily="18" charset="0"/>
+                <a:cs typeface="Times New Roman" panose="02020603050405020304" pitchFamily="18" charset="0"/>
+              </a:rPr>
+              <a:t>s</a:t>
+            </a:r>
+            <a:r>
+              <a:rPr lang="en-US" sz="2400" dirty="0" smtClean="0">
+                <a:latin typeface="Times New Roman" panose="02020603050405020304" pitchFamily="18" charset="0"/>
+                <a:cs typeface="Times New Roman" panose="02020603050405020304" pitchFamily="18" charset="0"/>
+              </a:rPr>
+              <a:t> </a:t>
+            </a:r>
+            <a:r>
               <a:rPr lang="en-US" sz="2400" dirty="0">
                 <a:latin typeface="Times New Roman" panose="02020603050405020304" pitchFamily="18" charset="0"/>
                 <a:cs typeface="Times New Roman" panose="02020603050405020304" pitchFamily="18" charset="0"/>
               </a:rPr>
-              <a:t>2</a:t>
-            </a:r>
-            <a:r>
-              <a:rPr lang="en-US" sz="2400" baseline="30000" dirty="0">
-                <a:latin typeface="Times New Roman" panose="02020603050405020304" pitchFamily="18" charset="0"/>
-                <a:cs typeface="Times New Roman" panose="02020603050405020304" pitchFamily="18" charset="0"/>
-              </a:rPr>
-              <a:t>S</a:t>
-            </a:r>
-            <a:r>
-              <a:rPr lang="en-US" sz="2400" dirty="0">
-                <a:latin typeface="Times New Roman" panose="02020603050405020304" pitchFamily="18" charset="0"/>
-                <a:cs typeface="Times New Roman" panose="02020603050405020304" pitchFamily="18" charset="0"/>
-              </a:rPr>
-              <a:t> different </a:t>
-            </a:r>
-            <a:r>
-              <a:rPr lang="en-US" sz="2400" dirty="0">
-                <a:latin typeface="Times New Roman" panose="02020603050405020304" pitchFamily="18" charset="0"/>
-                <a:cs typeface="Times New Roman" panose="02020603050405020304" pitchFamily="18" charset="0"/>
-              </a:rPr>
-              <a:t>shards, use the rightmost s-bits of the sender address to determine which shard stores the transaction</a:t>
+              <a:t>different shards, use the rightmost s-bits of the sender address to determine which shard stores the transaction</a:t>
             </a:r>
           </a:p>
           <a:p>
@@ -3839,10 +3838,6 @@
               </a:rPr>
               <a:t>…)</a:t>
             </a:r>
-            <a:endParaRPr lang="en-US" dirty="0">
-              <a:latin typeface="Times New Roman" panose="02020603050405020304" pitchFamily="18" charset="0"/>
-              <a:cs typeface="Times New Roman" panose="02020603050405020304" pitchFamily="18" charset="0"/>
-            </a:endParaRPr>
           </a:p>
         </p:txBody>
       </p:sp>
@@ -4063,10 +4058,6 @@
               </a:rPr>
               <a:t>…)</a:t>
             </a:r>
-            <a:endParaRPr lang="en-US" dirty="0">
-              <a:latin typeface="Times New Roman" panose="02020603050405020304" pitchFamily="18" charset="0"/>
-              <a:cs typeface="Times New Roman" panose="02020603050405020304" pitchFamily="18" charset="0"/>
-            </a:endParaRPr>
           </a:p>
         </p:txBody>
       </p:sp>
@@ -4090,21 +4081,7 @@
                 <a:latin typeface="Times New Roman" panose="02020603050405020304" pitchFamily="18" charset="0"/>
                 <a:cs typeface="Times New Roman" panose="02020603050405020304" pitchFamily="18" charset="0"/>
               </a:rPr>
-              <a:t>Step 5: </a:t>
-            </a:r>
-            <a:r>
-              <a:rPr lang="en-US" dirty="0">
-                <a:latin typeface="Times New Roman" panose="02020603050405020304" pitchFamily="18" charset="0"/>
-                <a:cs typeface="Times New Roman" panose="02020603050405020304" pitchFamily="18" charset="0"/>
-              </a:rPr>
-              <a:t>Final Block Proposal and </a:t>
-            </a:r>
-            <a:r>
-              <a:rPr lang="en-US" dirty="0">
-                <a:latin typeface="Times New Roman" panose="02020603050405020304" pitchFamily="18" charset="0"/>
-                <a:cs typeface="Times New Roman" panose="02020603050405020304" pitchFamily="18" charset="0"/>
-              </a:rPr>
-              <a:t>Consensus</a:t>
+              <a:t>Step 5: Final Block Proposal and Consensus</a:t>
             </a:r>
           </a:p>
           <a:p>
@@ -4172,12 +4149,22 @@
                 <a:latin typeface="Times New Roman" panose="02020603050405020304" pitchFamily="18" charset="0"/>
                 <a:cs typeface="Times New Roman" panose="02020603050405020304" pitchFamily="18" charset="0"/>
               </a:rPr>
-              <a:t>Leader builds Bitmap and Final Block header and sends nodes in each shard</a:t>
-            </a:r>
-            <a:endParaRPr lang="en-US" dirty="0">
-              <a:latin typeface="Times New Roman" panose="02020603050405020304" pitchFamily="18" charset="0"/>
-              <a:cs typeface="Times New Roman" panose="02020603050405020304" pitchFamily="18" charset="0"/>
-            </a:endParaRPr>
+              <a:t>Leader builds Bitmap and Final Block header and sends </a:t>
+            </a:r>
+            <a:r>
+              <a:rPr lang="en-US" dirty="0" smtClean="0">
+                <a:latin typeface="Times New Roman" panose="02020603050405020304" pitchFamily="18" charset="0"/>
+                <a:cs typeface="Times New Roman" panose="02020603050405020304" pitchFamily="18" charset="0"/>
+              </a:rPr>
+              <a:t>it to nodes </a:t>
+            </a:r>
+            <a:r>
+              <a:rPr lang="en-US" dirty="0">
+                <a:latin typeface="Times New Roman" panose="02020603050405020304" pitchFamily="18" charset="0"/>
+                <a:cs typeface="Times New Roman" panose="02020603050405020304" pitchFamily="18" charset="0"/>
+              </a:rPr>
+              <a:t>in each shard</a:t>
+            </a:r>
           </a:p>
         </p:txBody>
       </p:sp>
@@ -4249,75 +4236,110 @@
               </a:rPr>
               <a:t>…)</a:t>
             </a:r>
-            <a:endParaRPr lang="en-US" dirty="0">
+          </a:p>
+        </p:txBody>
+      </p:sp>
+      <p:sp>
+        <p:nvSpPr>
+          <p:cNvPr id="3" name="Content Placeholder 2"/>
+          <p:cNvSpPr>
+            <a:spLocks noGrp="1"/>
+          </p:cNvSpPr>
+          <p:nvPr>
+            <p:ph idx="1"/>
+          </p:nvPr>
+        </p:nvSpPr>
+        <p:spPr/>
+        <p:txBody>
+          <a:bodyPr/>
+          <a:lstStyle/>
+          <a:p>
+            <a:r>
+              <a:rPr lang="en-US" dirty="0">
+                <a:latin typeface="Times New Roman" panose="02020603050405020304" pitchFamily="18" charset="0"/>
+                <a:cs typeface="Times New Roman" panose="02020603050405020304" pitchFamily="18" charset="0"/>
+              </a:rPr>
+              <a:t>Step 6: Block Confirmation and Epoch Generation</a:t>
+            </a:r>
+          </a:p>
+          <a:p>
+            <a:pPr lvl="1"/>
+            <a:r>
+              <a:rPr lang="en-US" dirty="0">
+                <a:latin typeface="Times New Roman" panose="02020603050405020304" pitchFamily="18" charset="0"/>
+                <a:cs typeface="Times New Roman" panose="02020603050405020304" pitchFamily="18" charset="0"/>
+              </a:rPr>
+              <a:t>Nodes in each shard confirm the signature in Bitmap against DS Nodes in the public channel</a:t>
+            </a:r>
+          </a:p>
+          <a:p>
+            <a:pPr lvl="1"/>
+            <a:r>
+              <a:rPr lang="en-US" dirty="0">
+                <a:latin typeface="Times New Roman" panose="02020603050405020304" pitchFamily="18" charset="0"/>
+                <a:cs typeface="Times New Roman" panose="02020603050405020304" pitchFamily="18" charset="0"/>
+              </a:rPr>
+              <a:t>Final Block header containing transaction hash compared against Micro-block header transaction hash</a:t>
+            </a:r>
+          </a:p>
+          <a:p>
+            <a:pPr lvl="2"/>
+            <a:r>
+              <a:rPr lang="en-US" sz="2400" dirty="0">
+                <a:latin typeface="Times New Roman" panose="02020603050405020304" pitchFamily="18" charset="0"/>
+                <a:cs typeface="Times New Roman" panose="02020603050405020304" pitchFamily="18" charset="0"/>
+              </a:rPr>
+              <a:t>If match -&gt; transaction data is appended to the final block in the local shard</a:t>
+            </a:r>
+          </a:p>
+          <a:p>
+            <a:pPr lvl="2"/>
+            <a:r>
+              <a:rPr lang="en-US" sz="2400" dirty="0">
+                <a:latin typeface="Times New Roman" panose="02020603050405020304" pitchFamily="18" charset="0"/>
+                <a:cs typeface="Times New Roman" panose="02020603050405020304" pitchFamily="18" charset="0"/>
+              </a:rPr>
+              <a:t>Account States </a:t>
+            </a:r>
+            <a:r>
+              <a:rPr lang="en-US" sz="2400" dirty="0" smtClean="0">
+                <a:latin typeface="Times New Roman" panose="02020603050405020304" pitchFamily="18" charset="0"/>
+                <a:cs typeface="Times New Roman" panose="02020603050405020304" pitchFamily="18" charset="0"/>
+              </a:rPr>
+              <a:t>&amp; </a:t>
+            </a:r>
+            <a:r>
+              <a:rPr lang="en-US" sz="2400" dirty="0">
+                <a:latin typeface="Times New Roman" panose="02020603050405020304" pitchFamily="18" charset="0"/>
+                <a:cs typeface="Times New Roman" panose="02020603050405020304" pitchFamily="18" charset="0"/>
+              </a:rPr>
+              <a:t>Global States are updated </a:t>
+            </a:r>
+            <a:r>
+              <a:rPr lang="en-US" sz="2400" dirty="0" smtClean="0">
+                <a:latin typeface="Times New Roman" panose="02020603050405020304" pitchFamily="18" charset="0"/>
+                <a:cs typeface="Times New Roman" panose="02020603050405020304" pitchFamily="18" charset="0"/>
+              </a:rPr>
+              <a:t>(State </a:t>
+            </a:r>
+            <a:r>
+              <a:rPr lang="en-US" sz="2400" dirty="0" err="1" smtClean="0">
+                <a:latin typeface="Times New Roman" panose="02020603050405020304" pitchFamily="18" charset="0"/>
+                <a:cs typeface="Times New Roman" panose="02020603050405020304" pitchFamily="18" charset="0"/>
+              </a:rPr>
+              <a:t>Sharding</a:t>
+            </a:r>
+            <a:r>
+              <a:rPr lang="en-US" sz="2400" dirty="0" smtClean="0">
+                <a:latin typeface="Times New Roman" panose="02020603050405020304" pitchFamily="18" charset="0"/>
+                <a:cs typeface="Times New Roman" panose="02020603050405020304" pitchFamily="18" charset="0"/>
+              </a:rPr>
+              <a:t>)</a:t>
+            </a:r>
+            <a:endParaRPr lang="en-US" sz="2400" dirty="0">
               <a:latin typeface="Times New Roman" panose="02020603050405020304" pitchFamily="18" charset="0"/>
               <a:cs typeface="Times New Roman" panose="02020603050405020304" pitchFamily="18" charset="0"/>
             </a:endParaRPr>
-          </a:p>
-        </p:txBody>
-      </p:sp>
-      <p:sp>
-        <p:nvSpPr>
-          <p:cNvPr id="3" name="Content Placeholder 2"/>
-          <p:cNvSpPr>
-            <a:spLocks noGrp="1"/>
-          </p:cNvSpPr>
-          <p:nvPr>
-            <p:ph idx="1"/>
-          </p:nvPr>
-        </p:nvSpPr>
-        <p:spPr/>
-        <p:txBody>
-          <a:bodyPr/>
-          <a:lstStyle/>
-          <a:p>
-            <a:r>
-              <a:rPr lang="en-US" dirty="0">
-                <a:latin typeface="Times New Roman" panose="02020603050405020304" pitchFamily="18" charset="0"/>
-                <a:cs typeface="Times New Roman" panose="02020603050405020304" pitchFamily="18" charset="0"/>
-              </a:rPr>
-              <a:t>Step 6: Block Confirmation and Epoch Generation</a:t>
-            </a:r>
-          </a:p>
-          <a:p>
-            <a:pPr lvl="1"/>
-            <a:r>
-              <a:rPr lang="en-US" dirty="0">
-                <a:latin typeface="Times New Roman" panose="02020603050405020304" pitchFamily="18" charset="0"/>
-                <a:cs typeface="Times New Roman" panose="02020603050405020304" pitchFamily="18" charset="0"/>
-              </a:rPr>
-              <a:t>Nodes in each shard confirm the signature in Bitmap against DS Nodes in the public channel</a:t>
-            </a:r>
-          </a:p>
-          <a:p>
-            <a:pPr lvl="1"/>
-            <a:r>
-              <a:rPr lang="en-US" dirty="0">
-                <a:latin typeface="Times New Roman" panose="02020603050405020304" pitchFamily="18" charset="0"/>
-                <a:cs typeface="Times New Roman" panose="02020603050405020304" pitchFamily="18" charset="0"/>
-              </a:rPr>
-              <a:t>Final Block header containing transaction hash compared against Micro-block header transaction hash</a:t>
-            </a:r>
-          </a:p>
-          <a:p>
-            <a:pPr lvl="2"/>
-            <a:r>
-              <a:rPr lang="en-US" sz="2400" dirty="0">
-                <a:latin typeface="Times New Roman" panose="02020603050405020304" pitchFamily="18" charset="0"/>
-                <a:cs typeface="Times New Roman" panose="02020603050405020304" pitchFamily="18" charset="0"/>
-              </a:rPr>
-              <a:t>If match -&gt; transaction data is appended to the final block in the local shard</a:t>
-            </a:r>
-          </a:p>
-          <a:p>
-            <a:pPr lvl="2"/>
-            <a:r>
-              <a:rPr lang="en-US" sz="2400" dirty="0">
-                <a:latin typeface="Times New Roman" panose="02020603050405020304" pitchFamily="18" charset="0"/>
-                <a:cs typeface="Times New Roman" panose="02020603050405020304" pitchFamily="18" charset="0"/>
-              </a:rPr>
-              <a:t>Account States and Global States are updated when matched</a:t>
-            </a:r>
           </a:p>
           <a:p>
             <a:pPr lvl="1"/>
@@ -4383,7 +4405,7 @@
                 <a:latin typeface="Times New Roman" panose="02020603050405020304" pitchFamily="18" charset="0"/>
                 <a:cs typeface="Times New Roman" panose="02020603050405020304" pitchFamily="18" charset="0"/>
               </a:rPr>
-              <a:t>Scalability Achievement</a:t>
+              <a:t>Leader Change</a:t>
             </a:r>
             <a:endParaRPr lang="en-US" dirty="0">
               <a:latin typeface="Times New Roman" panose="02020603050405020304" pitchFamily="18" charset="0"/>
@@ -4414,46 +4436,87 @@
                 <a:latin typeface="Times New Roman" panose="02020603050405020304" pitchFamily="18" charset="0"/>
                 <a:cs typeface="Times New Roman" panose="02020603050405020304" pitchFamily="18" charset="0"/>
               </a:rPr>
-              <a:t>Transaction data is not transmitted, only micro block header and final block header containing transaction hash is transmitted</a:t>
-            </a:r>
-          </a:p>
-          <a:p>
-            <a:r>
-              <a:rPr lang="en-US" dirty="0">
-                <a:latin typeface="Times New Roman" panose="02020603050405020304" pitchFamily="18" charset="0"/>
-                <a:cs typeface="Times New Roman" panose="02020603050405020304" pitchFamily="18" charset="0"/>
-              </a:rPr>
-              <a:t>Use of EC-</a:t>
-            </a:r>
-            <a:r>
-              <a:rPr lang="en-US" dirty="0" err="1">
-                <a:latin typeface="Times New Roman" panose="02020603050405020304" pitchFamily="18" charset="0"/>
-                <a:cs typeface="Times New Roman" panose="02020603050405020304" pitchFamily="18" charset="0"/>
-              </a:rPr>
-              <a:t>Schnorr</a:t>
-            </a:r>
-            <a:r>
-              <a:rPr lang="en-US" dirty="0">
-                <a:latin typeface="Times New Roman" panose="02020603050405020304" pitchFamily="18" charset="0"/>
-                <a:cs typeface="Times New Roman" panose="02020603050405020304" pitchFamily="18" charset="0"/>
-              </a:rPr>
-              <a:t> signature algorithm achieves speed and requires less size for multi-signatures</a:t>
-            </a:r>
-          </a:p>
-          <a:p>
-            <a:r>
-              <a:rPr lang="en-US" dirty="0" err="1">
-                <a:latin typeface="Times New Roman" panose="02020603050405020304" pitchFamily="18" charset="0"/>
-                <a:cs typeface="Times New Roman" panose="02020603050405020304" pitchFamily="18" charset="0"/>
-              </a:rPr>
-              <a:t>Elastico</a:t>
-            </a:r>
-            <a:r>
-              <a:rPr lang="en-US" dirty="0">
-                <a:latin typeface="Times New Roman" panose="02020603050405020304" pitchFamily="18" charset="0"/>
-                <a:cs typeface="Times New Roman" panose="02020603050405020304" pitchFamily="18" charset="0"/>
-              </a:rPr>
-              <a:t> shows that the throughput scales up linearly in the computation capacity of the network</a:t>
+              <a:t>Byzantine leader can intentionally drop or delay messages from honest nodes</a:t>
+            </a:r>
+          </a:p>
+          <a:p>
+            <a:r>
+              <a:rPr lang="en-US" dirty="0">
+                <a:latin typeface="Times New Roman" panose="02020603050405020304" pitchFamily="18" charset="0"/>
+                <a:cs typeface="Times New Roman" panose="02020603050405020304" pitchFamily="18" charset="0"/>
+              </a:rPr>
+              <a:t>Periodically change leader of each shard and DS committee</a:t>
+            </a:r>
+          </a:p>
+          <a:p>
+            <a:r>
+              <a:rPr lang="en-US" dirty="0">
+                <a:latin typeface="Times New Roman" panose="02020603050405020304" pitchFamily="18" charset="0"/>
+                <a:cs typeface="Times New Roman" panose="02020603050405020304" pitchFamily="18" charset="0"/>
+              </a:rPr>
+              <a:t>Leader of each shard is changed after every micro block</a:t>
+            </a:r>
+          </a:p>
+          <a:p>
+            <a:r>
+              <a:rPr lang="en-US" dirty="0">
+                <a:latin typeface="Times New Roman" panose="02020603050405020304" pitchFamily="18" charset="0"/>
+                <a:cs typeface="Times New Roman" panose="02020603050405020304" pitchFamily="18" charset="0"/>
+              </a:rPr>
+              <a:t>Leader of the DS Committee is changed after every final </a:t>
+            </a:r>
+            <a:r>
+              <a:rPr lang="en-US" dirty="0" smtClean="0">
+                <a:latin typeface="Times New Roman" panose="02020603050405020304" pitchFamily="18" charset="0"/>
+                <a:cs typeface="Times New Roman" panose="02020603050405020304" pitchFamily="18" charset="0"/>
+              </a:rPr>
+              <a:t>block</a:t>
+            </a:r>
+          </a:p>
+          <a:p>
+            <a:r>
+              <a:rPr lang="en-US" dirty="0" smtClean="0">
+                <a:latin typeface="Times New Roman" panose="02020603050405020304" pitchFamily="18" charset="0"/>
+                <a:cs typeface="Times New Roman" panose="02020603050405020304" pitchFamily="18" charset="0"/>
+              </a:rPr>
+              <a:t>If size of DS consensus group is </a:t>
+            </a:r>
+            <a:r>
+              <a:rPr lang="en-US" i="1" dirty="0" smtClean="0">
+                <a:latin typeface="Times New Roman" panose="02020603050405020304" pitchFamily="18" charset="0"/>
+                <a:cs typeface="Times New Roman" panose="02020603050405020304" pitchFamily="18" charset="0"/>
+              </a:rPr>
+              <a:t>n</a:t>
+            </a:r>
+            <a:r>
+              <a:rPr lang="en-US" dirty="0" smtClean="0">
+                <a:latin typeface="Times New Roman" panose="02020603050405020304" pitchFamily="18" charset="0"/>
+                <a:cs typeface="Times New Roman" panose="02020603050405020304" pitchFamily="18" charset="0"/>
+              </a:rPr>
+              <a:t>, then epoch lasts for generation of </a:t>
+            </a:r>
+            <a:r>
+              <a:rPr lang="en-US" i="1" dirty="0" smtClean="0">
+                <a:latin typeface="Times New Roman" panose="02020603050405020304" pitchFamily="18" charset="0"/>
+                <a:cs typeface="Times New Roman" panose="02020603050405020304" pitchFamily="18" charset="0"/>
+              </a:rPr>
+              <a:t>n</a:t>
+            </a:r>
+            <a:r>
+              <a:rPr lang="en-US" dirty="0" smtClean="0">
+                <a:latin typeface="Times New Roman" panose="02020603050405020304" pitchFamily="18" charset="0"/>
+                <a:cs typeface="Times New Roman" panose="02020603050405020304" pitchFamily="18" charset="0"/>
+              </a:rPr>
+              <a:t> final blocks with leader change after every final block</a:t>
+            </a:r>
+          </a:p>
+          <a:p>
+            <a:r>
+              <a:rPr lang="en-US" dirty="0" smtClean="0">
+                <a:latin typeface="Times New Roman" panose="02020603050405020304" pitchFamily="18" charset="0"/>
+                <a:cs typeface="Times New Roman" panose="02020603050405020304" pitchFamily="18" charset="0"/>
+              </a:rPr>
+              <a:t>Each final block consists of 1 micro-block from each shard</a:t>
             </a:r>
             <a:endParaRPr lang="en-US" dirty="0">
               <a:latin typeface="Times New Roman" panose="02020603050405020304" pitchFamily="18" charset="0"/>
@@ -4465,7 +4528,7 @@
     </p:spTree>
     <p:extLst>
       <p:ext uri="{BB962C8B-B14F-4D97-AF65-F5344CB8AC3E}">
-        <p14:creationId xmlns:p14="http://schemas.microsoft.com/office/powerpoint/2010/main" val="3159637411"/>
+        <p14:creationId xmlns:p14="http://schemas.microsoft.com/office/powerpoint/2010/main" val="115037745"/>
       </p:ext>
     </p:extLst>
   </p:cSld>
@@ -4510,11 +4573,11 @@
           <a:lstStyle/>
           <a:p>
             <a:r>
-              <a:rPr lang="en-US" dirty="0">
-                <a:latin typeface="Times New Roman" panose="02020603050405020304" pitchFamily="18" charset="0"/>
-                <a:cs typeface="Times New Roman" panose="02020603050405020304" pitchFamily="18" charset="0"/>
-              </a:rPr>
-              <a:t>References Used</a:t>
+              <a:rPr lang="en-US" dirty="0" smtClean="0">
+                <a:latin typeface="Times New Roman" panose="02020603050405020304" pitchFamily="18" charset="0"/>
+                <a:cs typeface="Times New Roman" panose="02020603050405020304" pitchFamily="18" charset="0"/>
+              </a:rPr>
+              <a:t>Cross-Shard Transactions</a:t>
             </a:r>
             <a:endParaRPr lang="en-US" dirty="0">
               <a:latin typeface="Times New Roman" panose="02020603050405020304" pitchFamily="18" charset="0"/>
@@ -4535,181 +4598,281 @@
         </p:nvSpPr>
         <p:spPr/>
         <p:txBody>
-          <a:bodyPr/>
-          <a:lstStyle/>
-          <a:p>
-            <a:r>
-              <a:rPr lang="en-US" dirty="0">
-                <a:latin typeface="Times New Roman" panose="02020603050405020304" pitchFamily="18" charset="0"/>
-                <a:cs typeface="Times New Roman" panose="02020603050405020304" pitchFamily="18" charset="0"/>
-              </a:rPr>
-              <a:t>The </a:t>
-            </a:r>
-            <a:r>
-              <a:rPr lang="en-US" dirty="0" err="1">
-                <a:latin typeface="Times New Roman" panose="02020603050405020304" pitchFamily="18" charset="0"/>
-                <a:cs typeface="Times New Roman" panose="02020603050405020304" pitchFamily="18" charset="0"/>
-              </a:rPr>
-              <a:t>Ziliqa</a:t>
-            </a:r>
-            <a:r>
-              <a:rPr lang="en-US" dirty="0">
-                <a:latin typeface="Times New Roman" panose="02020603050405020304" pitchFamily="18" charset="0"/>
-                <a:cs typeface="Times New Roman" panose="02020603050405020304" pitchFamily="18" charset="0"/>
-              </a:rPr>
-              <a:t> </a:t>
-            </a:r>
-            <a:r>
-              <a:rPr lang="en-US" dirty="0">
-                <a:latin typeface="Times New Roman" panose="02020603050405020304" pitchFamily="18" charset="0"/>
-                <a:cs typeface="Times New Roman" panose="02020603050405020304" pitchFamily="18" charset="0"/>
-              </a:rPr>
-              <a:t>Technical Whitepaper, </a:t>
-            </a:r>
-            <a:r>
-              <a:rPr lang="en-US" dirty="0">
-                <a:latin typeface="Times New Roman" panose="02020603050405020304" pitchFamily="18" charset="0"/>
-                <a:cs typeface="Times New Roman" panose="02020603050405020304" pitchFamily="18" charset="0"/>
-                <a:hlinkClick r:id="rId2"/>
-              </a:rPr>
-              <a:t>https://docs.zilliqa.com/whitepaper.pdf</a:t>
+          <a:bodyPr>
+            <a:normAutofit lnSpcReduction="10000"/>
+          </a:bodyPr>
+          <a:lstStyle/>
+          <a:p>
+            <a:r>
+              <a:rPr lang="en-US" dirty="0" smtClean="0">
+                <a:latin typeface="Times New Roman" panose="02020603050405020304" pitchFamily="18" charset="0"/>
+                <a:cs typeface="Times New Roman" panose="02020603050405020304" pitchFamily="18" charset="0"/>
+              </a:rPr>
+              <a:t>No need to communicate with another shard if both sender and receiver in same shard</a:t>
+            </a:r>
+          </a:p>
+          <a:p>
+            <a:r>
+              <a:rPr lang="en-US" dirty="0" smtClean="0">
+                <a:latin typeface="Times New Roman" panose="02020603050405020304" pitchFamily="18" charset="0"/>
+                <a:cs typeface="Times New Roman" panose="02020603050405020304" pitchFamily="18" charset="0"/>
+              </a:rPr>
+              <a:t>Alice (address in Shard #1) wants to send tokens to Bob (address in Shard #2)</a:t>
+            </a:r>
+          </a:p>
+          <a:p>
+            <a:r>
+              <a:rPr lang="en-US" dirty="0" smtClean="0">
+                <a:latin typeface="Times New Roman" panose="02020603050405020304" pitchFamily="18" charset="0"/>
+                <a:cs typeface="Times New Roman" panose="02020603050405020304" pitchFamily="18" charset="0"/>
+              </a:rPr>
+              <a:t>Requires updating state in both Shard #1 and Shard #2</a:t>
+            </a:r>
+          </a:p>
+          <a:p>
+            <a:r>
+              <a:rPr lang="en-US" dirty="0" smtClean="0">
+                <a:latin typeface="Times New Roman" panose="02020603050405020304" pitchFamily="18" charset="0"/>
+                <a:cs typeface="Times New Roman" panose="02020603050405020304" pitchFamily="18" charset="0"/>
+              </a:rPr>
+              <a:t>Two Approaches</a:t>
+            </a:r>
+          </a:p>
+          <a:p>
+            <a:pPr lvl="1"/>
+            <a:r>
+              <a:rPr lang="en-US" dirty="0" smtClean="0">
+                <a:latin typeface="Times New Roman" panose="02020603050405020304" pitchFamily="18" charset="0"/>
+                <a:cs typeface="Times New Roman" panose="02020603050405020304" pitchFamily="18" charset="0"/>
+              </a:rPr>
+              <a:t>Synchronous</a:t>
+            </a:r>
+          </a:p>
+          <a:p>
+            <a:pPr lvl="2"/>
+            <a:r>
+              <a:rPr lang="en-US" dirty="0" smtClean="0">
+                <a:latin typeface="Times New Roman" panose="02020603050405020304" pitchFamily="18" charset="0"/>
+                <a:cs typeface="Times New Roman" panose="02020603050405020304" pitchFamily="18" charset="0"/>
+              </a:rPr>
+              <a:t>State Transition information related to both addresses produced at the same time</a:t>
+            </a:r>
+          </a:p>
+          <a:p>
+            <a:pPr lvl="1"/>
+            <a:r>
+              <a:rPr lang="en-US" dirty="0" smtClean="0">
+                <a:latin typeface="Times New Roman" panose="02020603050405020304" pitchFamily="18" charset="0"/>
+                <a:cs typeface="Times New Roman" panose="02020603050405020304" pitchFamily="18" charset="0"/>
+              </a:rPr>
+              <a:t>Asynchronous</a:t>
+            </a:r>
+          </a:p>
+          <a:p>
+            <a:pPr lvl="2"/>
+            <a:r>
+              <a:rPr lang="en-US" dirty="0" smtClean="0">
+                <a:latin typeface="Times New Roman" panose="02020603050405020304" pitchFamily="18" charset="0"/>
+                <a:cs typeface="Times New Roman" panose="02020603050405020304" pitchFamily="18" charset="0"/>
+              </a:rPr>
+              <a:t>“Credit” shard executed after “Debit” shard has completed execution</a:t>
+            </a:r>
+          </a:p>
+          <a:p>
+            <a:pPr lvl="2"/>
+            <a:r>
+              <a:rPr lang="en-US" dirty="0" smtClean="0">
+                <a:latin typeface="Times New Roman" panose="02020603050405020304" pitchFamily="18" charset="0"/>
+                <a:cs typeface="Times New Roman" panose="02020603050405020304" pitchFamily="18" charset="0"/>
+              </a:rPr>
+              <a:t>Validity of transactions questionable in the case of forks</a:t>
             </a:r>
             <a:endParaRPr lang="en-US" dirty="0">
               <a:latin typeface="Times New Roman" panose="02020603050405020304" pitchFamily="18" charset="0"/>
               <a:cs typeface="Times New Roman" panose="02020603050405020304" pitchFamily="18" charset="0"/>
             </a:endParaRPr>
           </a:p>
-          <a:p>
-            <a:r>
-              <a:rPr lang="en-US" dirty="0">
-                <a:latin typeface="Times New Roman" panose="02020603050405020304" pitchFamily="18" charset="0"/>
-                <a:cs typeface="Times New Roman" panose="02020603050405020304" pitchFamily="18" charset="0"/>
-              </a:rPr>
-              <a:t>CCS </a:t>
-            </a:r>
-            <a:r>
-              <a:rPr lang="en-US" dirty="0">
-                <a:latin typeface="Times New Roman" panose="02020603050405020304" pitchFamily="18" charset="0"/>
-                <a:cs typeface="Times New Roman" panose="02020603050405020304" pitchFamily="18" charset="0"/>
-              </a:rPr>
-              <a:t>2016 </a:t>
-            </a:r>
-            <a:r>
-              <a:rPr lang="en-US" dirty="0">
-                <a:latin typeface="Times New Roman" panose="02020603050405020304" pitchFamily="18" charset="0"/>
-                <a:cs typeface="Times New Roman" panose="02020603050405020304" pitchFamily="18" charset="0"/>
-              </a:rPr>
-              <a:t>- A Secure </a:t>
-            </a:r>
-            <a:r>
-              <a:rPr lang="en-US" dirty="0" err="1">
-                <a:latin typeface="Times New Roman" panose="02020603050405020304" pitchFamily="18" charset="0"/>
-                <a:cs typeface="Times New Roman" panose="02020603050405020304" pitchFamily="18" charset="0"/>
-              </a:rPr>
-              <a:t>Sharding</a:t>
-            </a:r>
-            <a:r>
-              <a:rPr lang="en-US" dirty="0">
-                <a:latin typeface="Times New Roman" panose="02020603050405020304" pitchFamily="18" charset="0"/>
-                <a:cs typeface="Times New Roman" panose="02020603050405020304" pitchFamily="18" charset="0"/>
-              </a:rPr>
-              <a:t> Protocol For Open </a:t>
-            </a:r>
-            <a:r>
-              <a:rPr lang="en-US" dirty="0" err="1">
-                <a:latin typeface="Times New Roman" panose="02020603050405020304" pitchFamily="18" charset="0"/>
-                <a:cs typeface="Times New Roman" panose="02020603050405020304" pitchFamily="18" charset="0"/>
-              </a:rPr>
-              <a:t>Blockchains</a:t>
-            </a:r>
-            <a:r>
-              <a:rPr lang="en-US" dirty="0">
-                <a:latin typeface="Times New Roman" panose="02020603050405020304" pitchFamily="18" charset="0"/>
-                <a:cs typeface="Times New Roman" panose="02020603050405020304" pitchFamily="18" charset="0"/>
-              </a:rPr>
-              <a:t>, </a:t>
-            </a:r>
-            <a:r>
-              <a:rPr lang="en-US" dirty="0">
-                <a:latin typeface="Times New Roman" panose="02020603050405020304" pitchFamily="18" charset="0"/>
-                <a:cs typeface="Times New Roman" panose="02020603050405020304" pitchFamily="18" charset="0"/>
-                <a:hlinkClick r:id="rId3"/>
-              </a:rPr>
-              <a:t>https://</a:t>
-            </a:r>
-            <a:r>
-              <a:rPr lang="en-US" dirty="0">
-                <a:latin typeface="Times New Roman" panose="02020603050405020304" pitchFamily="18" charset="0"/>
-                <a:cs typeface="Times New Roman" panose="02020603050405020304" pitchFamily="18" charset="0"/>
-                <a:hlinkClick r:id="rId3"/>
-              </a:rPr>
-              <a:t>www.youtube.com/watch?v=AlPMYyGVkRk</a:t>
+        </p:txBody>
+      </p:sp>
+    </p:spTree>
+    <p:extLst>
+      <p:ext uri="{BB962C8B-B14F-4D97-AF65-F5344CB8AC3E}">
+        <p14:creationId xmlns:p14="http://schemas.microsoft.com/office/powerpoint/2010/main" val="263365016"/>
+      </p:ext>
+    </p:extLst>
+  </p:cSld>
+  <p:clrMapOvr>
+    <a:masterClrMapping/>
+  </p:clrMapOvr>
+</p:sld>
+</file>
+
+<file path=ppt/slides/slide18.xml><?xml version="1.0" encoding="utf-8"?>
+<p:sld xmlns:a="http://schemas.openxmlformats.org/drawingml/2006/main" xmlns:r="http://schemas.openxmlformats.org/officeDocument/2006/relationships" xmlns:p="http://schemas.openxmlformats.org/presentationml/2006/main">
+  <p:cSld>
+    <p:spTree>
+      <p:nvGrpSpPr>
+        <p:cNvPr id="1" name=""/>
+        <p:cNvGrpSpPr/>
+        <p:nvPr/>
+      </p:nvGrpSpPr>
+      <p:grpSpPr>
+        <a:xfrm>
+          <a:off x="0" y="0"/>
+          <a:ext cx="0" cy="0"/>
+          <a:chOff x="0" y="0"/>
+          <a:chExt cx="0" cy="0"/>
+        </a:xfrm>
+      </p:grpSpPr>
+      <p:sp>
+        <p:nvSpPr>
+          <p:cNvPr id="2" name="Title 1"/>
+          <p:cNvSpPr>
+            <a:spLocks noGrp="1"/>
+          </p:cNvSpPr>
+          <p:nvPr>
+            <p:ph type="title"/>
+          </p:nvPr>
+        </p:nvSpPr>
+        <p:spPr/>
+        <p:txBody>
+          <a:bodyPr>
+            <a:normAutofit/>
+          </a:bodyPr>
+          <a:lstStyle/>
+          <a:p>
+            <a:r>
+              <a:rPr lang="en-US" dirty="0" smtClean="0">
+                <a:latin typeface="Times New Roman" panose="02020603050405020304" pitchFamily="18" charset="0"/>
+                <a:cs typeface="Times New Roman" panose="02020603050405020304" pitchFamily="18" charset="0"/>
+              </a:rPr>
+              <a:t>Cross-Shard Transactions (</a:t>
+            </a:r>
+            <a:r>
+              <a:rPr lang="en-US" dirty="0" err="1" smtClean="0">
+                <a:latin typeface="Times New Roman" panose="02020603050405020304" pitchFamily="18" charset="0"/>
+                <a:cs typeface="Times New Roman" panose="02020603050405020304" pitchFamily="18" charset="0"/>
+              </a:rPr>
+              <a:t>contd</a:t>
+            </a:r>
+            <a:r>
+              <a:rPr lang="en-US" dirty="0" smtClean="0">
+                <a:latin typeface="Times New Roman" panose="02020603050405020304" pitchFamily="18" charset="0"/>
+                <a:cs typeface="Times New Roman" panose="02020603050405020304" pitchFamily="18" charset="0"/>
+              </a:rPr>
+              <a:t>…)</a:t>
             </a:r>
             <a:endParaRPr lang="en-US" dirty="0">
               <a:latin typeface="Times New Roman" panose="02020603050405020304" pitchFamily="18" charset="0"/>
               <a:cs typeface="Times New Roman" panose="02020603050405020304" pitchFamily="18" charset="0"/>
             </a:endParaRPr>
           </a:p>
-          <a:p>
-            <a:r>
-              <a:rPr lang="en-US" dirty="0">
-                <a:latin typeface="Times New Roman" panose="02020603050405020304" pitchFamily="18" charset="0"/>
-                <a:cs typeface="Times New Roman" panose="02020603050405020304" pitchFamily="18" charset="0"/>
-              </a:rPr>
-              <a:t>A </a:t>
-            </a:r>
-            <a:r>
-              <a:rPr lang="en-US" dirty="0">
-                <a:latin typeface="Times New Roman" panose="02020603050405020304" pitchFamily="18" charset="0"/>
-                <a:cs typeface="Times New Roman" panose="02020603050405020304" pitchFamily="18" charset="0"/>
-              </a:rPr>
-              <a:t>Secure </a:t>
-            </a:r>
-            <a:r>
-              <a:rPr lang="en-US" dirty="0" err="1">
-                <a:latin typeface="Times New Roman" panose="02020603050405020304" pitchFamily="18" charset="0"/>
-                <a:cs typeface="Times New Roman" panose="02020603050405020304" pitchFamily="18" charset="0"/>
-              </a:rPr>
-              <a:t>Sharding</a:t>
-            </a:r>
-            <a:r>
-              <a:rPr lang="en-US" dirty="0">
-                <a:latin typeface="Times New Roman" panose="02020603050405020304" pitchFamily="18" charset="0"/>
-                <a:cs typeface="Times New Roman" panose="02020603050405020304" pitchFamily="18" charset="0"/>
-              </a:rPr>
-              <a:t> Protocol For Open </a:t>
-            </a:r>
-            <a:r>
-              <a:rPr lang="en-US" dirty="0" err="1">
-                <a:latin typeface="Times New Roman" panose="02020603050405020304" pitchFamily="18" charset="0"/>
-                <a:cs typeface="Times New Roman" panose="02020603050405020304" pitchFamily="18" charset="0"/>
-              </a:rPr>
-              <a:t>Blockchains</a:t>
-            </a:r>
-            <a:r>
-              <a:rPr lang="en-US" dirty="0">
-                <a:latin typeface="Times New Roman" panose="02020603050405020304" pitchFamily="18" charset="0"/>
-                <a:cs typeface="Times New Roman" panose="02020603050405020304" pitchFamily="18" charset="0"/>
-              </a:rPr>
-              <a:t>, </a:t>
-            </a:r>
-            <a:r>
-              <a:rPr lang="en-US" dirty="0">
-                <a:latin typeface="Times New Roman" panose="02020603050405020304" pitchFamily="18" charset="0"/>
-                <a:cs typeface="Times New Roman" panose="02020603050405020304" pitchFamily="18" charset="0"/>
-                <a:hlinkClick r:id="rId4"/>
-              </a:rPr>
-              <a:t>http://delivery.acm.org/10.1145/2980000/2978389/p17-luu.pdf?ip=141.223.124.8&amp;id=2978389&amp;acc=ACTIVE%20SERVICE&amp;key=0EC22F8658578FE1%2E25E83D88E716D18F%2E4D4702B0C3E38B35%2E4D4702B0C3E38B35&amp;__acm__=1544631713_e0a9cf3b64b146e76b8dd6a126a46c01</a:t>
-            </a:r>
+        </p:txBody>
+      </p:sp>
+      <p:sp>
+        <p:nvSpPr>
+          <p:cNvPr id="3" name="Content Placeholder 2"/>
+          <p:cNvSpPr>
+            <a:spLocks noGrp="1"/>
+          </p:cNvSpPr>
+          <p:nvPr>
+            <p:ph idx="1"/>
+          </p:nvPr>
+        </p:nvSpPr>
+        <p:spPr/>
+        <p:txBody>
+          <a:bodyPr>
+            <a:normAutofit/>
+          </a:bodyPr>
+          <a:lstStyle/>
+          <a:p>
+            <a:r>
+              <a:rPr lang="en-US" dirty="0" smtClean="0">
+                <a:latin typeface="Times New Roman" panose="02020603050405020304" pitchFamily="18" charset="0"/>
+                <a:cs typeface="Times New Roman" panose="02020603050405020304" pitchFamily="18" charset="0"/>
+              </a:rPr>
+              <a:t>Requires the assumption of less than 1/3 malicious nodes in each shard to prevent forking</a:t>
+            </a:r>
+          </a:p>
+          <a:p>
+            <a:r>
+              <a:rPr lang="en-US" dirty="0" smtClean="0">
+                <a:latin typeface="Times New Roman" panose="02020603050405020304" pitchFamily="18" charset="0"/>
+                <a:cs typeface="Times New Roman" panose="02020603050405020304" pitchFamily="18" charset="0"/>
+              </a:rPr>
+              <a:t>Say (by a negligible probability), malicious nodes collude on a shard</a:t>
+            </a:r>
+          </a:p>
+          <a:p>
+            <a:endParaRPr lang="en-US" dirty="0" smtClean="0">
+              <a:latin typeface="Times New Roman" panose="02020603050405020304" pitchFamily="18" charset="0"/>
+              <a:cs typeface="Times New Roman" panose="02020603050405020304" pitchFamily="18" charset="0"/>
+            </a:endParaRPr>
+          </a:p>
+          <a:p>
             <a:endParaRPr lang="en-US" dirty="0">
               <a:latin typeface="Times New Roman" panose="02020603050405020304" pitchFamily="18" charset="0"/>
               <a:cs typeface="Times New Roman" panose="02020603050405020304" pitchFamily="18" charset="0"/>
             </a:endParaRPr>
           </a:p>
-          <a:p>
-            <a:endParaRPr lang="en-US" dirty="0" smtClean="0"/>
-          </a:p>
-          <a:p>
+        </p:txBody>
+      </p:sp>
+      <p:pic>
+        <p:nvPicPr>
+          <p:cNvPr id="4" name="Picture 3"/>
+          <p:cNvPicPr>
+            <a:picLocks noChangeAspect="1"/>
+          </p:cNvPicPr>
+          <p:nvPr/>
+        </p:nvPicPr>
+        <p:blipFill>
+          <a:blip r:embed="rId2"/>
+          <a:stretch>
+            <a:fillRect/>
+          </a:stretch>
+        </p:blipFill>
+        <p:spPr>
+          <a:xfrm>
+            <a:off x="3481197" y="3387661"/>
+            <a:ext cx="4095750" cy="2295525"/>
+          </a:xfrm>
+          <a:prstGeom prst="rect">
+            <a:avLst/>
+          </a:prstGeom>
+        </p:spPr>
+      </p:pic>
+      <p:sp>
+        <p:nvSpPr>
+          <p:cNvPr id="5" name="TextBox 4"/>
+          <p:cNvSpPr txBox="1"/>
+          <p:nvPr/>
+        </p:nvSpPr>
+        <p:spPr>
+          <a:xfrm>
+            <a:off x="4254813" y="5745408"/>
+            <a:ext cx="2548518" cy="369332"/>
+          </a:xfrm>
+          <a:prstGeom prst="rect">
+            <a:avLst/>
+          </a:prstGeom>
+          <a:noFill/>
+        </p:spPr>
+        <p:txBody>
+          <a:bodyPr wrap="none" rtlCol="0">
+            <a:spAutoFit/>
+          </a:bodyPr>
+          <a:lstStyle/>
+          <a:p>
+            <a:r>
+              <a:rPr lang="en-US" dirty="0" smtClean="0"/>
+              <a:t>Image Courtesy: </a:t>
+            </a:r>
+            <a:r>
+              <a:rPr lang="en-US" dirty="0" smtClean="0">
+                <a:hlinkClick r:id="rId3"/>
+              </a:rPr>
+              <a:t>Medium</a:t>
+            </a:r>
             <a:endParaRPr lang="en-US" dirty="0"/>
           </a:p>
         </p:txBody>
@@ -4717,7 +4880,214 @@
     </p:spTree>
     <p:extLst>
       <p:ext uri="{BB962C8B-B14F-4D97-AF65-F5344CB8AC3E}">
-        <p14:creationId xmlns:p14="http://schemas.microsoft.com/office/powerpoint/2010/main" val="3152363338"/>
+        <p14:creationId xmlns:p14="http://schemas.microsoft.com/office/powerpoint/2010/main" val="4276639851"/>
+      </p:ext>
+    </p:extLst>
+  </p:cSld>
+  <p:clrMapOvr>
+    <a:masterClrMapping/>
+  </p:clrMapOvr>
+</p:sld>
+</file>
+
+<file path=ppt/slides/slide19.xml><?xml version="1.0" encoding="utf-8"?>
+<p:sld xmlns:a="http://schemas.openxmlformats.org/drawingml/2006/main" xmlns:r="http://schemas.openxmlformats.org/officeDocument/2006/relationships" xmlns:p="http://schemas.openxmlformats.org/presentationml/2006/main">
+  <p:cSld>
+    <p:spTree>
+      <p:nvGrpSpPr>
+        <p:cNvPr id="1" name=""/>
+        <p:cNvGrpSpPr/>
+        <p:nvPr/>
+      </p:nvGrpSpPr>
+      <p:grpSpPr>
+        <a:xfrm>
+          <a:off x="0" y="0"/>
+          <a:ext cx="0" cy="0"/>
+          <a:chOff x="0" y="0"/>
+          <a:chExt cx="0" cy="0"/>
+        </a:xfrm>
+      </p:grpSpPr>
+      <p:sp>
+        <p:nvSpPr>
+          <p:cNvPr id="2" name="Title 1"/>
+          <p:cNvSpPr>
+            <a:spLocks noGrp="1"/>
+          </p:cNvSpPr>
+          <p:nvPr>
+            <p:ph type="title"/>
+          </p:nvPr>
+        </p:nvSpPr>
+        <p:spPr/>
+        <p:txBody>
+          <a:bodyPr>
+            <a:normAutofit/>
+          </a:bodyPr>
+          <a:lstStyle/>
+          <a:p>
+            <a:r>
+              <a:rPr lang="en-US" dirty="0" smtClean="0">
+                <a:latin typeface="Times New Roman" panose="02020603050405020304" pitchFamily="18" charset="0"/>
+                <a:cs typeface="Times New Roman" panose="02020603050405020304" pitchFamily="18" charset="0"/>
+              </a:rPr>
+              <a:t>Cross-Shard Transactions (</a:t>
+            </a:r>
+            <a:r>
+              <a:rPr lang="en-US" dirty="0" err="1" smtClean="0">
+                <a:latin typeface="Times New Roman" panose="02020603050405020304" pitchFamily="18" charset="0"/>
+                <a:cs typeface="Times New Roman" panose="02020603050405020304" pitchFamily="18" charset="0"/>
+              </a:rPr>
+              <a:t>contd</a:t>
+            </a:r>
+            <a:r>
+              <a:rPr lang="en-US" dirty="0" smtClean="0">
+                <a:latin typeface="Times New Roman" panose="02020603050405020304" pitchFamily="18" charset="0"/>
+                <a:cs typeface="Times New Roman" panose="02020603050405020304" pitchFamily="18" charset="0"/>
+              </a:rPr>
+              <a:t>…)</a:t>
+            </a:r>
+            <a:endParaRPr lang="en-US" dirty="0">
+              <a:latin typeface="Times New Roman" panose="02020603050405020304" pitchFamily="18" charset="0"/>
+              <a:cs typeface="Times New Roman" panose="02020603050405020304" pitchFamily="18" charset="0"/>
+            </a:endParaRPr>
+          </a:p>
+        </p:txBody>
+      </p:sp>
+      <p:sp>
+        <p:nvSpPr>
+          <p:cNvPr id="3" name="Content Placeholder 2"/>
+          <p:cNvSpPr>
+            <a:spLocks noGrp="1"/>
+          </p:cNvSpPr>
+          <p:nvPr>
+            <p:ph idx="1"/>
+          </p:nvPr>
+        </p:nvSpPr>
+        <p:spPr/>
+        <p:txBody>
+          <a:bodyPr>
+            <a:normAutofit/>
+          </a:bodyPr>
+          <a:lstStyle/>
+          <a:p>
+            <a:r>
+              <a:rPr lang="en-US" dirty="0" smtClean="0">
+                <a:latin typeface="Times New Roman" panose="02020603050405020304" pitchFamily="18" charset="0"/>
+                <a:cs typeface="Times New Roman" panose="02020603050405020304" pitchFamily="18" charset="0"/>
+              </a:rPr>
+              <a:t>Undirected Graph can be used that shares the cross-shard transaction history</a:t>
+            </a:r>
+          </a:p>
+          <a:p>
+            <a:endParaRPr lang="en-US" dirty="0" smtClean="0">
+              <a:latin typeface="Times New Roman" panose="02020603050405020304" pitchFamily="18" charset="0"/>
+              <a:cs typeface="Times New Roman" panose="02020603050405020304" pitchFamily="18" charset="0"/>
+            </a:endParaRPr>
+          </a:p>
+          <a:p>
+            <a:endParaRPr lang="en-US" dirty="0">
+              <a:latin typeface="Times New Roman" panose="02020603050405020304" pitchFamily="18" charset="0"/>
+              <a:cs typeface="Times New Roman" panose="02020603050405020304" pitchFamily="18" charset="0"/>
+            </a:endParaRPr>
+          </a:p>
+          <a:p>
+            <a:endParaRPr lang="en-US" dirty="0" smtClean="0">
+              <a:latin typeface="Times New Roman" panose="02020603050405020304" pitchFamily="18" charset="0"/>
+              <a:cs typeface="Times New Roman" panose="02020603050405020304" pitchFamily="18" charset="0"/>
+            </a:endParaRPr>
+          </a:p>
+          <a:p>
+            <a:endParaRPr lang="en-US" dirty="0">
+              <a:latin typeface="Times New Roman" panose="02020603050405020304" pitchFamily="18" charset="0"/>
+              <a:cs typeface="Times New Roman" panose="02020603050405020304" pitchFamily="18" charset="0"/>
+            </a:endParaRPr>
+          </a:p>
+          <a:p>
+            <a:r>
+              <a:rPr lang="en-US" dirty="0" smtClean="0">
+                <a:latin typeface="Times New Roman" panose="02020603050405020304" pitchFamily="18" charset="0"/>
+                <a:cs typeface="Times New Roman" panose="02020603050405020304" pitchFamily="18" charset="0"/>
+              </a:rPr>
+              <a:t>Shard #2 invalidates block B from Shard #1</a:t>
+            </a:r>
+          </a:p>
+          <a:p>
+            <a:endParaRPr lang="en-US" dirty="0" smtClean="0">
+              <a:latin typeface="Times New Roman" panose="02020603050405020304" pitchFamily="18" charset="0"/>
+              <a:cs typeface="Times New Roman" panose="02020603050405020304" pitchFamily="18" charset="0"/>
+            </a:endParaRPr>
+          </a:p>
+          <a:p>
+            <a:endParaRPr lang="en-US" dirty="0">
+              <a:latin typeface="Times New Roman" panose="02020603050405020304" pitchFamily="18" charset="0"/>
+              <a:cs typeface="Times New Roman" panose="02020603050405020304" pitchFamily="18" charset="0"/>
+            </a:endParaRPr>
+          </a:p>
+        </p:txBody>
+      </p:sp>
+      <p:pic>
+        <p:nvPicPr>
+          <p:cNvPr id="6" name="Picture 5"/>
+          <p:cNvPicPr>
+            <a:picLocks noChangeAspect="1"/>
+          </p:cNvPicPr>
+          <p:nvPr/>
+        </p:nvPicPr>
+        <p:blipFill>
+          <a:blip r:embed="rId2"/>
+          <a:stretch>
+            <a:fillRect/>
+          </a:stretch>
+        </p:blipFill>
+        <p:spPr>
+          <a:xfrm>
+            <a:off x="2425446" y="2405285"/>
+            <a:ext cx="5054346" cy="2255799"/>
+          </a:xfrm>
+          <a:prstGeom prst="rect">
+            <a:avLst/>
+          </a:prstGeom>
+        </p:spPr>
+      </p:pic>
+      <p:sp>
+        <p:nvSpPr>
+          <p:cNvPr id="7" name="TextBox 6"/>
+          <p:cNvSpPr txBox="1"/>
+          <p:nvPr/>
+        </p:nvSpPr>
+        <p:spPr>
+          <a:xfrm>
+            <a:off x="4931274" y="4291752"/>
+            <a:ext cx="2548518" cy="369332"/>
+          </a:xfrm>
+          <a:prstGeom prst="rect">
+            <a:avLst/>
+          </a:prstGeom>
+          <a:noFill/>
+        </p:spPr>
+        <p:txBody>
+          <a:bodyPr wrap="none" rtlCol="0">
+            <a:spAutoFit/>
+          </a:bodyPr>
+          <a:lstStyle/>
+          <a:p>
+            <a:r>
+              <a:rPr lang="en-US" dirty="0" smtClean="0"/>
+              <a:t>Image Courtesy: </a:t>
+            </a:r>
+            <a:r>
+              <a:rPr lang="en-US" dirty="0" smtClean="0">
+                <a:hlinkClick r:id="rId3"/>
+              </a:rPr>
+              <a:t>Medium</a:t>
+            </a:r>
+            <a:endParaRPr lang="en-US" dirty="0"/>
+          </a:p>
+        </p:txBody>
+      </p:sp>
+    </p:spTree>
+    <p:extLst>
+      <p:ext uri="{BB962C8B-B14F-4D97-AF65-F5344CB8AC3E}">
+        <p14:creationId xmlns:p14="http://schemas.microsoft.com/office/powerpoint/2010/main" val="4012127114"/>
       </p:ext>
     </p:extLst>
   </p:cSld>
@@ -4992,6 +5362,976 @@
       </p:par>
     </p:tnLst>
   </p:timing>
+</p:sld>
+</file>
+
+<file path=ppt/slides/slide20.xml><?xml version="1.0" encoding="utf-8"?>
+<p:sld xmlns:a="http://schemas.openxmlformats.org/drawingml/2006/main" xmlns:r="http://schemas.openxmlformats.org/officeDocument/2006/relationships" xmlns:p="http://schemas.openxmlformats.org/presentationml/2006/main">
+  <p:cSld>
+    <p:spTree>
+      <p:nvGrpSpPr>
+        <p:cNvPr id="1" name=""/>
+        <p:cNvGrpSpPr/>
+        <p:nvPr/>
+      </p:nvGrpSpPr>
+      <p:grpSpPr>
+        <a:xfrm>
+          <a:off x="0" y="0"/>
+          <a:ext cx="0" cy="0"/>
+          <a:chOff x="0" y="0"/>
+          <a:chExt cx="0" cy="0"/>
+        </a:xfrm>
+      </p:grpSpPr>
+      <p:sp>
+        <p:nvSpPr>
+          <p:cNvPr id="2" name="Title 1"/>
+          <p:cNvSpPr>
+            <a:spLocks noGrp="1"/>
+          </p:cNvSpPr>
+          <p:nvPr>
+            <p:ph type="title"/>
+          </p:nvPr>
+        </p:nvSpPr>
+        <p:spPr/>
+        <p:txBody>
+          <a:bodyPr>
+            <a:normAutofit/>
+          </a:bodyPr>
+          <a:lstStyle/>
+          <a:p>
+            <a:r>
+              <a:rPr lang="en-US" dirty="0" smtClean="0">
+                <a:latin typeface="Times New Roman" panose="02020603050405020304" pitchFamily="18" charset="0"/>
+                <a:cs typeface="Times New Roman" panose="02020603050405020304" pitchFamily="18" charset="0"/>
+              </a:rPr>
+              <a:t>Cross-Shard Transactions (</a:t>
+            </a:r>
+            <a:r>
+              <a:rPr lang="en-US" dirty="0" err="1" smtClean="0">
+                <a:latin typeface="Times New Roman" panose="02020603050405020304" pitchFamily="18" charset="0"/>
+                <a:cs typeface="Times New Roman" panose="02020603050405020304" pitchFamily="18" charset="0"/>
+              </a:rPr>
+              <a:t>contd</a:t>
+            </a:r>
+            <a:r>
+              <a:rPr lang="en-US" dirty="0" smtClean="0">
+                <a:latin typeface="Times New Roman" panose="02020603050405020304" pitchFamily="18" charset="0"/>
+                <a:cs typeface="Times New Roman" panose="02020603050405020304" pitchFamily="18" charset="0"/>
+              </a:rPr>
+              <a:t>…)</a:t>
+            </a:r>
+            <a:endParaRPr lang="en-US" dirty="0">
+              <a:latin typeface="Times New Roman" panose="02020603050405020304" pitchFamily="18" charset="0"/>
+              <a:cs typeface="Times New Roman" panose="02020603050405020304" pitchFamily="18" charset="0"/>
+            </a:endParaRPr>
+          </a:p>
+        </p:txBody>
+      </p:sp>
+      <p:sp>
+        <p:nvSpPr>
+          <p:cNvPr id="3" name="Content Placeholder 2"/>
+          <p:cNvSpPr>
+            <a:spLocks noGrp="1"/>
+          </p:cNvSpPr>
+          <p:nvPr>
+            <p:ph idx="1"/>
+          </p:nvPr>
+        </p:nvSpPr>
+        <p:spPr/>
+        <p:txBody>
+          <a:bodyPr>
+            <a:normAutofit/>
+          </a:bodyPr>
+          <a:lstStyle/>
+          <a:p>
+            <a:r>
+              <a:rPr lang="en-US" dirty="0" smtClean="0">
+                <a:latin typeface="Times New Roman" panose="02020603050405020304" pitchFamily="18" charset="0"/>
+                <a:cs typeface="Times New Roman" panose="02020603050405020304" pitchFamily="18" charset="0"/>
+              </a:rPr>
+              <a:t>Say (very </a:t>
+            </a:r>
+            <a:r>
+              <a:rPr lang="en-US" dirty="0" err="1" smtClean="0">
+                <a:latin typeface="Times New Roman" panose="02020603050405020304" pitchFamily="18" charset="0"/>
+                <a:cs typeface="Times New Roman" panose="02020603050405020304" pitchFamily="18" charset="0"/>
+              </a:rPr>
+              <a:t>very</a:t>
+            </a:r>
+            <a:r>
+              <a:rPr lang="en-US" dirty="0" smtClean="0">
+                <a:latin typeface="Times New Roman" panose="02020603050405020304" pitchFamily="18" charset="0"/>
+                <a:cs typeface="Times New Roman" panose="02020603050405020304" pitchFamily="18" charset="0"/>
+              </a:rPr>
+              <a:t> negligible probability) two or more shards are colluded</a:t>
+            </a:r>
+          </a:p>
+          <a:p>
+            <a:endParaRPr lang="en-US" dirty="0" smtClean="0">
+              <a:latin typeface="Times New Roman" panose="02020603050405020304" pitchFamily="18" charset="0"/>
+              <a:cs typeface="Times New Roman" panose="02020603050405020304" pitchFamily="18" charset="0"/>
+            </a:endParaRPr>
+          </a:p>
+          <a:p>
+            <a:endParaRPr lang="en-US" dirty="0" smtClean="0">
+              <a:latin typeface="Times New Roman" panose="02020603050405020304" pitchFamily="18" charset="0"/>
+              <a:cs typeface="Times New Roman" panose="02020603050405020304" pitchFamily="18" charset="0"/>
+            </a:endParaRPr>
+          </a:p>
+          <a:p>
+            <a:endParaRPr lang="en-US" dirty="0">
+              <a:latin typeface="Times New Roman" panose="02020603050405020304" pitchFamily="18" charset="0"/>
+              <a:cs typeface="Times New Roman" panose="02020603050405020304" pitchFamily="18" charset="0"/>
+            </a:endParaRPr>
+          </a:p>
+          <a:p>
+            <a:endParaRPr lang="en-US" dirty="0" smtClean="0">
+              <a:latin typeface="Times New Roman" panose="02020603050405020304" pitchFamily="18" charset="0"/>
+              <a:cs typeface="Times New Roman" panose="02020603050405020304" pitchFamily="18" charset="0"/>
+            </a:endParaRPr>
+          </a:p>
+          <a:p>
+            <a:endParaRPr lang="en-US" dirty="0">
+              <a:latin typeface="Times New Roman" panose="02020603050405020304" pitchFamily="18" charset="0"/>
+              <a:cs typeface="Times New Roman" panose="02020603050405020304" pitchFamily="18" charset="0"/>
+            </a:endParaRPr>
+          </a:p>
+          <a:p>
+            <a:endParaRPr lang="en-US" dirty="0" smtClean="0">
+              <a:latin typeface="Times New Roman" panose="02020603050405020304" pitchFamily="18" charset="0"/>
+              <a:cs typeface="Times New Roman" panose="02020603050405020304" pitchFamily="18" charset="0"/>
+            </a:endParaRPr>
+          </a:p>
+          <a:p>
+            <a:r>
+              <a:rPr lang="en-US" dirty="0" smtClean="0">
+                <a:latin typeface="Times New Roman" panose="02020603050405020304" pitchFamily="18" charset="0"/>
+                <a:cs typeface="Times New Roman" panose="02020603050405020304" pitchFamily="18" charset="0"/>
+              </a:rPr>
+              <a:t>Malicious block B is obfuscated</a:t>
+            </a:r>
+            <a:endParaRPr lang="en-US" dirty="0">
+              <a:latin typeface="Times New Roman" panose="02020603050405020304" pitchFamily="18" charset="0"/>
+              <a:cs typeface="Times New Roman" panose="02020603050405020304" pitchFamily="18" charset="0"/>
+            </a:endParaRPr>
+          </a:p>
+        </p:txBody>
+      </p:sp>
+      <p:pic>
+        <p:nvPicPr>
+          <p:cNvPr id="4" name="Picture 3"/>
+          <p:cNvPicPr>
+            <a:picLocks noChangeAspect="1"/>
+          </p:cNvPicPr>
+          <p:nvPr/>
+        </p:nvPicPr>
+        <p:blipFill>
+          <a:blip r:embed="rId2"/>
+          <a:stretch>
+            <a:fillRect/>
+          </a:stretch>
+        </p:blipFill>
+        <p:spPr>
+          <a:xfrm>
+            <a:off x="2144268" y="2390203"/>
+            <a:ext cx="6477000" cy="2333625"/>
+          </a:xfrm>
+          <a:prstGeom prst="rect">
+            <a:avLst/>
+          </a:prstGeom>
+        </p:spPr>
+      </p:pic>
+      <p:sp>
+        <p:nvSpPr>
+          <p:cNvPr id="8" name="TextBox 7"/>
+          <p:cNvSpPr txBox="1"/>
+          <p:nvPr/>
+        </p:nvSpPr>
+        <p:spPr>
+          <a:xfrm>
+            <a:off x="3907341" y="4723828"/>
+            <a:ext cx="2548518" cy="369332"/>
+          </a:xfrm>
+          <a:prstGeom prst="rect">
+            <a:avLst/>
+          </a:prstGeom>
+          <a:noFill/>
+        </p:spPr>
+        <p:txBody>
+          <a:bodyPr wrap="none" rtlCol="0">
+            <a:spAutoFit/>
+          </a:bodyPr>
+          <a:lstStyle/>
+          <a:p>
+            <a:r>
+              <a:rPr lang="en-US" dirty="0" smtClean="0"/>
+              <a:t>Image Courtesy: </a:t>
+            </a:r>
+            <a:r>
+              <a:rPr lang="en-US" dirty="0" smtClean="0">
+                <a:hlinkClick r:id="rId3"/>
+              </a:rPr>
+              <a:t>Medium</a:t>
+            </a:r>
+            <a:endParaRPr lang="en-US" dirty="0"/>
+          </a:p>
+        </p:txBody>
+      </p:sp>
+    </p:spTree>
+    <p:extLst>
+      <p:ext uri="{BB962C8B-B14F-4D97-AF65-F5344CB8AC3E}">
+        <p14:creationId xmlns:p14="http://schemas.microsoft.com/office/powerpoint/2010/main" val="1557591714"/>
+      </p:ext>
+    </p:extLst>
+  </p:cSld>
+  <p:clrMapOvr>
+    <a:masterClrMapping/>
+  </p:clrMapOvr>
+</p:sld>
+</file>
+
+<file path=ppt/slides/slide21.xml><?xml version="1.0" encoding="utf-8"?>
+<p:sld xmlns:a="http://schemas.openxmlformats.org/drawingml/2006/main" xmlns:r="http://schemas.openxmlformats.org/officeDocument/2006/relationships" xmlns:p="http://schemas.openxmlformats.org/presentationml/2006/main">
+  <p:cSld>
+    <p:spTree>
+      <p:nvGrpSpPr>
+        <p:cNvPr id="1" name=""/>
+        <p:cNvGrpSpPr/>
+        <p:nvPr/>
+      </p:nvGrpSpPr>
+      <p:grpSpPr>
+        <a:xfrm>
+          <a:off x="0" y="0"/>
+          <a:ext cx="0" cy="0"/>
+          <a:chOff x="0" y="0"/>
+          <a:chExt cx="0" cy="0"/>
+        </a:xfrm>
+      </p:grpSpPr>
+      <p:sp>
+        <p:nvSpPr>
+          <p:cNvPr id="2" name="Title 1"/>
+          <p:cNvSpPr>
+            <a:spLocks noGrp="1"/>
+          </p:cNvSpPr>
+          <p:nvPr>
+            <p:ph type="title"/>
+          </p:nvPr>
+        </p:nvSpPr>
+        <p:spPr/>
+        <p:txBody>
+          <a:bodyPr>
+            <a:normAutofit/>
+          </a:bodyPr>
+          <a:lstStyle/>
+          <a:p>
+            <a:r>
+              <a:rPr lang="en-US" dirty="0" smtClean="0">
+                <a:latin typeface="Times New Roman" panose="02020603050405020304" pitchFamily="18" charset="0"/>
+                <a:cs typeface="Times New Roman" panose="02020603050405020304" pitchFamily="18" charset="0"/>
+              </a:rPr>
+              <a:t>Cross-Shard Transactions (</a:t>
+            </a:r>
+            <a:r>
+              <a:rPr lang="en-US" dirty="0" err="1" smtClean="0">
+                <a:latin typeface="Times New Roman" panose="02020603050405020304" pitchFamily="18" charset="0"/>
+                <a:cs typeface="Times New Roman" panose="02020603050405020304" pitchFamily="18" charset="0"/>
+              </a:rPr>
+              <a:t>contd</a:t>
+            </a:r>
+            <a:r>
+              <a:rPr lang="en-US" dirty="0" smtClean="0">
+                <a:latin typeface="Times New Roman" panose="02020603050405020304" pitchFamily="18" charset="0"/>
+                <a:cs typeface="Times New Roman" panose="02020603050405020304" pitchFamily="18" charset="0"/>
+              </a:rPr>
+              <a:t>…)</a:t>
+            </a:r>
+            <a:endParaRPr lang="en-US" dirty="0">
+              <a:latin typeface="Times New Roman" panose="02020603050405020304" pitchFamily="18" charset="0"/>
+              <a:cs typeface="Times New Roman" panose="02020603050405020304" pitchFamily="18" charset="0"/>
+            </a:endParaRPr>
+          </a:p>
+        </p:txBody>
+      </p:sp>
+      <p:sp>
+        <p:nvSpPr>
+          <p:cNvPr id="3" name="Content Placeholder 2"/>
+          <p:cNvSpPr>
+            <a:spLocks noGrp="1"/>
+          </p:cNvSpPr>
+          <p:nvPr>
+            <p:ph idx="1"/>
+          </p:nvPr>
+        </p:nvSpPr>
+        <p:spPr/>
+        <p:txBody>
+          <a:bodyPr>
+            <a:normAutofit lnSpcReduction="10000"/>
+          </a:bodyPr>
+          <a:lstStyle/>
+          <a:p>
+            <a:r>
+              <a:rPr lang="en-US" dirty="0" smtClean="0">
+                <a:latin typeface="Times New Roman" panose="02020603050405020304" pitchFamily="18" charset="0"/>
+                <a:cs typeface="Times New Roman" panose="02020603050405020304" pitchFamily="18" charset="0"/>
+              </a:rPr>
+              <a:t>Fisherman Approach</a:t>
+            </a:r>
+          </a:p>
+          <a:p>
+            <a:pPr lvl="1"/>
+            <a:r>
+              <a:rPr lang="en-US" dirty="0" smtClean="0">
+                <a:latin typeface="Times New Roman" panose="02020603050405020304" pitchFamily="18" charset="0"/>
+                <a:cs typeface="Times New Roman" panose="02020603050405020304" pitchFamily="18" charset="0"/>
+              </a:rPr>
+              <a:t>Honest validators issues a challenge that a certain block is invalid, for a given period of time</a:t>
+            </a:r>
+          </a:p>
+          <a:p>
+            <a:pPr lvl="1"/>
+            <a:r>
+              <a:rPr lang="en-US" dirty="0" smtClean="0">
+                <a:latin typeface="Times New Roman" panose="02020603050405020304" pitchFamily="18" charset="0"/>
+                <a:cs typeface="Times New Roman" panose="02020603050405020304" pitchFamily="18" charset="0"/>
+              </a:rPr>
+              <a:t>Shard is secure even with just one honest node in the shard</a:t>
+            </a:r>
+          </a:p>
+          <a:p>
+            <a:endParaRPr lang="en-US" dirty="0" smtClean="0">
+              <a:latin typeface="Times New Roman" panose="02020603050405020304" pitchFamily="18" charset="0"/>
+              <a:cs typeface="Times New Roman" panose="02020603050405020304" pitchFamily="18" charset="0"/>
+            </a:endParaRPr>
+          </a:p>
+          <a:p>
+            <a:endParaRPr lang="en-US" dirty="0">
+              <a:latin typeface="Times New Roman" panose="02020603050405020304" pitchFamily="18" charset="0"/>
+              <a:cs typeface="Times New Roman" panose="02020603050405020304" pitchFamily="18" charset="0"/>
+            </a:endParaRPr>
+          </a:p>
+          <a:p>
+            <a:endParaRPr lang="en-US" dirty="0" smtClean="0">
+              <a:latin typeface="Times New Roman" panose="02020603050405020304" pitchFamily="18" charset="0"/>
+              <a:cs typeface="Times New Roman" panose="02020603050405020304" pitchFamily="18" charset="0"/>
+            </a:endParaRPr>
+          </a:p>
+          <a:p>
+            <a:endParaRPr lang="en-US" dirty="0">
+              <a:latin typeface="Times New Roman" panose="02020603050405020304" pitchFamily="18" charset="0"/>
+              <a:cs typeface="Times New Roman" panose="02020603050405020304" pitchFamily="18" charset="0"/>
+            </a:endParaRPr>
+          </a:p>
+          <a:p>
+            <a:endParaRPr lang="en-US" dirty="0" smtClean="0">
+              <a:latin typeface="Times New Roman" panose="02020603050405020304" pitchFamily="18" charset="0"/>
+              <a:cs typeface="Times New Roman" panose="02020603050405020304" pitchFamily="18" charset="0"/>
+            </a:endParaRPr>
+          </a:p>
+          <a:p>
+            <a:r>
+              <a:rPr lang="en-US" dirty="0" smtClean="0">
+                <a:latin typeface="Times New Roman" panose="02020603050405020304" pitchFamily="18" charset="0"/>
+                <a:cs typeface="Times New Roman" panose="02020603050405020304" pitchFamily="18" charset="0"/>
+              </a:rPr>
+              <a:t>Cryptographic Proof of Computation</a:t>
+            </a:r>
+          </a:p>
+        </p:txBody>
+      </p:sp>
+      <p:pic>
+        <p:nvPicPr>
+          <p:cNvPr id="5" name="Picture 4"/>
+          <p:cNvPicPr>
+            <a:picLocks noChangeAspect="1"/>
+          </p:cNvPicPr>
+          <p:nvPr/>
+        </p:nvPicPr>
+        <p:blipFill>
+          <a:blip r:embed="rId2"/>
+          <a:stretch>
+            <a:fillRect/>
+          </a:stretch>
+        </p:blipFill>
+        <p:spPr>
+          <a:xfrm>
+            <a:off x="2804732" y="3177921"/>
+            <a:ext cx="3834246" cy="2372487"/>
+          </a:xfrm>
+          <a:prstGeom prst="rect">
+            <a:avLst/>
+          </a:prstGeom>
+        </p:spPr>
+      </p:pic>
+      <p:sp>
+        <p:nvSpPr>
+          <p:cNvPr id="7" name="TextBox 6"/>
+          <p:cNvSpPr txBox="1"/>
+          <p:nvPr/>
+        </p:nvSpPr>
+        <p:spPr>
+          <a:xfrm>
+            <a:off x="6638978" y="4989004"/>
+            <a:ext cx="2548518" cy="369332"/>
+          </a:xfrm>
+          <a:prstGeom prst="rect">
+            <a:avLst/>
+          </a:prstGeom>
+          <a:noFill/>
+        </p:spPr>
+        <p:txBody>
+          <a:bodyPr wrap="none" rtlCol="0">
+            <a:spAutoFit/>
+          </a:bodyPr>
+          <a:lstStyle/>
+          <a:p>
+            <a:r>
+              <a:rPr lang="en-US" dirty="0" smtClean="0"/>
+              <a:t>Image Courtesy: </a:t>
+            </a:r>
+            <a:r>
+              <a:rPr lang="en-US" dirty="0" smtClean="0">
+                <a:hlinkClick r:id="rId3"/>
+              </a:rPr>
+              <a:t>Medium</a:t>
+            </a:r>
+            <a:endParaRPr lang="en-US" dirty="0"/>
+          </a:p>
+        </p:txBody>
+      </p:sp>
+    </p:spTree>
+    <p:extLst>
+      <p:ext uri="{BB962C8B-B14F-4D97-AF65-F5344CB8AC3E}">
+        <p14:creationId xmlns:p14="http://schemas.microsoft.com/office/powerpoint/2010/main" val="3396912116"/>
+      </p:ext>
+    </p:extLst>
+  </p:cSld>
+  <p:clrMapOvr>
+    <a:masterClrMapping/>
+  </p:clrMapOvr>
+</p:sld>
+</file>
+
+<file path=ppt/slides/slide22.xml><?xml version="1.0" encoding="utf-8"?>
+<p:sld xmlns:a="http://schemas.openxmlformats.org/drawingml/2006/main" xmlns:r="http://schemas.openxmlformats.org/officeDocument/2006/relationships" xmlns:p="http://schemas.openxmlformats.org/presentationml/2006/main">
+  <p:cSld>
+    <p:spTree>
+      <p:nvGrpSpPr>
+        <p:cNvPr id="1" name=""/>
+        <p:cNvGrpSpPr/>
+        <p:nvPr/>
+      </p:nvGrpSpPr>
+      <p:grpSpPr>
+        <a:xfrm>
+          <a:off x="0" y="0"/>
+          <a:ext cx="0" cy="0"/>
+          <a:chOff x="0" y="0"/>
+          <a:chExt cx="0" cy="0"/>
+        </a:xfrm>
+      </p:grpSpPr>
+      <p:sp>
+        <p:nvSpPr>
+          <p:cNvPr id="2" name="Title 1"/>
+          <p:cNvSpPr>
+            <a:spLocks noGrp="1"/>
+          </p:cNvSpPr>
+          <p:nvPr>
+            <p:ph type="title"/>
+          </p:nvPr>
+        </p:nvSpPr>
+        <p:spPr/>
+        <p:txBody>
+          <a:bodyPr>
+            <a:normAutofit/>
+          </a:bodyPr>
+          <a:lstStyle/>
+          <a:p>
+            <a:r>
+              <a:rPr lang="en-US" dirty="0">
+                <a:latin typeface="Times New Roman" panose="02020603050405020304" pitchFamily="18" charset="0"/>
+                <a:cs typeface="Times New Roman" panose="02020603050405020304" pitchFamily="18" charset="0"/>
+              </a:rPr>
+              <a:t>Scalability Achievement</a:t>
+            </a:r>
+          </a:p>
+        </p:txBody>
+      </p:sp>
+      <p:sp>
+        <p:nvSpPr>
+          <p:cNvPr id="3" name="Content Placeholder 2"/>
+          <p:cNvSpPr>
+            <a:spLocks noGrp="1"/>
+          </p:cNvSpPr>
+          <p:nvPr>
+            <p:ph idx="1"/>
+          </p:nvPr>
+        </p:nvSpPr>
+        <p:spPr/>
+        <p:txBody>
+          <a:bodyPr>
+            <a:normAutofit/>
+          </a:bodyPr>
+          <a:lstStyle/>
+          <a:p>
+            <a:r>
+              <a:rPr lang="en-US" dirty="0">
+                <a:latin typeface="Times New Roman" panose="02020603050405020304" pitchFamily="18" charset="0"/>
+                <a:cs typeface="Times New Roman" panose="02020603050405020304" pitchFamily="18" charset="0"/>
+              </a:rPr>
+              <a:t>Transaction data is not transmitted, only micro block header and final block header containing transaction hash is transmitted</a:t>
+            </a:r>
+          </a:p>
+          <a:p>
+            <a:r>
+              <a:rPr lang="en-US" dirty="0">
+                <a:latin typeface="Times New Roman" panose="02020603050405020304" pitchFamily="18" charset="0"/>
+                <a:cs typeface="Times New Roman" panose="02020603050405020304" pitchFamily="18" charset="0"/>
+              </a:rPr>
+              <a:t>Use of EC-</a:t>
+            </a:r>
+            <a:r>
+              <a:rPr lang="en-US" dirty="0" err="1">
+                <a:latin typeface="Times New Roman" panose="02020603050405020304" pitchFamily="18" charset="0"/>
+                <a:cs typeface="Times New Roman" panose="02020603050405020304" pitchFamily="18" charset="0"/>
+              </a:rPr>
+              <a:t>Schnorr</a:t>
+            </a:r>
+            <a:r>
+              <a:rPr lang="en-US" dirty="0">
+                <a:latin typeface="Times New Roman" panose="02020603050405020304" pitchFamily="18" charset="0"/>
+                <a:cs typeface="Times New Roman" panose="02020603050405020304" pitchFamily="18" charset="0"/>
+              </a:rPr>
+              <a:t> signature algorithm achieves speed and requires less size for multi-signatures</a:t>
+            </a:r>
+          </a:p>
+          <a:p>
+            <a:r>
+              <a:rPr lang="en-US" dirty="0" err="1">
+                <a:latin typeface="Times New Roman" panose="02020603050405020304" pitchFamily="18" charset="0"/>
+                <a:cs typeface="Times New Roman" panose="02020603050405020304" pitchFamily="18" charset="0"/>
+              </a:rPr>
+              <a:t>Elastico</a:t>
+            </a:r>
+            <a:r>
+              <a:rPr lang="en-US" dirty="0">
+                <a:latin typeface="Times New Roman" panose="02020603050405020304" pitchFamily="18" charset="0"/>
+                <a:cs typeface="Times New Roman" panose="02020603050405020304" pitchFamily="18" charset="0"/>
+              </a:rPr>
+              <a:t> shows that the throughput scales up linearly in the computation capacity of the </a:t>
+            </a:r>
+            <a:r>
+              <a:rPr lang="en-US" dirty="0" smtClean="0">
+                <a:latin typeface="Times New Roman" panose="02020603050405020304" pitchFamily="18" charset="0"/>
+                <a:cs typeface="Times New Roman" panose="02020603050405020304" pitchFamily="18" charset="0"/>
+              </a:rPr>
+              <a:t>network</a:t>
+            </a:r>
+          </a:p>
+          <a:p>
+            <a:r>
+              <a:rPr lang="en-US" dirty="0" err="1" smtClean="0">
+                <a:latin typeface="Times New Roman" panose="02020603050405020304" pitchFamily="18" charset="0"/>
+                <a:cs typeface="Times New Roman" panose="02020603050405020304" pitchFamily="18" charset="0"/>
+              </a:rPr>
+              <a:t>Ziliqa</a:t>
+            </a:r>
+            <a:r>
+              <a:rPr lang="en-US" dirty="0" smtClean="0">
+                <a:latin typeface="Times New Roman" panose="02020603050405020304" pitchFamily="18" charset="0"/>
+                <a:cs typeface="Times New Roman" panose="02020603050405020304" pitchFamily="18" charset="0"/>
+              </a:rPr>
+              <a:t> believes achieving 1000X scalability of </a:t>
+            </a:r>
+            <a:r>
+              <a:rPr lang="en-US" dirty="0" err="1" smtClean="0">
+                <a:latin typeface="Times New Roman" panose="02020603050405020304" pitchFamily="18" charset="0"/>
+                <a:cs typeface="Times New Roman" panose="02020603050405020304" pitchFamily="18" charset="0"/>
+              </a:rPr>
+              <a:t>Ethereum</a:t>
+            </a:r>
+            <a:r>
+              <a:rPr lang="en-US" dirty="0" smtClean="0">
+                <a:latin typeface="Times New Roman" panose="02020603050405020304" pitchFamily="18" charset="0"/>
+                <a:cs typeface="Times New Roman" panose="02020603050405020304" pitchFamily="18" charset="0"/>
+              </a:rPr>
+              <a:t> given a network size of </a:t>
+            </a:r>
+            <a:r>
+              <a:rPr lang="en-US" dirty="0" err="1" smtClean="0">
+                <a:latin typeface="Times New Roman" panose="02020603050405020304" pitchFamily="18" charset="0"/>
+                <a:cs typeface="Times New Roman" panose="02020603050405020304" pitchFamily="18" charset="0"/>
+              </a:rPr>
+              <a:t>Ethereum</a:t>
+            </a:r>
+            <a:endParaRPr lang="en-US" dirty="0">
+              <a:latin typeface="Times New Roman" panose="02020603050405020304" pitchFamily="18" charset="0"/>
+              <a:cs typeface="Times New Roman" panose="02020603050405020304" pitchFamily="18" charset="0"/>
+            </a:endParaRPr>
+          </a:p>
+        </p:txBody>
+      </p:sp>
+    </p:spTree>
+    <p:extLst>
+      <p:ext uri="{BB962C8B-B14F-4D97-AF65-F5344CB8AC3E}">
+        <p14:creationId xmlns:p14="http://schemas.microsoft.com/office/powerpoint/2010/main" val="3159637411"/>
+      </p:ext>
+    </p:extLst>
+  </p:cSld>
+  <p:clrMapOvr>
+    <a:masterClrMapping/>
+  </p:clrMapOvr>
+</p:sld>
+</file>
+
+<file path=ppt/slides/slide23.xml><?xml version="1.0" encoding="utf-8"?>
+<p:sld xmlns:a="http://schemas.openxmlformats.org/drawingml/2006/main" xmlns:r="http://schemas.openxmlformats.org/officeDocument/2006/relationships" xmlns:p="http://schemas.openxmlformats.org/presentationml/2006/main">
+  <p:cSld>
+    <p:spTree>
+      <p:nvGrpSpPr>
+        <p:cNvPr id="1" name=""/>
+        <p:cNvGrpSpPr/>
+        <p:nvPr/>
+      </p:nvGrpSpPr>
+      <p:grpSpPr>
+        <a:xfrm>
+          <a:off x="0" y="0"/>
+          <a:ext cx="0" cy="0"/>
+          <a:chOff x="0" y="0"/>
+          <a:chExt cx="0" cy="0"/>
+        </a:xfrm>
+      </p:grpSpPr>
+      <p:sp>
+        <p:nvSpPr>
+          <p:cNvPr id="2" name="Title 1"/>
+          <p:cNvSpPr>
+            <a:spLocks noGrp="1"/>
+          </p:cNvSpPr>
+          <p:nvPr>
+            <p:ph type="title"/>
+          </p:nvPr>
+        </p:nvSpPr>
+        <p:spPr/>
+        <p:txBody>
+          <a:bodyPr>
+            <a:normAutofit/>
+          </a:bodyPr>
+          <a:lstStyle/>
+          <a:p>
+            <a:r>
+              <a:rPr lang="en-US" dirty="0">
+                <a:latin typeface="Times New Roman" panose="02020603050405020304" pitchFamily="18" charset="0"/>
+                <a:cs typeface="Times New Roman" panose="02020603050405020304" pitchFamily="18" charset="0"/>
+              </a:rPr>
+              <a:t>References Used</a:t>
+            </a:r>
+          </a:p>
+        </p:txBody>
+      </p:sp>
+      <p:sp>
+        <p:nvSpPr>
+          <p:cNvPr id="3" name="Content Placeholder 2"/>
+          <p:cNvSpPr>
+            <a:spLocks noGrp="1"/>
+          </p:cNvSpPr>
+          <p:nvPr>
+            <p:ph idx="1"/>
+          </p:nvPr>
+        </p:nvSpPr>
+        <p:spPr/>
+        <p:txBody>
+          <a:bodyPr>
+            <a:normAutofit fontScale="85000" lnSpcReduction="20000"/>
+          </a:bodyPr>
+          <a:lstStyle/>
+          <a:p>
+            <a:r>
+              <a:rPr lang="en-US" dirty="0">
+                <a:latin typeface="Times New Roman" panose="02020603050405020304" pitchFamily="18" charset="0"/>
+                <a:cs typeface="Times New Roman" panose="02020603050405020304" pitchFamily="18" charset="0"/>
+              </a:rPr>
+              <a:t>The </a:t>
+            </a:r>
+            <a:r>
+              <a:rPr lang="en-US" dirty="0" err="1">
+                <a:latin typeface="Times New Roman" panose="02020603050405020304" pitchFamily="18" charset="0"/>
+                <a:cs typeface="Times New Roman" panose="02020603050405020304" pitchFamily="18" charset="0"/>
+              </a:rPr>
+              <a:t>Ziliqa</a:t>
+            </a:r>
+            <a:r>
+              <a:rPr lang="en-US" dirty="0">
+                <a:latin typeface="Times New Roman" panose="02020603050405020304" pitchFamily="18" charset="0"/>
+                <a:cs typeface="Times New Roman" panose="02020603050405020304" pitchFamily="18" charset="0"/>
+              </a:rPr>
+              <a:t> Technical Whitepaper, </a:t>
+            </a:r>
+            <a:r>
+              <a:rPr lang="en-US" dirty="0">
+                <a:latin typeface="Times New Roman" panose="02020603050405020304" pitchFamily="18" charset="0"/>
+                <a:cs typeface="Times New Roman" panose="02020603050405020304" pitchFamily="18" charset="0"/>
+                <a:hlinkClick r:id="rId2"/>
+              </a:rPr>
+              <a:t>https://docs.zilliqa.com/whitepaper.pdf</a:t>
+            </a:r>
+            <a:endParaRPr lang="en-US" dirty="0">
+              <a:latin typeface="Times New Roman" panose="02020603050405020304" pitchFamily="18" charset="0"/>
+              <a:cs typeface="Times New Roman" panose="02020603050405020304" pitchFamily="18" charset="0"/>
+            </a:endParaRPr>
+          </a:p>
+          <a:p>
+            <a:r>
+              <a:rPr lang="en-US" dirty="0">
+                <a:latin typeface="Times New Roman" panose="02020603050405020304" pitchFamily="18" charset="0"/>
+                <a:cs typeface="Times New Roman" panose="02020603050405020304" pitchFamily="18" charset="0"/>
+              </a:rPr>
+              <a:t>CCS 2016 - A Secure </a:t>
+            </a:r>
+            <a:r>
+              <a:rPr lang="en-US" dirty="0" err="1">
+                <a:latin typeface="Times New Roman" panose="02020603050405020304" pitchFamily="18" charset="0"/>
+                <a:cs typeface="Times New Roman" panose="02020603050405020304" pitchFamily="18" charset="0"/>
+              </a:rPr>
+              <a:t>Sharding</a:t>
+            </a:r>
+            <a:r>
+              <a:rPr lang="en-US" dirty="0">
+                <a:latin typeface="Times New Roman" panose="02020603050405020304" pitchFamily="18" charset="0"/>
+                <a:cs typeface="Times New Roman" panose="02020603050405020304" pitchFamily="18" charset="0"/>
+              </a:rPr>
+              <a:t> Protocol For Open </a:t>
+            </a:r>
+            <a:r>
+              <a:rPr lang="en-US" dirty="0" err="1">
+                <a:latin typeface="Times New Roman" panose="02020603050405020304" pitchFamily="18" charset="0"/>
+                <a:cs typeface="Times New Roman" panose="02020603050405020304" pitchFamily="18" charset="0"/>
+              </a:rPr>
+              <a:t>Blockchains</a:t>
+            </a:r>
+            <a:r>
+              <a:rPr lang="en-US" dirty="0">
+                <a:latin typeface="Times New Roman" panose="02020603050405020304" pitchFamily="18" charset="0"/>
+                <a:cs typeface="Times New Roman" panose="02020603050405020304" pitchFamily="18" charset="0"/>
+              </a:rPr>
+              <a:t>, </a:t>
+            </a:r>
+            <a:r>
+              <a:rPr lang="en-US" dirty="0">
+                <a:latin typeface="Times New Roman" panose="02020603050405020304" pitchFamily="18" charset="0"/>
+                <a:cs typeface="Times New Roman" panose="02020603050405020304" pitchFamily="18" charset="0"/>
+                <a:hlinkClick r:id="rId3"/>
+              </a:rPr>
+              <a:t>https://www.youtube.com/watch?v=AlPMYyGVkRk</a:t>
+            </a:r>
+            <a:endParaRPr lang="en-US" dirty="0">
+              <a:latin typeface="Times New Roman" panose="02020603050405020304" pitchFamily="18" charset="0"/>
+              <a:cs typeface="Times New Roman" panose="02020603050405020304" pitchFamily="18" charset="0"/>
+            </a:endParaRPr>
+          </a:p>
+          <a:p>
+            <a:r>
+              <a:rPr lang="en-US" dirty="0">
+                <a:latin typeface="Times New Roman" panose="02020603050405020304" pitchFamily="18" charset="0"/>
+                <a:cs typeface="Times New Roman" panose="02020603050405020304" pitchFamily="18" charset="0"/>
+              </a:rPr>
+              <a:t>A Secure </a:t>
+            </a:r>
+            <a:r>
+              <a:rPr lang="en-US" dirty="0" err="1">
+                <a:latin typeface="Times New Roman" panose="02020603050405020304" pitchFamily="18" charset="0"/>
+                <a:cs typeface="Times New Roman" panose="02020603050405020304" pitchFamily="18" charset="0"/>
+              </a:rPr>
+              <a:t>Sharding</a:t>
+            </a:r>
+            <a:r>
+              <a:rPr lang="en-US" dirty="0">
+                <a:latin typeface="Times New Roman" panose="02020603050405020304" pitchFamily="18" charset="0"/>
+                <a:cs typeface="Times New Roman" panose="02020603050405020304" pitchFamily="18" charset="0"/>
+              </a:rPr>
+              <a:t> Protocol For Open </a:t>
+            </a:r>
+            <a:r>
+              <a:rPr lang="en-US" dirty="0" err="1">
+                <a:latin typeface="Times New Roman" panose="02020603050405020304" pitchFamily="18" charset="0"/>
+                <a:cs typeface="Times New Roman" panose="02020603050405020304" pitchFamily="18" charset="0"/>
+              </a:rPr>
+              <a:t>Blockchains</a:t>
+            </a:r>
+            <a:r>
+              <a:rPr lang="en-US" dirty="0">
+                <a:latin typeface="Times New Roman" panose="02020603050405020304" pitchFamily="18" charset="0"/>
+                <a:cs typeface="Times New Roman" panose="02020603050405020304" pitchFamily="18" charset="0"/>
+              </a:rPr>
+              <a:t>, </a:t>
+            </a:r>
+            <a:r>
+              <a:rPr lang="en-US" dirty="0">
+                <a:latin typeface="Times New Roman" panose="02020603050405020304" pitchFamily="18" charset="0"/>
+                <a:cs typeface="Times New Roman" panose="02020603050405020304" pitchFamily="18" charset="0"/>
+                <a:hlinkClick r:id="rId4"/>
+              </a:rPr>
+              <a:t>http://delivery.acm.org/10.1145/2980000/2978389/p17-luu.pdf?ip=141.223.124.8&amp;id=2978389&amp;acc=ACTIVE%20SERVICE&amp;key=0EC22F8658578FE1%2E25E83D88E716D18F%2E4D4702B0C3E38B35%2E4D4702B0C3E38B35&amp;__acm__=</a:t>
+            </a:r>
+            <a:r>
+              <a:rPr lang="en-US" dirty="0" smtClean="0">
+                <a:latin typeface="Times New Roman" panose="02020603050405020304" pitchFamily="18" charset="0"/>
+                <a:cs typeface="Times New Roman" panose="02020603050405020304" pitchFamily="18" charset="0"/>
+                <a:hlinkClick r:id="rId4"/>
+              </a:rPr>
+              <a:t>1544631713_e0a9cf3b64b146e76b8dd6a126a46c01</a:t>
+            </a:r>
+            <a:endParaRPr lang="en-US" dirty="0" smtClean="0">
+              <a:latin typeface="Times New Roman" panose="02020603050405020304" pitchFamily="18" charset="0"/>
+              <a:cs typeface="Times New Roman" panose="02020603050405020304" pitchFamily="18" charset="0"/>
+            </a:endParaRPr>
+          </a:p>
+          <a:p>
+            <a:r>
+              <a:rPr lang="en-US" dirty="0" smtClean="0">
+                <a:latin typeface="Times New Roman" panose="02020603050405020304" pitchFamily="18" charset="0"/>
+                <a:cs typeface="Times New Roman" panose="02020603050405020304" pitchFamily="18" charset="0"/>
+              </a:rPr>
+              <a:t>Unsolved Problems in </a:t>
+            </a:r>
+            <a:r>
+              <a:rPr lang="en-US" dirty="0" err="1" smtClean="0">
+                <a:latin typeface="Times New Roman" panose="02020603050405020304" pitchFamily="18" charset="0"/>
+                <a:cs typeface="Times New Roman" panose="02020603050405020304" pitchFamily="18" charset="0"/>
+              </a:rPr>
+              <a:t>Blockchain</a:t>
+            </a:r>
+            <a:r>
+              <a:rPr lang="en-US" dirty="0" smtClean="0">
+                <a:latin typeface="Times New Roman" panose="02020603050405020304" pitchFamily="18" charset="0"/>
+                <a:cs typeface="Times New Roman" panose="02020603050405020304" pitchFamily="18" charset="0"/>
+              </a:rPr>
+              <a:t> </a:t>
+            </a:r>
+            <a:r>
+              <a:rPr lang="en-US" dirty="0" err="1" smtClean="0">
+                <a:latin typeface="Times New Roman" panose="02020603050405020304" pitchFamily="18" charset="0"/>
+                <a:cs typeface="Times New Roman" panose="02020603050405020304" pitchFamily="18" charset="0"/>
+              </a:rPr>
+              <a:t>Sharding</a:t>
+            </a:r>
+            <a:r>
+              <a:rPr lang="en-US" dirty="0">
+                <a:latin typeface="Times New Roman" panose="02020603050405020304" pitchFamily="18" charset="0"/>
+                <a:cs typeface="Times New Roman" panose="02020603050405020304" pitchFamily="18" charset="0"/>
+              </a:rPr>
+              <a:t>, </a:t>
+            </a:r>
+            <a:r>
+              <a:rPr lang="en-US" dirty="0">
+                <a:latin typeface="Times New Roman" panose="02020603050405020304" pitchFamily="18" charset="0"/>
+                <a:cs typeface="Times New Roman" panose="02020603050405020304" pitchFamily="18" charset="0"/>
+                <a:hlinkClick r:id="rId5"/>
+              </a:rPr>
+              <a:t>https://</a:t>
+            </a:r>
+            <a:r>
+              <a:rPr lang="en-US" dirty="0" smtClean="0">
+                <a:latin typeface="Times New Roman" panose="02020603050405020304" pitchFamily="18" charset="0"/>
+                <a:cs typeface="Times New Roman" panose="02020603050405020304" pitchFamily="18" charset="0"/>
+                <a:hlinkClick r:id="rId5"/>
+              </a:rPr>
+              <a:t>medium.com/nearprotocol/unsolved-problems-in-blockchain-sharding-2327d6517f43</a:t>
+            </a:r>
+            <a:r>
+              <a:rPr lang="en-US" dirty="0" smtClean="0">
+                <a:latin typeface="Times New Roman" panose="02020603050405020304" pitchFamily="18" charset="0"/>
+                <a:cs typeface="Times New Roman" panose="02020603050405020304" pitchFamily="18" charset="0"/>
+              </a:rPr>
+              <a:t> </a:t>
+            </a:r>
+          </a:p>
+          <a:p>
+            <a:r>
+              <a:rPr lang="en-US" dirty="0" smtClean="0">
+                <a:latin typeface="Times New Roman" panose="02020603050405020304" pitchFamily="18" charset="0"/>
+                <a:cs typeface="Times New Roman" panose="02020603050405020304" pitchFamily="18" charset="0"/>
+              </a:rPr>
+              <a:t>The Authoritative Guide to </a:t>
+            </a:r>
+            <a:r>
+              <a:rPr lang="en-US" dirty="0" err="1" smtClean="0">
+                <a:latin typeface="Times New Roman" panose="02020603050405020304" pitchFamily="18" charset="0"/>
+                <a:cs typeface="Times New Roman" panose="02020603050405020304" pitchFamily="18" charset="0"/>
+              </a:rPr>
+              <a:t>Blockchain</a:t>
+            </a:r>
+            <a:r>
+              <a:rPr lang="en-US" dirty="0" smtClean="0">
+                <a:latin typeface="Times New Roman" panose="02020603050405020304" pitchFamily="18" charset="0"/>
+                <a:cs typeface="Times New Roman" panose="02020603050405020304" pitchFamily="18" charset="0"/>
+              </a:rPr>
+              <a:t> </a:t>
+            </a:r>
+            <a:r>
+              <a:rPr lang="en-US" dirty="0" err="1" smtClean="0">
+                <a:latin typeface="Times New Roman" panose="02020603050405020304" pitchFamily="18" charset="0"/>
+                <a:cs typeface="Times New Roman" panose="02020603050405020304" pitchFamily="18" charset="0"/>
+              </a:rPr>
+              <a:t>Sharding</a:t>
+            </a:r>
+            <a:r>
+              <a:rPr lang="en-US" dirty="0" smtClean="0">
+                <a:latin typeface="Times New Roman" panose="02020603050405020304" pitchFamily="18" charset="0"/>
+                <a:cs typeface="Times New Roman" panose="02020603050405020304" pitchFamily="18" charset="0"/>
+              </a:rPr>
+              <a:t>, Part 1</a:t>
+            </a:r>
+            <a:r>
+              <a:rPr lang="en-US" dirty="0">
+                <a:latin typeface="Times New Roman" panose="02020603050405020304" pitchFamily="18" charset="0"/>
+                <a:cs typeface="Times New Roman" panose="02020603050405020304" pitchFamily="18" charset="0"/>
+              </a:rPr>
+              <a:t>, </a:t>
+            </a:r>
+            <a:r>
+              <a:rPr lang="en-US" dirty="0">
+                <a:latin typeface="Times New Roman" panose="02020603050405020304" pitchFamily="18" charset="0"/>
+                <a:cs typeface="Times New Roman" panose="02020603050405020304" pitchFamily="18" charset="0"/>
+                <a:hlinkClick r:id="rId6"/>
+              </a:rPr>
+              <a:t>https://</a:t>
+            </a:r>
+            <a:r>
+              <a:rPr lang="en-US" dirty="0" smtClean="0">
+                <a:latin typeface="Times New Roman" panose="02020603050405020304" pitchFamily="18" charset="0"/>
+                <a:cs typeface="Times New Roman" panose="02020603050405020304" pitchFamily="18" charset="0"/>
+                <a:hlinkClick r:id="rId6"/>
+              </a:rPr>
+              <a:t>medium.com/nearprotocol/the-authoritative-guide-to-blockchain-sharding-part-1-1b53ed31e060</a:t>
+            </a:r>
+            <a:r>
+              <a:rPr lang="en-US" dirty="0" smtClean="0">
+                <a:latin typeface="Times New Roman" panose="02020603050405020304" pitchFamily="18" charset="0"/>
+                <a:cs typeface="Times New Roman" panose="02020603050405020304" pitchFamily="18" charset="0"/>
+              </a:rPr>
+              <a:t> </a:t>
+            </a:r>
+            <a:endParaRPr lang="en-US" dirty="0" smtClean="0">
+              <a:latin typeface="Times New Roman" panose="02020603050405020304" pitchFamily="18" charset="0"/>
+              <a:cs typeface="Times New Roman" panose="02020603050405020304" pitchFamily="18" charset="0"/>
+            </a:endParaRPr>
+          </a:p>
+          <a:p>
+            <a:endParaRPr lang="en-US" dirty="0" smtClean="0"/>
+          </a:p>
+          <a:p>
+            <a:endParaRPr lang="en-US" dirty="0"/>
+          </a:p>
+        </p:txBody>
+      </p:sp>
+    </p:spTree>
+    <p:extLst>
+      <p:ext uri="{BB962C8B-B14F-4D97-AF65-F5344CB8AC3E}">
+        <p14:creationId xmlns:p14="http://schemas.microsoft.com/office/powerpoint/2010/main" val="3152363338"/>
+      </p:ext>
+    </p:extLst>
+  </p:cSld>
+  <p:clrMapOvr>
+    <a:masterClrMapping/>
+  </p:clrMapOvr>
 </p:sld>
 </file>
 
@@ -5216,7 +6556,21 @@
                 <a:latin typeface="Times New Roman" panose="02020603050405020304" pitchFamily="18" charset="0"/>
                 <a:cs typeface="Times New Roman" panose="02020603050405020304" pitchFamily="18" charset="0"/>
               </a:rPr>
-              <a:t>Given n miners in the network, can tolerate </a:t>
+              <a:t>Given </a:t>
+            </a:r>
+            <a:r>
+              <a:rPr lang="en-US" i="1" dirty="0" smtClean="0">
+                <a:latin typeface="Times New Roman" panose="02020603050405020304" pitchFamily="18" charset="0"/>
+                <a:cs typeface="Times New Roman" panose="02020603050405020304" pitchFamily="18" charset="0"/>
+              </a:rPr>
+              <a:t>n</a:t>
+            </a:r>
+            <a:r>
+              <a:rPr lang="en-US" dirty="0" smtClean="0">
+                <a:latin typeface="Times New Roman" panose="02020603050405020304" pitchFamily="18" charset="0"/>
+                <a:cs typeface="Times New Roman" panose="02020603050405020304" pitchFamily="18" charset="0"/>
+              </a:rPr>
+              <a:t> miners in the network, can tolerate </a:t>
             </a:r>
             <a:r>
               <a:rPr lang="en-US" dirty="0" err="1" smtClean="0">
@@ -5444,14 +6798,21 @@
                 <a:latin typeface="Times New Roman" panose="02020603050405020304" pitchFamily="18" charset="0"/>
                 <a:cs typeface="Times New Roman" panose="02020603050405020304" pitchFamily="18" charset="0"/>
               </a:rPr>
-              <a:t>Parallelization is achieved by dividing total computational power into smaller shards or </a:t>
-            </a:r>
-            <a:r>
-              <a:rPr lang="en-US" dirty="0" smtClean="0">
-                <a:latin typeface="Times New Roman" panose="02020603050405020304" pitchFamily="18" charset="0"/>
-                <a:cs typeface="Times New Roman" panose="02020603050405020304" pitchFamily="18" charset="0"/>
-              </a:rPr>
-              <a:t> Directory Service committee, </a:t>
+              <a:t>Parallelization is achieved by dividing total computational power into smaller shards </a:t>
+            </a:r>
+            <a:r>
+              <a:rPr lang="en-US" dirty="0" smtClean="0">
+                <a:latin typeface="Times New Roman" panose="02020603050405020304" pitchFamily="18" charset="0"/>
+                <a:cs typeface="Times New Roman" panose="02020603050405020304" pitchFamily="18" charset="0"/>
+              </a:rPr>
+              <a:t>and </a:t>
+            </a:r>
+            <a:r>
+              <a:rPr lang="en-US" dirty="0" smtClean="0">
+                <a:latin typeface="Times New Roman" panose="02020603050405020304" pitchFamily="18" charset="0"/>
+                <a:cs typeface="Times New Roman" panose="02020603050405020304" pitchFamily="18" charset="0"/>
+              </a:rPr>
+              <a:t>Directory Service committee, </a:t>
             </a:r>
             <a:r>
               <a:rPr lang="en-US" dirty="0">
@@ -5481,7 +6842,21 @@
                 <a:latin typeface="Times New Roman" panose="02020603050405020304" pitchFamily="18" charset="0"/>
                 <a:cs typeface="Times New Roman" panose="02020603050405020304" pitchFamily="18" charset="0"/>
               </a:rPr>
-              <a:t>of size c, runs byzantine consensus protocol to agree on a set of </a:t>
+              <a:t>of size </a:t>
+            </a:r>
+            <a:r>
+              <a:rPr lang="en-US" i="1" dirty="0">
+                <a:latin typeface="Times New Roman" panose="02020603050405020304" pitchFamily="18" charset="0"/>
+                <a:cs typeface="Times New Roman" panose="02020603050405020304" pitchFamily="18" charset="0"/>
+              </a:rPr>
+              <a:t>c</a:t>
+            </a:r>
+            <a:r>
+              <a:rPr lang="en-US" dirty="0">
+                <a:latin typeface="Times New Roman" panose="02020603050405020304" pitchFamily="18" charset="0"/>
+                <a:cs typeface="Times New Roman" panose="02020603050405020304" pitchFamily="18" charset="0"/>
+              </a:rPr>
+              <a:t>, runs byzantine consensus protocol to agree on a set of </a:t>
             </a:r>
             <a:r>
               <a:rPr lang="en-US" dirty="0" smtClean="0">
@@ -5568,8 +6943,19 @@
                 <a:latin typeface="Times New Roman" panose="02020603050405020304" pitchFamily="18" charset="0"/>
                 <a:cs typeface="Times New Roman" panose="02020603050405020304" pitchFamily="18" charset="0"/>
               </a:rPr>
-              <a:t>proceed in epochs or rounds</a:t>
-            </a:r>
+              <a:t>proceed in </a:t>
+            </a:r>
+            <a:r>
+              <a:rPr lang="en-US" dirty="0" smtClean="0">
+                <a:latin typeface="Times New Roman" panose="02020603050405020304" pitchFamily="18" charset="0"/>
+                <a:cs typeface="Times New Roman" panose="02020603050405020304" pitchFamily="18" charset="0"/>
+              </a:rPr>
+              <a:t>epochs or rounds</a:t>
+            </a:r>
+            <a:endParaRPr lang="en-US" dirty="0">
+              <a:latin typeface="Times New Roman" panose="02020603050405020304" pitchFamily="18" charset="0"/>
+              <a:cs typeface="Times New Roman" panose="02020603050405020304" pitchFamily="18" charset="0"/>
+            </a:endParaRPr>
           </a:p>
           <a:p>
             <a:endParaRPr lang="en-US" dirty="0"/>
@@ -5880,10 +7266,6 @@
               </a:rPr>
               <a:t>…)</a:t>
             </a:r>
-            <a:endParaRPr lang="en-US" dirty="0">
-              <a:latin typeface="Times New Roman" panose="02020603050405020304" pitchFamily="18" charset="0"/>
-              <a:cs typeface="Times New Roman" panose="02020603050405020304" pitchFamily="18" charset="0"/>
-            </a:endParaRPr>
           </a:p>
         </p:txBody>
       </p:sp>
@@ -5980,14 +7362,14 @@
               <a:t> || IP || PK || nonce) &lt;= 2</a:t>
             </a:r>
             <a:r>
-              <a:rPr lang="el-GR" dirty="0">
+              <a:rPr lang="el-GR" baseline="30000" dirty="0">
                 <a:latin typeface="Times New Roman" panose="02020603050405020304" pitchFamily="18" charset="0"/>
                 <a:cs typeface="Times New Roman" panose="02020603050405020304" pitchFamily="18" charset="0"/>
               </a:rPr>
               <a:t>γ-</a:t>
             </a:r>
             <a:r>
-              <a:rPr lang="en-US" dirty="0">
+              <a:rPr lang="en-US" baseline="30000" dirty="0">
                 <a:latin typeface="Times New Roman" panose="02020603050405020304" pitchFamily="18" charset="0"/>
                 <a:cs typeface="Times New Roman" panose="02020603050405020304" pitchFamily="18" charset="0"/>
               </a:rPr>
@@ -6000,10 +7382,6 @@
               </a:rPr>
               <a:t> </a:t>
             </a:r>
-            <a:endParaRPr lang="en-US" dirty="0">
-              <a:latin typeface="Times New Roman" panose="02020603050405020304" pitchFamily="18" charset="0"/>
-              <a:cs typeface="Times New Roman" panose="02020603050405020304" pitchFamily="18" charset="0"/>
-            </a:endParaRPr>
           </a:p>
           <a:p>
             <a:pPr lvl="2"/>
@@ -6072,10 +7450,6 @@
               </a:rPr>
               <a:t>Epoch randomness prevents byzantine adversary from precomputing the hash value output before a specified time or epoch</a:t>
             </a:r>
-            <a:endParaRPr lang="en-US" dirty="0">
-              <a:latin typeface="Times New Roman" panose="02020603050405020304" pitchFamily="18" charset="0"/>
-              <a:cs typeface="Times New Roman" panose="02020603050405020304" pitchFamily="18" charset="0"/>
-            </a:endParaRPr>
           </a:p>
         </p:txBody>
       </p:sp>
@@ -6154,10 +7528,6 @@
               </a:rPr>
               <a:t>…)</a:t>
             </a:r>
-            <a:endParaRPr lang="en-US" dirty="0">
-              <a:latin typeface="Times New Roman" panose="02020603050405020304" pitchFamily="18" charset="0"/>
-              <a:cs typeface="Times New Roman" panose="02020603050405020304" pitchFamily="18" charset="0"/>
-            </a:endParaRPr>
           </a:p>
         </p:txBody>
       </p:sp>
@@ -6181,14 +7551,7 @@
                 <a:latin typeface="Times New Roman" panose="02020603050405020304" pitchFamily="18" charset="0"/>
                 <a:cs typeface="Times New Roman" panose="02020603050405020304" pitchFamily="18" charset="0"/>
               </a:rPr>
-              <a:t>Step 1: Identity Establishment and Committee </a:t>
-            </a:r>
-            <a:r>
-              <a:rPr lang="en-US" dirty="0">
-                <a:latin typeface="Times New Roman" panose="02020603050405020304" pitchFamily="18" charset="0"/>
-                <a:cs typeface="Times New Roman" panose="02020603050405020304" pitchFamily="18" charset="0"/>
-              </a:rPr>
-              <a:t>Formation (</a:t>
+              <a:t>Step 1: Identity Establishment and Committee Formation (</a:t>
             </a:r>
             <a:r>
               <a:rPr lang="en-US" dirty="0" err="1">
@@ -6222,7 +7585,21 @@
                 <a:latin typeface="Times New Roman" panose="02020603050405020304" pitchFamily="18" charset="0"/>
                 <a:cs typeface="Times New Roman" panose="02020603050405020304" pitchFamily="18" charset="0"/>
               </a:rPr>
-              <a:t>DS Committee has a fixed number of nodes and the first NO nodes to solve the </a:t>
+              <a:t>DS Committee has a fixed number of nodes and the first N</a:t>
+            </a:r>
+            <a:r>
+              <a:rPr lang="en-US" baseline="-25000" dirty="0">
+                <a:latin typeface="Times New Roman" panose="02020603050405020304" pitchFamily="18" charset="0"/>
+                <a:cs typeface="Times New Roman" panose="02020603050405020304" pitchFamily="18" charset="0"/>
+              </a:rPr>
+              <a:t>O</a:t>
+            </a:r>
+            <a:r>
+              <a:rPr lang="en-US" dirty="0">
+                <a:latin typeface="Times New Roman" panose="02020603050405020304" pitchFamily="18" charset="0"/>
+                <a:cs typeface="Times New Roman" panose="02020603050405020304" pitchFamily="18" charset="0"/>
+              </a:rPr>
+              <a:t> nodes to solve the </a:t>
             </a:r>
             <a:r>
               <a:rPr lang="en-US" dirty="0" err="1">
@@ -6367,10 +7744,6 @@
               </a:rPr>
               <a:t>…)</a:t>
             </a:r>
-            <a:endParaRPr lang="en-US" dirty="0">
-              <a:latin typeface="Times New Roman" panose="02020603050405020304" pitchFamily="18" charset="0"/>
-              <a:cs typeface="Times New Roman" panose="02020603050405020304" pitchFamily="18" charset="0"/>
-            </a:endParaRPr>
           </a:p>
         </p:txBody>
       </p:sp>
@@ -6394,14 +7767,7 @@
                 <a:latin typeface="Times New Roman" panose="02020603050405020304" pitchFamily="18" charset="0"/>
                 <a:cs typeface="Times New Roman" panose="02020603050405020304" pitchFamily="18" charset="0"/>
               </a:rPr>
-              <a:t>Step 1: Identity Establishment and Committee </a:t>
-            </a:r>
-            <a:r>
-              <a:rPr lang="en-US" dirty="0">
-                <a:latin typeface="Times New Roman" panose="02020603050405020304" pitchFamily="18" charset="0"/>
-                <a:cs typeface="Times New Roman" panose="02020603050405020304" pitchFamily="18" charset="0"/>
-              </a:rPr>
-              <a:t>Formation (</a:t>
+              <a:t>Step 1: Identity Establishment and Committee Formation (</a:t>
             </a:r>
             <a:r>
               <a:rPr lang="en-US" dirty="0" err="1">

</xml_diff>

<commit_message>
dependable computing files added
</commit_message>
<xml_diff>
--- a/CSED601 Dependable Computing/Sharding.pptx
+++ b/CSED601 Dependable Computing/Sharding.pptx
@@ -4,6 +4,9 @@
   <p:sldMasterIdLst>
     <p:sldMasterId id="2147483648" r:id="rId1"/>
   </p:sldMasterIdLst>
+  <p:notesMasterIdLst>
+    <p:notesMasterId r:id="rId25"/>
+  </p:notesMasterIdLst>
   <p:sldIdLst>
     <p:sldId id="256" r:id="rId2"/>
     <p:sldId id="257" r:id="rId3"/>
@@ -134,6 +137,356 @@
 </p:presentation>
 </file>
 
+<file path=ppt/notesMasters/notesMaster1.xml><?xml version="1.0" encoding="utf-8"?>
+<p:notesMaster xmlns:a="http://schemas.openxmlformats.org/drawingml/2006/main" xmlns:r="http://schemas.openxmlformats.org/officeDocument/2006/relationships" xmlns:p="http://schemas.openxmlformats.org/presentationml/2006/main">
+  <p:cSld>
+    <p:bg>
+      <p:bgRef idx="1001">
+        <a:schemeClr val="bg1"/>
+      </p:bgRef>
+    </p:bg>
+    <p:spTree>
+      <p:nvGrpSpPr>
+        <p:cNvPr id="1" name=""/>
+        <p:cNvGrpSpPr/>
+        <p:nvPr/>
+      </p:nvGrpSpPr>
+      <p:grpSpPr>
+        <a:xfrm>
+          <a:off x="0" y="0"/>
+          <a:ext cx="0" cy="0"/>
+          <a:chOff x="0" y="0"/>
+          <a:chExt cx="0" cy="0"/>
+        </a:xfrm>
+      </p:grpSpPr>
+      <p:sp>
+        <p:nvSpPr>
+          <p:cNvPr id="2" name="Header Placeholder 1"/>
+          <p:cNvSpPr>
+            <a:spLocks noGrp="1"/>
+          </p:cNvSpPr>
+          <p:nvPr>
+            <p:ph type="hdr" sz="quarter"/>
+          </p:nvPr>
+        </p:nvSpPr>
+        <p:spPr>
+          <a:xfrm>
+            <a:off x="0" y="0"/>
+            <a:ext cx="2971800" cy="458788"/>
+          </a:xfrm>
+          <a:prstGeom prst="rect">
+            <a:avLst/>
+          </a:prstGeom>
+        </p:spPr>
+        <p:txBody>
+          <a:bodyPr vert="horz" lIns="91440" tIns="45720" rIns="91440" bIns="45720" rtlCol="0"/>
+          <a:lstStyle>
+            <a:lvl1pPr algn="l">
+              <a:defRPr sz="1200"/>
+            </a:lvl1pPr>
+          </a:lstStyle>
+          <a:p>
+            <a:endParaRPr lang="en-US"/>
+          </a:p>
+        </p:txBody>
+      </p:sp>
+      <p:sp>
+        <p:nvSpPr>
+          <p:cNvPr id="3" name="Date Placeholder 2"/>
+          <p:cNvSpPr>
+            <a:spLocks noGrp="1"/>
+          </p:cNvSpPr>
+          <p:nvPr>
+            <p:ph type="dt" idx="1"/>
+          </p:nvPr>
+        </p:nvSpPr>
+        <p:spPr>
+          <a:xfrm>
+            <a:off x="3884613" y="0"/>
+            <a:ext cx="2971800" cy="458788"/>
+          </a:xfrm>
+          <a:prstGeom prst="rect">
+            <a:avLst/>
+          </a:prstGeom>
+        </p:spPr>
+        <p:txBody>
+          <a:bodyPr vert="horz" lIns="91440" tIns="45720" rIns="91440" bIns="45720" rtlCol="0"/>
+          <a:lstStyle>
+            <a:lvl1pPr algn="r">
+              <a:defRPr sz="1200"/>
+            </a:lvl1pPr>
+          </a:lstStyle>
+          <a:p>
+            <a:fld id="{E71955E2-F026-41A5-8F88-532454386AEB}" type="datetimeFigureOut">
+              <a:rPr lang="en-US" smtClean="0"/>
+              <a:t>12/19/2018</a:t>
+            </a:fld>
+            <a:endParaRPr lang="en-US"/>
+          </a:p>
+        </p:txBody>
+      </p:sp>
+      <p:sp>
+        <p:nvSpPr>
+          <p:cNvPr id="4" name="Slide Image Placeholder 3"/>
+          <p:cNvSpPr>
+            <a:spLocks noGrp="1" noRot="1" noChangeAspect="1"/>
+          </p:cNvSpPr>
+          <p:nvPr>
+            <p:ph type="sldImg" idx="2"/>
+          </p:nvPr>
+        </p:nvSpPr>
+        <p:spPr>
+          <a:xfrm>
+            <a:off x="685800" y="1143000"/>
+            <a:ext cx="5486400" cy="3086100"/>
+          </a:xfrm>
+          <a:prstGeom prst="rect">
+            <a:avLst/>
+          </a:prstGeom>
+          <a:noFill/>
+          <a:ln w="12700">
+            <a:solidFill>
+              <a:prstClr val="black"/>
+            </a:solidFill>
+          </a:ln>
+        </p:spPr>
+        <p:txBody>
+          <a:bodyPr vert="horz" lIns="91440" tIns="45720" rIns="91440" bIns="45720" rtlCol="0" anchor="ctr"/>
+          <a:lstStyle/>
+          <a:p>
+            <a:endParaRPr lang="en-US"/>
+          </a:p>
+        </p:txBody>
+      </p:sp>
+      <p:sp>
+        <p:nvSpPr>
+          <p:cNvPr id="5" name="Notes Placeholder 4"/>
+          <p:cNvSpPr>
+            <a:spLocks noGrp="1"/>
+          </p:cNvSpPr>
+          <p:nvPr>
+            <p:ph type="body" sz="quarter" idx="3"/>
+          </p:nvPr>
+        </p:nvSpPr>
+        <p:spPr>
+          <a:xfrm>
+            <a:off x="685800" y="4400550"/>
+            <a:ext cx="5486400" cy="3600450"/>
+          </a:xfrm>
+          <a:prstGeom prst="rect">
+            <a:avLst/>
+          </a:prstGeom>
+        </p:spPr>
+        <p:txBody>
+          <a:bodyPr vert="horz" lIns="91440" tIns="45720" rIns="91440" bIns="45720" rtlCol="0"/>
+          <a:lstStyle/>
+          <a:p>
+            <a:pPr lvl="0"/>
+            <a:r>
+              <a:rPr lang="en-US" smtClean="0"/>
+              <a:t>Edit Master text styles</a:t>
+            </a:r>
+          </a:p>
+          <a:p>
+            <a:pPr lvl="1"/>
+            <a:r>
+              <a:rPr lang="en-US" smtClean="0"/>
+              <a:t>Second level</a:t>
+            </a:r>
+          </a:p>
+          <a:p>
+            <a:pPr lvl="2"/>
+            <a:r>
+              <a:rPr lang="en-US" smtClean="0"/>
+              <a:t>Third level</a:t>
+            </a:r>
+          </a:p>
+          <a:p>
+            <a:pPr lvl="3"/>
+            <a:r>
+              <a:rPr lang="en-US" smtClean="0"/>
+              <a:t>Fourth level</a:t>
+            </a:r>
+          </a:p>
+          <a:p>
+            <a:pPr lvl="4"/>
+            <a:r>
+              <a:rPr lang="en-US" smtClean="0"/>
+              <a:t>Fifth level</a:t>
+            </a:r>
+            <a:endParaRPr lang="en-US"/>
+          </a:p>
+        </p:txBody>
+      </p:sp>
+      <p:sp>
+        <p:nvSpPr>
+          <p:cNvPr id="6" name="Footer Placeholder 5"/>
+          <p:cNvSpPr>
+            <a:spLocks noGrp="1"/>
+          </p:cNvSpPr>
+          <p:nvPr>
+            <p:ph type="ftr" sz="quarter" idx="4"/>
+          </p:nvPr>
+        </p:nvSpPr>
+        <p:spPr>
+          <a:xfrm>
+            <a:off x="0" y="8685213"/>
+            <a:ext cx="2971800" cy="458787"/>
+          </a:xfrm>
+          <a:prstGeom prst="rect">
+            <a:avLst/>
+          </a:prstGeom>
+        </p:spPr>
+        <p:txBody>
+          <a:bodyPr vert="horz" lIns="91440" tIns="45720" rIns="91440" bIns="45720" rtlCol="0" anchor="b"/>
+          <a:lstStyle>
+            <a:lvl1pPr algn="l">
+              <a:defRPr sz="1200"/>
+            </a:lvl1pPr>
+          </a:lstStyle>
+          <a:p>
+            <a:endParaRPr lang="en-US"/>
+          </a:p>
+        </p:txBody>
+      </p:sp>
+      <p:sp>
+        <p:nvSpPr>
+          <p:cNvPr id="7" name="Slide Number Placeholder 6"/>
+          <p:cNvSpPr>
+            <a:spLocks noGrp="1"/>
+          </p:cNvSpPr>
+          <p:nvPr>
+            <p:ph type="sldNum" sz="quarter" idx="5"/>
+          </p:nvPr>
+        </p:nvSpPr>
+        <p:spPr>
+          <a:xfrm>
+            <a:off x="3884613" y="8685213"/>
+            <a:ext cx="2971800" cy="458787"/>
+          </a:xfrm>
+          <a:prstGeom prst="rect">
+            <a:avLst/>
+          </a:prstGeom>
+        </p:spPr>
+        <p:txBody>
+          <a:bodyPr vert="horz" lIns="91440" tIns="45720" rIns="91440" bIns="45720" rtlCol="0" anchor="b"/>
+          <a:lstStyle>
+            <a:lvl1pPr algn="r">
+              <a:defRPr sz="1200"/>
+            </a:lvl1pPr>
+          </a:lstStyle>
+          <a:p>
+            <a:fld id="{997099CB-D9CD-4FBC-B2B1-2282C8E32971}" type="slidenum">
+              <a:rPr lang="en-US" smtClean="0"/>
+              <a:t>‹#›</a:t>
+            </a:fld>
+            <a:endParaRPr lang="en-US"/>
+          </a:p>
+        </p:txBody>
+      </p:sp>
+    </p:spTree>
+    <p:extLst>
+      <p:ext uri="{BB962C8B-B14F-4D97-AF65-F5344CB8AC3E}">
+        <p14:creationId xmlns:p14="http://schemas.microsoft.com/office/powerpoint/2010/main" val="3739683255"/>
+      </p:ext>
+    </p:extLst>
+  </p:cSld>
+  <p:clrMap bg1="lt1" tx1="dk1" bg2="lt2" tx2="dk2" accent1="accent1" accent2="accent2" accent3="accent3" accent4="accent4" accent5="accent5" accent6="accent6" hlink="hlink" folHlink="folHlink"/>
+  <p:notesStyle>
+    <a:lvl1pPr marL="0" algn="l" defTabSz="914400" rtl="0" eaLnBrk="1" latinLnBrk="0" hangingPunct="1">
+      <a:defRPr sz="1200" kern="1200">
+        <a:solidFill>
+          <a:schemeClr val="tx1"/>
+        </a:solidFill>
+        <a:latin typeface="+mn-lt"/>
+        <a:ea typeface="+mn-ea"/>
+        <a:cs typeface="+mn-cs"/>
+      </a:defRPr>
+    </a:lvl1pPr>
+    <a:lvl2pPr marL="457200" algn="l" defTabSz="914400" rtl="0" eaLnBrk="1" latinLnBrk="0" hangingPunct="1">
+      <a:defRPr sz="1200" kern="1200">
+        <a:solidFill>
+          <a:schemeClr val="tx1"/>
+        </a:solidFill>
+        <a:latin typeface="+mn-lt"/>
+        <a:ea typeface="+mn-ea"/>
+        <a:cs typeface="+mn-cs"/>
+      </a:defRPr>
+    </a:lvl2pPr>
+    <a:lvl3pPr marL="914400" algn="l" defTabSz="914400" rtl="0" eaLnBrk="1" latinLnBrk="0" hangingPunct="1">
+      <a:defRPr sz="1200" kern="1200">
+        <a:solidFill>
+          <a:schemeClr val="tx1"/>
+        </a:solidFill>
+        <a:latin typeface="+mn-lt"/>
+        <a:ea typeface="+mn-ea"/>
+        <a:cs typeface="+mn-cs"/>
+      </a:defRPr>
+    </a:lvl3pPr>
+    <a:lvl4pPr marL="1371600" algn="l" defTabSz="914400" rtl="0" eaLnBrk="1" latinLnBrk="0" hangingPunct="1">
+      <a:defRPr sz="1200" kern="1200">
+        <a:solidFill>
+          <a:schemeClr val="tx1"/>
+        </a:solidFill>
+        <a:latin typeface="+mn-lt"/>
+        <a:ea typeface="+mn-ea"/>
+        <a:cs typeface="+mn-cs"/>
+      </a:defRPr>
+    </a:lvl4pPr>
+    <a:lvl5pPr marL="1828800" algn="l" defTabSz="914400" rtl="0" eaLnBrk="1" latinLnBrk="0" hangingPunct="1">
+      <a:defRPr sz="1200" kern="1200">
+        <a:solidFill>
+          <a:schemeClr val="tx1"/>
+        </a:solidFill>
+        <a:latin typeface="+mn-lt"/>
+        <a:ea typeface="+mn-ea"/>
+        <a:cs typeface="+mn-cs"/>
+      </a:defRPr>
+    </a:lvl5pPr>
+    <a:lvl6pPr marL="2286000" algn="l" defTabSz="914400" rtl="0" eaLnBrk="1" latinLnBrk="0" hangingPunct="1">
+      <a:defRPr sz="1200" kern="1200">
+        <a:solidFill>
+          <a:schemeClr val="tx1"/>
+        </a:solidFill>
+        <a:latin typeface="+mn-lt"/>
+        <a:ea typeface="+mn-ea"/>
+        <a:cs typeface="+mn-cs"/>
+      </a:defRPr>
+    </a:lvl6pPr>
+    <a:lvl7pPr marL="2743200" algn="l" defTabSz="914400" rtl="0" eaLnBrk="1" latinLnBrk="0" hangingPunct="1">
+      <a:defRPr sz="1200" kern="1200">
+        <a:solidFill>
+          <a:schemeClr val="tx1"/>
+        </a:solidFill>
+        <a:latin typeface="+mn-lt"/>
+        <a:ea typeface="+mn-ea"/>
+        <a:cs typeface="+mn-cs"/>
+      </a:defRPr>
+    </a:lvl7pPr>
+    <a:lvl8pPr marL="3200400" algn="l" defTabSz="914400" rtl="0" eaLnBrk="1" latinLnBrk="0" hangingPunct="1">
+      <a:defRPr sz="1200" kern="1200">
+        <a:solidFill>
+          <a:schemeClr val="tx1"/>
+        </a:solidFill>
+        <a:latin typeface="+mn-lt"/>
+        <a:ea typeface="+mn-ea"/>
+        <a:cs typeface="+mn-cs"/>
+      </a:defRPr>
+    </a:lvl8pPr>
+    <a:lvl9pPr marL="3657600" algn="l" defTabSz="914400" rtl="0" eaLnBrk="1" latinLnBrk="0" hangingPunct="1">
+      <a:defRPr sz="1200" kern="1200">
+        <a:solidFill>
+          <a:schemeClr val="tx1"/>
+        </a:solidFill>
+        <a:latin typeface="+mn-lt"/>
+        <a:ea typeface="+mn-ea"/>
+        <a:cs typeface="+mn-cs"/>
+      </a:defRPr>
+    </a:lvl9pPr>
+  </p:notesStyle>
+</p:notesMaster>
+</file>
+
 <file path=ppt/slideLayouts/slideLayout1.xml><?xml version="1.0" encoding="utf-8"?>
 <p:sldLayout xmlns:a="http://schemas.openxmlformats.org/drawingml/2006/main" xmlns:r="http://schemas.openxmlformats.org/officeDocument/2006/relationships" xmlns:p="http://schemas.openxmlformats.org/presentationml/2006/main" type="title" preserve="1">
   <p:cSld name="Title Slide">
@@ -263,9 +616,9 @@
           <a:bodyPr/>
           <a:lstStyle/>
           <a:p>
-            <a:fld id="{FC8C056E-3350-485A-AE5D-D46551D329A7}" type="datetimeFigureOut">
-              <a:rPr lang="en-US" smtClean="0"/>
-              <a:t>12/18/2018</a:t>
+            <a:fld id="{250CFAA1-FCAF-4781-AA0B-A1ABD754423C}" type="datetime1">
+              <a:rPr lang="en-US" smtClean="0"/>
+              <a:t>12/19/2018</a:t>
             </a:fld>
             <a:endParaRPr lang="en-US"/>
           </a:p>
@@ -433,9 +786,9 @@
           <a:bodyPr/>
           <a:lstStyle/>
           <a:p>
-            <a:fld id="{FC8C056E-3350-485A-AE5D-D46551D329A7}" type="datetimeFigureOut">
-              <a:rPr lang="en-US" smtClean="0"/>
-              <a:t>12/18/2018</a:t>
+            <a:fld id="{01F1ABB2-486F-49DC-A29A-745FCE5CAFFA}" type="datetime1">
+              <a:rPr lang="en-US" smtClean="0"/>
+              <a:t>12/19/2018</a:t>
             </a:fld>
             <a:endParaRPr lang="en-US"/>
           </a:p>
@@ -613,9 +966,9 @@
           <a:bodyPr/>
           <a:lstStyle/>
           <a:p>
-            <a:fld id="{FC8C056E-3350-485A-AE5D-D46551D329A7}" type="datetimeFigureOut">
-              <a:rPr lang="en-US" smtClean="0"/>
-              <a:t>12/18/2018</a:t>
+            <a:fld id="{127C9336-CB85-4998-8EF4-8CFA41EC6D7B}" type="datetime1">
+              <a:rPr lang="en-US" smtClean="0"/>
+              <a:t>12/19/2018</a:t>
             </a:fld>
             <a:endParaRPr lang="en-US"/>
           </a:p>
@@ -783,9 +1136,9 @@
           <a:bodyPr/>
           <a:lstStyle/>
           <a:p>
-            <a:fld id="{FC8C056E-3350-485A-AE5D-D46551D329A7}" type="datetimeFigureOut">
-              <a:rPr lang="en-US" smtClean="0"/>
-              <a:t>12/18/2018</a:t>
+            <a:fld id="{E4615B4D-2C7B-46F6-8CD7-A269EA7813E5}" type="datetime1">
+              <a:rPr lang="en-US" smtClean="0"/>
+              <a:t>12/19/2018</a:t>
             </a:fld>
             <a:endParaRPr lang="en-US"/>
           </a:p>
@@ -1029,9 +1382,9 @@
           <a:bodyPr/>
           <a:lstStyle/>
           <a:p>
-            <a:fld id="{FC8C056E-3350-485A-AE5D-D46551D329A7}" type="datetimeFigureOut">
-              <a:rPr lang="en-US" smtClean="0"/>
-              <a:t>12/18/2018</a:t>
+            <a:fld id="{64471729-38BB-481E-9BD5-B7E08EB8C4F0}" type="datetime1">
+              <a:rPr lang="en-US" smtClean="0"/>
+              <a:t>12/19/2018</a:t>
             </a:fld>
             <a:endParaRPr lang="en-US"/>
           </a:p>
@@ -1261,9 +1614,9 @@
           <a:bodyPr/>
           <a:lstStyle/>
           <a:p>
-            <a:fld id="{FC8C056E-3350-485A-AE5D-D46551D329A7}" type="datetimeFigureOut">
-              <a:rPr lang="en-US" smtClean="0"/>
-              <a:t>12/18/2018</a:t>
+            <a:fld id="{CC434228-E960-40F6-8457-8605E5D5AEFD}" type="datetime1">
+              <a:rPr lang="en-US" smtClean="0"/>
+              <a:t>12/19/2018</a:t>
             </a:fld>
             <a:endParaRPr lang="en-US"/>
           </a:p>
@@ -1628,9 +1981,9 @@
           <a:bodyPr/>
           <a:lstStyle/>
           <a:p>
-            <a:fld id="{FC8C056E-3350-485A-AE5D-D46551D329A7}" type="datetimeFigureOut">
-              <a:rPr lang="en-US" smtClean="0"/>
-              <a:t>12/18/2018</a:t>
+            <a:fld id="{DA16D916-DB28-4B19-B296-48B1EF5E5482}" type="datetime1">
+              <a:rPr lang="en-US" smtClean="0"/>
+              <a:t>12/19/2018</a:t>
             </a:fld>
             <a:endParaRPr lang="en-US"/>
           </a:p>
@@ -1746,9 +2099,9 @@
           <a:bodyPr/>
           <a:lstStyle/>
           <a:p>
-            <a:fld id="{FC8C056E-3350-485A-AE5D-D46551D329A7}" type="datetimeFigureOut">
-              <a:rPr lang="en-US" smtClean="0"/>
-              <a:t>12/18/2018</a:t>
+            <a:fld id="{4B012F54-5D3A-4EA2-B586-114CF2919AD8}" type="datetime1">
+              <a:rPr lang="en-US" smtClean="0"/>
+              <a:t>12/19/2018</a:t>
             </a:fld>
             <a:endParaRPr lang="en-US"/>
           </a:p>
@@ -1841,9 +2194,9 @@
           <a:bodyPr/>
           <a:lstStyle/>
           <a:p>
-            <a:fld id="{FC8C056E-3350-485A-AE5D-D46551D329A7}" type="datetimeFigureOut">
-              <a:rPr lang="en-US" smtClean="0"/>
-              <a:t>12/18/2018</a:t>
+            <a:fld id="{9AB5F31A-5E0E-44B2-8D98-2797EBCC3BC8}" type="datetime1">
+              <a:rPr lang="en-US" smtClean="0"/>
+              <a:t>12/19/2018</a:t>
             </a:fld>
             <a:endParaRPr lang="en-US"/>
           </a:p>
@@ -2118,9 +2471,9 @@
           <a:bodyPr/>
           <a:lstStyle/>
           <a:p>
-            <a:fld id="{FC8C056E-3350-485A-AE5D-D46551D329A7}" type="datetimeFigureOut">
-              <a:rPr lang="en-US" smtClean="0"/>
-              <a:t>12/18/2018</a:t>
+            <a:fld id="{326D9B9C-FDFE-4067-B5B6-568031FF1FB8}" type="datetime1">
+              <a:rPr lang="en-US" smtClean="0"/>
+              <a:t>12/19/2018</a:t>
             </a:fld>
             <a:endParaRPr lang="en-US"/>
           </a:p>
@@ -2371,9 +2724,9 @@
           <a:bodyPr/>
           <a:lstStyle/>
           <a:p>
-            <a:fld id="{FC8C056E-3350-485A-AE5D-D46551D329A7}" type="datetimeFigureOut">
-              <a:rPr lang="en-US" smtClean="0"/>
-              <a:t>12/18/2018</a:t>
+            <a:fld id="{2CF280D7-0422-48BC-B89E-B672F392B708}" type="datetime1">
+              <a:rPr lang="en-US" smtClean="0"/>
+              <a:t>12/19/2018</a:t>
             </a:fld>
             <a:endParaRPr lang="en-US"/>
           </a:p>
@@ -2584,9 +2937,9 @@
             </a:lvl1pPr>
           </a:lstStyle>
           <a:p>
-            <a:fld id="{FC8C056E-3350-485A-AE5D-D46551D329A7}" type="datetimeFigureOut">
-              <a:rPr lang="en-US" smtClean="0"/>
-              <a:t>12/18/2018</a:t>
+            <a:fld id="{41A134E8-A152-44CE-8640-5277550E4148}" type="datetime1">
+              <a:rPr lang="en-US" smtClean="0"/>
+              <a:t>12/19/2018</a:t>
             </a:fld>
             <a:endParaRPr lang="en-US"/>
           </a:p>
@@ -2691,6 +3044,7 @@
     <p:sldLayoutId id="2147483658" r:id="rId10"/>
     <p:sldLayoutId id="2147483659" r:id="rId11"/>
   </p:sldLayoutIdLst>
+  <p:hf hdr="0" ftr="0" dt="0"/>
   <p:txStyles>
     <p:titleStyle>
       <a:lvl1pPr algn="l" defTabSz="914400" rtl="0" eaLnBrk="1" latinLnBrk="0" hangingPunct="1">
@@ -3124,6 +3478,29 @@
           </a:p>
         </p:txBody>
       </p:sp>
+      <p:sp>
+        <p:nvSpPr>
+          <p:cNvPr id="4" name="Slide Number Placeholder 3"/>
+          <p:cNvSpPr>
+            <a:spLocks noGrp="1"/>
+          </p:cNvSpPr>
+          <p:nvPr>
+            <p:ph type="sldNum" sz="quarter" idx="12"/>
+          </p:nvPr>
+        </p:nvSpPr>
+        <p:spPr/>
+        <p:txBody>
+          <a:bodyPr/>
+          <a:lstStyle/>
+          <a:p>
+            <a:fld id="{E620486B-7F68-4355-9947-6125B76F9A8E}" type="slidenum">
+              <a:rPr lang="en-US" smtClean="0"/>
+              <a:t>1</a:t>
+            </a:fld>
+            <a:endParaRPr lang="en-US"/>
+          </a:p>
+        </p:txBody>
+      </p:sp>
     </p:spTree>
     <p:extLst>
       <p:ext uri="{BB962C8B-B14F-4D97-AF65-F5344CB8AC3E}">
@@ -3246,21 +3623,7 @@
                 <a:latin typeface="Times New Roman" panose="02020603050405020304" pitchFamily="18" charset="0"/>
                 <a:cs typeface="Times New Roman" panose="02020603050405020304" pitchFamily="18" charset="0"/>
               </a:rPr>
-              <a:t>Completion </a:t>
-            </a:r>
-            <a:r>
-              <a:rPr lang="en-US" dirty="0">
-                <a:latin typeface="Times New Roman" panose="02020603050405020304" pitchFamily="18" charset="0"/>
-                <a:cs typeface="Times New Roman" panose="02020603050405020304" pitchFamily="18" charset="0"/>
-              </a:rPr>
-              <a:t>of</a:t>
-            </a:r>
-            <a:r>
-              <a:rPr lang="en-US" dirty="0">
-                <a:latin typeface="Times New Roman" panose="02020603050405020304" pitchFamily="18" charset="0"/>
-                <a:cs typeface="Times New Roman" panose="02020603050405020304" pitchFamily="18" charset="0"/>
-              </a:rPr>
-              <a:t> DS Committee elections -&gt; Regular Nodes/Miner nodes elected</a:t>
+              <a:t>Completion of DS Committee elections -&gt; Regular Nodes/Miner nodes elected</a:t>
             </a:r>
           </a:p>
           <a:p>
@@ -3301,6 +3664,65 @@
           </a:prstGeom>
         </p:spPr>
       </p:pic>
+      <p:sp>
+        <p:nvSpPr>
+          <p:cNvPr id="4" name="Slide Number Placeholder 3"/>
+          <p:cNvSpPr>
+            <a:spLocks noGrp="1"/>
+          </p:cNvSpPr>
+          <p:nvPr>
+            <p:ph type="sldNum" sz="quarter" idx="12"/>
+          </p:nvPr>
+        </p:nvSpPr>
+        <p:spPr/>
+        <p:txBody>
+          <a:bodyPr/>
+          <a:lstStyle/>
+          <a:p>
+            <a:fld id="{E620486B-7F68-4355-9947-6125B76F9A8E}" type="slidenum">
+              <a:rPr lang="en-US" smtClean="0"/>
+              <a:t>10</a:t>
+            </a:fld>
+            <a:endParaRPr lang="en-US"/>
+          </a:p>
+        </p:txBody>
+      </p:sp>
+      <p:sp>
+        <p:nvSpPr>
+          <p:cNvPr id="6" name="TextBox 5"/>
+          <p:cNvSpPr txBox="1"/>
+          <p:nvPr/>
+        </p:nvSpPr>
+        <p:spPr>
+          <a:xfrm>
+            <a:off x="4200352" y="6007686"/>
+            <a:ext cx="3780074" cy="338554"/>
+          </a:xfrm>
+          <a:prstGeom prst="rect">
+            <a:avLst/>
+          </a:prstGeom>
+          <a:noFill/>
+        </p:spPr>
+        <p:txBody>
+          <a:bodyPr wrap="none" rtlCol="0">
+            <a:spAutoFit/>
+          </a:bodyPr>
+          <a:lstStyle/>
+          <a:p>
+            <a:r>
+              <a:rPr lang="en-US" sz="1600" dirty="0" smtClean="0">
+                <a:latin typeface="Times New Roman" panose="02020603050405020304" pitchFamily="18" charset="0"/>
+                <a:cs typeface="Times New Roman" panose="02020603050405020304" pitchFamily="18" charset="0"/>
+              </a:rPr>
+              <a:t>Fig 2. Algorithm for shard member election</a:t>
+            </a:r>
+            <a:endParaRPr lang="en-US" sz="1600" dirty="0">
+              <a:latin typeface="Times New Roman" panose="02020603050405020304" pitchFamily="18" charset="0"/>
+              <a:cs typeface="Times New Roman" panose="02020603050405020304" pitchFamily="18" charset="0"/>
+            </a:endParaRPr>
+          </a:p>
+        </p:txBody>
+      </p:sp>
     </p:spTree>
     <p:extLst>
       <p:ext uri="{BB962C8B-B14F-4D97-AF65-F5344CB8AC3E}">
@@ -3399,14 +3821,7 @@
                 <a:latin typeface="Times New Roman" panose="02020603050405020304" pitchFamily="18" charset="0"/>
                 <a:cs typeface="Times New Roman" panose="02020603050405020304" pitchFamily="18" charset="0"/>
               </a:rPr>
-              <a:t>Step </a:t>
-            </a:r>
-            <a:r>
-              <a:rPr lang="en-US" dirty="0">
-                <a:latin typeface="Times New Roman" panose="02020603050405020304" pitchFamily="18" charset="0"/>
-                <a:cs typeface="Times New Roman" panose="02020603050405020304" pitchFamily="18" charset="0"/>
-              </a:rPr>
-              <a:t>2: Shard Assignment</a:t>
+              <a:t>Step 2: Shard Assignment</a:t>
             </a:r>
           </a:p>
           <a:p>
@@ -3440,7 +3855,24 @@
                 <a:latin typeface="Times New Roman" panose="02020603050405020304" pitchFamily="18" charset="0"/>
                 <a:cs typeface="Times New Roman" panose="02020603050405020304" pitchFamily="18" charset="0"/>
               </a:rPr>
-              <a:t>Compare nonce values of </a:t>
+              <a:t>Compare </a:t>
+            </a:r>
+            <a:r>
+              <a:rPr lang="en-US" sz="2400" dirty="0">
+                <a:solidFill>
+                  <a:srgbClr val="FF0000"/>
+                </a:solidFill>
+                <a:latin typeface="Times New Roman" panose="02020603050405020304" pitchFamily="18" charset="0"/>
+                <a:cs typeface="Times New Roman" panose="02020603050405020304" pitchFamily="18" charset="0"/>
+              </a:rPr>
+              <a:t>nonce values</a:t>
+            </a:r>
+            <a:r>
+              <a:rPr lang="en-US" sz="2400" dirty="0">
+                <a:latin typeface="Times New Roman" panose="02020603050405020304" pitchFamily="18" charset="0"/>
+                <a:cs typeface="Times New Roman" panose="02020603050405020304" pitchFamily="18" charset="0"/>
+              </a:rPr>
+              <a:t> of </a:t>
             </a:r>
             <a:r>
               <a:rPr lang="en-US" sz="2400" dirty="0" err="1">
@@ -3492,10 +3924,23 @@
                 <a:latin typeface="Times New Roman" panose="02020603050405020304" pitchFamily="18" charset="0"/>
                 <a:cs typeface="Times New Roman" panose="02020603050405020304" pitchFamily="18" charset="0"/>
               </a:rPr>
-              <a:t>different shards, use last </a:t>
+              <a:t>different shards, use </a:t>
+            </a:r>
+            <a:r>
+              <a:rPr lang="en-US" sz="2400" dirty="0">
+                <a:solidFill>
+                  <a:srgbClr val="FF0000"/>
+                </a:solidFill>
+                <a:latin typeface="Times New Roman" panose="02020603050405020304" pitchFamily="18" charset="0"/>
+                <a:cs typeface="Times New Roman" panose="02020603050405020304" pitchFamily="18" charset="0"/>
+              </a:rPr>
+              <a:t>last </a:t>
             </a:r>
             <a:r>
               <a:rPr lang="en-US" sz="2400" dirty="0" smtClean="0">
+                <a:solidFill>
+                  <a:srgbClr val="FF0000"/>
+                </a:solidFill>
                 <a:latin typeface="Times New Roman" panose="02020603050405020304" pitchFamily="18" charset="0"/>
                 <a:cs typeface="Times New Roman" panose="02020603050405020304" pitchFamily="18" charset="0"/>
               </a:rPr>
@@ -3503,10 +3948,20 @@
             </a:r>
             <a:r>
               <a:rPr lang="en-US" sz="2400" dirty="0">
-                <a:latin typeface="Times New Roman" panose="02020603050405020304" pitchFamily="18" charset="0"/>
-                <a:cs typeface="Times New Roman" panose="02020603050405020304" pitchFamily="18" charset="0"/>
-              </a:rPr>
-              <a:t>of H to assign to different shard</a:t>
+                <a:solidFill>
+                  <a:srgbClr val="FF0000"/>
+                </a:solidFill>
+                <a:latin typeface="Times New Roman" panose="02020603050405020304" pitchFamily="18" charset="0"/>
+                <a:cs typeface="Times New Roman" panose="02020603050405020304" pitchFamily="18" charset="0"/>
+              </a:rPr>
+              <a:t>of H</a:t>
+            </a:r>
+            <a:r>
+              <a:rPr lang="en-US" sz="2400" dirty="0">
+                <a:latin typeface="Times New Roman" panose="02020603050405020304" pitchFamily="18" charset="0"/>
+                <a:cs typeface="Times New Roman" panose="02020603050405020304" pitchFamily="18" charset="0"/>
+              </a:rPr>
+              <a:t> to assign to different shard</a:t>
             </a:r>
           </a:p>
           <a:p>
@@ -3540,6 +3995,29 @@
           <a:p>
             <a:pPr lvl="1"/>
             <a:endParaRPr lang="en-US" dirty="0" smtClean="0"/>
+          </a:p>
+        </p:txBody>
+      </p:sp>
+      <p:sp>
+        <p:nvSpPr>
+          <p:cNvPr id="4" name="Slide Number Placeholder 3"/>
+          <p:cNvSpPr>
+            <a:spLocks noGrp="1"/>
+          </p:cNvSpPr>
+          <p:nvPr>
+            <p:ph type="sldNum" sz="quarter" idx="12"/>
+          </p:nvPr>
+        </p:nvSpPr>
+        <p:spPr/>
+        <p:txBody>
+          <a:bodyPr/>
+          <a:lstStyle/>
+          <a:p>
+            <a:fld id="{E620486B-7F68-4355-9947-6125B76F9A8E}" type="slidenum">
+              <a:rPr lang="en-US" smtClean="0"/>
+              <a:t>11</a:t>
+            </a:fld>
+            <a:endParaRPr lang="en-US"/>
           </a:p>
         </p:txBody>
       </p:sp>
@@ -3658,20 +4136,40 @@
             <a:pPr lvl="2"/>
             <a:r>
               <a:rPr lang="en-US" sz="2400" dirty="0">
-                <a:latin typeface="Times New Roman" panose="02020603050405020304" pitchFamily="18" charset="0"/>
-                <a:cs typeface="Times New Roman" panose="02020603050405020304" pitchFamily="18" charset="0"/>
-              </a:rPr>
-              <a:t>Identities and connection information of DS Nodes</a:t>
+                <a:solidFill>
+                  <a:srgbClr val="FF0000"/>
+                </a:solidFill>
+                <a:latin typeface="Times New Roman" panose="02020603050405020304" pitchFamily="18" charset="0"/>
+                <a:cs typeface="Times New Roman" panose="02020603050405020304" pitchFamily="18" charset="0"/>
+              </a:rPr>
+              <a:t>Identities</a:t>
+            </a:r>
+            <a:r>
+              <a:rPr lang="en-US" sz="2400" dirty="0">
+                <a:latin typeface="Times New Roman" panose="02020603050405020304" pitchFamily="18" charset="0"/>
+                <a:cs typeface="Times New Roman" panose="02020603050405020304" pitchFamily="18" charset="0"/>
+              </a:rPr>
+              <a:t> and connection information of DS Nodes</a:t>
             </a:r>
           </a:p>
           <a:p>
             <a:pPr lvl="2"/>
             <a:r>
               <a:rPr lang="en-US" sz="2400" dirty="0">
-                <a:latin typeface="Times New Roman" panose="02020603050405020304" pitchFamily="18" charset="0"/>
-                <a:cs typeface="Times New Roman" panose="02020603050405020304" pitchFamily="18" charset="0"/>
-              </a:rPr>
-              <a:t>List of selected nodes in each shard</a:t>
+                <a:solidFill>
+                  <a:srgbClr val="FF0000"/>
+                </a:solidFill>
+                <a:latin typeface="Times New Roman" panose="02020603050405020304" pitchFamily="18" charset="0"/>
+                <a:cs typeface="Times New Roman" panose="02020603050405020304" pitchFamily="18" charset="0"/>
+              </a:rPr>
+              <a:t>List of selected nodes </a:t>
+            </a:r>
+            <a:r>
+              <a:rPr lang="en-US" sz="2400" dirty="0">
+                <a:latin typeface="Times New Roman" panose="02020603050405020304" pitchFamily="18" charset="0"/>
+                <a:cs typeface="Times New Roman" panose="02020603050405020304" pitchFamily="18" charset="0"/>
+              </a:rPr>
+              <a:t>in each shard</a:t>
             </a:r>
           </a:p>
           <a:p>
@@ -3695,6 +4193,9 @@
             <a:pPr lvl="3"/>
             <a:r>
               <a:rPr lang="en-US" sz="2400" dirty="0">
+                <a:solidFill>
+                  <a:srgbClr val="FF0000"/>
+                </a:solidFill>
                 <a:latin typeface="Times New Roman" panose="02020603050405020304" pitchFamily="18" charset="0"/>
                 <a:cs typeface="Times New Roman" panose="02020603050405020304" pitchFamily="18" charset="0"/>
               </a:rPr>
@@ -3736,7 +4237,24 @@
                 <a:latin typeface="Times New Roman" panose="02020603050405020304" pitchFamily="18" charset="0"/>
                 <a:cs typeface="Times New Roman" panose="02020603050405020304" pitchFamily="18" charset="0"/>
               </a:rPr>
-              <a:t>different shards, use the rightmost s-bits of the sender address to determine which shard stores the transaction</a:t>
+              <a:t>different shards, use the </a:t>
+            </a:r>
+            <a:r>
+              <a:rPr lang="en-US" sz="2400" dirty="0">
+                <a:solidFill>
+                  <a:srgbClr val="FF0000"/>
+                </a:solidFill>
+                <a:latin typeface="Times New Roman" panose="02020603050405020304" pitchFamily="18" charset="0"/>
+                <a:cs typeface="Times New Roman" panose="02020603050405020304" pitchFamily="18" charset="0"/>
+              </a:rPr>
+              <a:t>rightmost s-bits of the sender address </a:t>
+            </a:r>
+            <a:r>
+              <a:rPr lang="en-US" sz="2400" dirty="0">
+                <a:latin typeface="Times New Roman" panose="02020603050405020304" pitchFamily="18" charset="0"/>
+                <a:cs typeface="Times New Roman" panose="02020603050405020304" pitchFamily="18" charset="0"/>
+              </a:rPr>
+              <a:t>to determine which shard stores the transaction</a:t>
             </a:r>
           </a:p>
           <a:p>
@@ -3760,6 +4278,29 @@
           <a:p>
             <a:pPr lvl="1"/>
             <a:endParaRPr lang="en-US" dirty="0" smtClean="0"/>
+          </a:p>
+        </p:txBody>
+      </p:sp>
+      <p:sp>
+        <p:nvSpPr>
+          <p:cNvPr id="4" name="Slide Number Placeholder 3"/>
+          <p:cNvSpPr>
+            <a:spLocks noGrp="1"/>
+          </p:cNvSpPr>
+          <p:nvPr>
+            <p:ph type="sldNum" sz="quarter" idx="12"/>
+          </p:nvPr>
+        </p:nvSpPr>
+        <p:spPr/>
+        <p:txBody>
+          <a:bodyPr/>
+          <a:lstStyle/>
+          <a:p>
+            <a:fld id="{E620486B-7F68-4355-9947-6125B76F9A8E}" type="slidenum">
+              <a:rPr lang="en-US" smtClean="0"/>
+              <a:t>12</a:t>
+            </a:fld>
+            <a:endParaRPr lang="en-US"/>
           </a:p>
         </p:txBody>
       </p:sp>
@@ -3895,7 +4436,17 @@
                 <a:latin typeface="Times New Roman" panose="02020603050405020304" pitchFamily="18" charset="0"/>
                 <a:cs typeface="Times New Roman" panose="02020603050405020304" pitchFamily="18" charset="0"/>
               </a:rPr>
-              <a:t>Transactions are collected by nodes in a shard and sent to shard leader</a:t>
+              <a:t>Transactions are collected by nodes in a shard and sent to </a:t>
+            </a:r>
+            <a:r>
+              <a:rPr lang="en-US" dirty="0">
+                <a:solidFill>
+                  <a:srgbClr val="FF0000"/>
+                </a:solidFill>
+                <a:latin typeface="Times New Roman" panose="02020603050405020304" pitchFamily="18" charset="0"/>
+                <a:cs typeface="Times New Roman" panose="02020603050405020304" pitchFamily="18" charset="0"/>
+              </a:rPr>
+              <a:t>shard leader</a:t>
             </a:r>
           </a:p>
           <a:p>
@@ -3909,6 +4460,9 @@
             </a:r>
             <a:r>
               <a:rPr lang="en-US" dirty="0" err="1">
+                <a:solidFill>
+                  <a:srgbClr val="FF0000"/>
+                </a:solidFill>
                 <a:latin typeface="Times New Roman" panose="02020603050405020304" pitchFamily="18" charset="0"/>
                 <a:cs typeface="Times New Roman" panose="02020603050405020304" pitchFamily="18" charset="0"/>
               </a:rPr>
@@ -3957,6 +4511,9 @@
             </a:r>
             <a:r>
               <a:rPr lang="en-US" dirty="0" err="1">
+                <a:solidFill>
+                  <a:srgbClr val="FF0000"/>
+                </a:solidFill>
                 <a:latin typeface="Times New Roman" panose="02020603050405020304" pitchFamily="18" charset="0"/>
                 <a:cs typeface="Times New Roman" panose="02020603050405020304" pitchFamily="18" charset="0"/>
               </a:rPr>
@@ -3964,10 +4521,20 @@
             </a:r>
             <a:r>
               <a:rPr lang="en-US" dirty="0">
-                <a:latin typeface="Times New Roman" panose="02020603050405020304" pitchFamily="18" charset="0"/>
-                <a:cs typeface="Times New Roman" panose="02020603050405020304" pitchFamily="18" charset="0"/>
-              </a:rPr>
-              <a:t> headers (containing </a:t>
+                <a:solidFill>
+                  <a:srgbClr val="FF0000"/>
+                </a:solidFill>
+                <a:latin typeface="Times New Roman" panose="02020603050405020304" pitchFamily="18" charset="0"/>
+                <a:cs typeface="Times New Roman" panose="02020603050405020304" pitchFamily="18" charset="0"/>
+              </a:rPr>
+              <a:t> headers</a:t>
+            </a:r>
+            <a:r>
+              <a:rPr lang="en-US" dirty="0">
+                <a:latin typeface="Times New Roman" panose="02020603050405020304" pitchFamily="18" charset="0"/>
+                <a:cs typeface="Times New Roman" panose="02020603050405020304" pitchFamily="18" charset="0"/>
+              </a:rPr>
+              <a:t> (containing </a:t>
             </a:r>
             <a:r>
               <a:rPr lang="en-US" dirty="0" err="1">
@@ -3981,12 +4548,52 @@
                 <a:latin typeface="Times New Roman" panose="02020603050405020304" pitchFamily="18" charset="0"/>
                 <a:cs typeface="Times New Roman" panose="02020603050405020304" pitchFamily="18" charset="0"/>
               </a:rPr>
-              <a:t> hash) and Bitmap (signifies multi-signatures) sent to few DS Nodes by leader</a:t>
+              <a:t> hash) and </a:t>
+            </a:r>
+            <a:r>
+              <a:rPr lang="en-US" dirty="0">
+                <a:solidFill>
+                  <a:srgbClr val="FF0000"/>
+                </a:solidFill>
+                <a:latin typeface="Times New Roman" panose="02020603050405020304" pitchFamily="18" charset="0"/>
+                <a:cs typeface="Times New Roman" panose="02020603050405020304" pitchFamily="18" charset="0"/>
+              </a:rPr>
+              <a:t>Bitmap</a:t>
+            </a:r>
+            <a:r>
+              <a:rPr lang="en-US" dirty="0">
+                <a:latin typeface="Times New Roman" panose="02020603050405020304" pitchFamily="18" charset="0"/>
+                <a:cs typeface="Times New Roman" panose="02020603050405020304" pitchFamily="18" charset="0"/>
+              </a:rPr>
+              <a:t> (signifies multi-signatures) sent to few DS Nodes by leader</a:t>
             </a:r>
           </a:p>
           <a:p>
             <a:pPr lvl="1"/>
             <a:endParaRPr lang="en-US" dirty="0"/>
+          </a:p>
+        </p:txBody>
+      </p:sp>
+      <p:sp>
+        <p:nvSpPr>
+          <p:cNvPr id="4" name="Slide Number Placeholder 3"/>
+          <p:cNvSpPr>
+            <a:spLocks noGrp="1"/>
+          </p:cNvSpPr>
+          <p:nvPr>
+            <p:ph type="sldNum" sz="quarter" idx="12"/>
+          </p:nvPr>
+        </p:nvSpPr>
+        <p:spPr/>
+        <p:txBody>
+          <a:bodyPr/>
+          <a:lstStyle/>
+          <a:p>
+            <a:fld id="{E620486B-7F68-4355-9947-6125B76F9A8E}" type="slidenum">
+              <a:rPr lang="en-US" smtClean="0"/>
+              <a:t>13</a:t>
+            </a:fld>
+            <a:endParaRPr lang="en-US"/>
           </a:p>
         </p:txBody>
       </p:sp>
@@ -4129,7 +4736,24 @@
                 <a:latin typeface="Times New Roman" panose="02020603050405020304" pitchFamily="18" charset="0"/>
                 <a:cs typeface="Times New Roman" panose="02020603050405020304" pitchFamily="18" charset="0"/>
               </a:rPr>
-              <a:t> and combines them to generate Final Block header and proceeds to consensus</a:t>
+              <a:t> and combines them to generate </a:t>
+            </a:r>
+            <a:r>
+              <a:rPr lang="en-US" dirty="0">
+                <a:solidFill>
+                  <a:srgbClr val="FF0000"/>
+                </a:solidFill>
+                <a:latin typeface="Times New Roman" panose="02020603050405020304" pitchFamily="18" charset="0"/>
+                <a:cs typeface="Times New Roman" panose="02020603050405020304" pitchFamily="18" charset="0"/>
+              </a:rPr>
+              <a:t>Final Block</a:t>
+            </a:r>
+            <a:r>
+              <a:rPr lang="en-US" dirty="0">
+                <a:latin typeface="Times New Roman" panose="02020603050405020304" pitchFamily="18" charset="0"/>
+                <a:cs typeface="Times New Roman" panose="02020603050405020304" pitchFamily="18" charset="0"/>
+              </a:rPr>
+              <a:t> header and proceeds to consensus</a:t>
             </a:r>
           </a:p>
           <a:p>
@@ -4149,7 +4773,41 @@
                 <a:latin typeface="Times New Roman" panose="02020603050405020304" pitchFamily="18" charset="0"/>
                 <a:cs typeface="Times New Roman" panose="02020603050405020304" pitchFamily="18" charset="0"/>
               </a:rPr>
-              <a:t>Leader builds Bitmap and Final Block header and sends </a:t>
+              <a:t>Leader builds </a:t>
+            </a:r>
+            <a:r>
+              <a:rPr lang="en-US" dirty="0">
+                <a:solidFill>
+                  <a:srgbClr val="FF0000"/>
+                </a:solidFill>
+                <a:latin typeface="Times New Roman" panose="02020603050405020304" pitchFamily="18" charset="0"/>
+                <a:cs typeface="Times New Roman" panose="02020603050405020304" pitchFamily="18" charset="0"/>
+              </a:rPr>
+              <a:t>Bitmap</a:t>
+            </a:r>
+            <a:r>
+              <a:rPr lang="en-US" dirty="0">
+                <a:latin typeface="Times New Roman" panose="02020603050405020304" pitchFamily="18" charset="0"/>
+                <a:cs typeface="Times New Roman" panose="02020603050405020304" pitchFamily="18" charset="0"/>
+              </a:rPr>
+              <a:t> and </a:t>
+            </a:r>
+            <a:r>
+              <a:rPr lang="en-US" dirty="0">
+                <a:solidFill>
+                  <a:srgbClr val="FF0000"/>
+                </a:solidFill>
+                <a:latin typeface="Times New Roman" panose="02020603050405020304" pitchFamily="18" charset="0"/>
+                <a:cs typeface="Times New Roman" panose="02020603050405020304" pitchFamily="18" charset="0"/>
+              </a:rPr>
+              <a:t>Final Block</a:t>
+            </a:r>
+            <a:r>
+              <a:rPr lang="en-US" dirty="0">
+                <a:latin typeface="Times New Roman" panose="02020603050405020304" pitchFamily="18" charset="0"/>
+                <a:cs typeface="Times New Roman" panose="02020603050405020304" pitchFamily="18" charset="0"/>
+              </a:rPr>
+              <a:t> header and sends </a:t>
             </a:r>
             <a:r>
               <a:rPr lang="en-US" dirty="0" smtClean="0">
@@ -4165,6 +4823,29 @@
               </a:rPr>
               <a:t>in each shard</a:t>
             </a:r>
+          </a:p>
+        </p:txBody>
+      </p:sp>
+      <p:sp>
+        <p:nvSpPr>
+          <p:cNvPr id="4" name="Slide Number Placeholder 3"/>
+          <p:cNvSpPr>
+            <a:spLocks noGrp="1"/>
+          </p:cNvSpPr>
+          <p:nvPr>
+            <p:ph type="sldNum" sz="quarter" idx="12"/>
+          </p:nvPr>
+        </p:nvSpPr>
+        <p:spPr/>
+        <p:txBody>
+          <a:bodyPr/>
+          <a:lstStyle/>
+          <a:p>
+            <a:fld id="{E620486B-7F68-4355-9947-6125B76F9A8E}" type="slidenum">
+              <a:rPr lang="en-US" smtClean="0"/>
+              <a:t>14</a:t>
+            </a:fld>
+            <a:endParaRPr lang="en-US"/>
           </a:p>
         </p:txBody>
       </p:sp>
@@ -4269,7 +4950,24 @@
                 <a:latin typeface="Times New Roman" panose="02020603050405020304" pitchFamily="18" charset="0"/>
                 <a:cs typeface="Times New Roman" panose="02020603050405020304" pitchFamily="18" charset="0"/>
               </a:rPr>
-              <a:t>Nodes in each shard confirm the signature in Bitmap against DS Nodes in the public channel</a:t>
+              <a:t>Nodes in each shard </a:t>
+            </a:r>
+            <a:r>
+              <a:rPr lang="en-US" dirty="0">
+                <a:solidFill>
+                  <a:srgbClr val="FF0000"/>
+                </a:solidFill>
+                <a:latin typeface="Times New Roman" panose="02020603050405020304" pitchFamily="18" charset="0"/>
+                <a:cs typeface="Times New Roman" panose="02020603050405020304" pitchFamily="18" charset="0"/>
+              </a:rPr>
+              <a:t>confirm the signature</a:t>
+            </a:r>
+            <a:r>
+              <a:rPr lang="en-US" dirty="0">
+                <a:latin typeface="Times New Roman" panose="02020603050405020304" pitchFamily="18" charset="0"/>
+                <a:cs typeface="Times New Roman" panose="02020603050405020304" pitchFamily="18" charset="0"/>
+              </a:rPr>
+              <a:t> in Bitmap against DS Nodes in the public channel</a:t>
             </a:r>
           </a:p>
           <a:p>
@@ -4296,6 +4994,9 @@
             <a:pPr lvl="2"/>
             <a:r>
               <a:rPr lang="en-US" sz="2400" dirty="0">
+                <a:solidFill>
+                  <a:srgbClr val="FF0000"/>
+                </a:solidFill>
                 <a:latin typeface="Times New Roman" panose="02020603050405020304" pitchFamily="18" charset="0"/>
                 <a:cs typeface="Times New Roman" panose="02020603050405020304" pitchFamily="18" charset="0"/>
               </a:rPr>
@@ -4303,6 +5004,9 @@
             </a:r>
             <a:r>
               <a:rPr lang="en-US" sz="2400" dirty="0" smtClean="0">
+                <a:solidFill>
+                  <a:srgbClr val="FF0000"/>
+                </a:solidFill>
                 <a:latin typeface="Times New Roman" panose="02020603050405020304" pitchFamily="18" charset="0"/>
                 <a:cs typeface="Times New Roman" panose="02020603050405020304" pitchFamily="18" charset="0"/>
               </a:rPr>
@@ -4310,31 +5014,27 @@
             </a:r>
             <a:r>
               <a:rPr lang="en-US" sz="2400" dirty="0">
-                <a:latin typeface="Times New Roman" panose="02020603050405020304" pitchFamily="18" charset="0"/>
-                <a:cs typeface="Times New Roman" panose="02020603050405020304" pitchFamily="18" charset="0"/>
-              </a:rPr>
-              <a:t>Global States are updated </a:t>
+                <a:solidFill>
+                  <a:srgbClr val="FF0000"/>
+                </a:solidFill>
+                <a:latin typeface="Times New Roman" panose="02020603050405020304" pitchFamily="18" charset="0"/>
+                <a:cs typeface="Times New Roman" panose="02020603050405020304" pitchFamily="18" charset="0"/>
+              </a:rPr>
+              <a:t>Global States</a:t>
+            </a:r>
+            <a:r>
+              <a:rPr lang="en-US" sz="2400" dirty="0">
+                <a:latin typeface="Times New Roman" panose="02020603050405020304" pitchFamily="18" charset="0"/>
+                <a:cs typeface="Times New Roman" panose="02020603050405020304" pitchFamily="18" charset="0"/>
+              </a:rPr>
+              <a:t> are </a:t>
             </a:r>
             <a:r>
               <a:rPr lang="en-US" sz="2400" dirty="0" smtClean="0">
                 <a:latin typeface="Times New Roman" panose="02020603050405020304" pitchFamily="18" charset="0"/>
                 <a:cs typeface="Times New Roman" panose="02020603050405020304" pitchFamily="18" charset="0"/>
               </a:rPr>
-              <a:t>(State </a:t>
-            </a:r>
-            <a:r>
-              <a:rPr lang="en-US" sz="2400" dirty="0" err="1" smtClean="0">
-                <a:latin typeface="Times New Roman" panose="02020603050405020304" pitchFamily="18" charset="0"/>
-                <a:cs typeface="Times New Roman" panose="02020603050405020304" pitchFamily="18" charset="0"/>
-              </a:rPr>
-              <a:t>Sharding</a:t>
-            </a:r>
-            <a:r>
-              <a:rPr lang="en-US" sz="2400" dirty="0" smtClean="0">
-                <a:latin typeface="Times New Roman" panose="02020603050405020304" pitchFamily="18" charset="0"/>
-                <a:cs typeface="Times New Roman" panose="02020603050405020304" pitchFamily="18" charset="0"/>
-              </a:rPr>
-              <a:t>)</a:t>
+              <a:t>updated</a:t>
             </a:r>
             <a:endParaRPr lang="en-US" sz="2400" dirty="0">
               <a:latin typeface="Times New Roman" panose="02020603050405020304" pitchFamily="18" charset="0"/>
@@ -4348,8 +5048,48 @@
                 <a:latin typeface="Times New Roman" panose="02020603050405020304" pitchFamily="18" charset="0"/>
                 <a:cs typeface="Times New Roman" panose="02020603050405020304" pitchFamily="18" charset="0"/>
               </a:rPr>
-              <a:t>At the end of each epoch some random value is generated to prevent malicious nodes from pre-computing hash values</a:t>
-            </a:r>
+              <a:t>At the end of each epoch </a:t>
+            </a:r>
+            <a:r>
+              <a:rPr lang="en-US" dirty="0">
+                <a:solidFill>
+                  <a:srgbClr val="FF0000"/>
+                </a:solidFill>
+                <a:latin typeface="Times New Roman" panose="02020603050405020304" pitchFamily="18" charset="0"/>
+                <a:cs typeface="Times New Roman" panose="02020603050405020304" pitchFamily="18" charset="0"/>
+              </a:rPr>
+              <a:t>some random value is generated</a:t>
+            </a:r>
+            <a:r>
+              <a:rPr lang="en-US" dirty="0">
+                <a:latin typeface="Times New Roman" panose="02020603050405020304" pitchFamily="18" charset="0"/>
+                <a:cs typeface="Times New Roman" panose="02020603050405020304" pitchFamily="18" charset="0"/>
+              </a:rPr>
+              <a:t> to prevent malicious nodes from pre-computing hash values</a:t>
+            </a:r>
+          </a:p>
+        </p:txBody>
+      </p:sp>
+      <p:sp>
+        <p:nvSpPr>
+          <p:cNvPr id="4" name="Slide Number Placeholder 3"/>
+          <p:cNvSpPr>
+            <a:spLocks noGrp="1"/>
+          </p:cNvSpPr>
+          <p:nvPr>
+            <p:ph type="sldNum" sz="quarter" idx="12"/>
+          </p:nvPr>
+        </p:nvSpPr>
+        <p:spPr/>
+        <p:txBody>
+          <a:bodyPr/>
+          <a:lstStyle/>
+          <a:p>
+            <a:fld id="{E620486B-7F68-4355-9947-6125B76F9A8E}" type="slidenum">
+              <a:rPr lang="en-US" smtClean="0"/>
+              <a:t>15</a:t>
+            </a:fld>
+            <a:endParaRPr lang="en-US"/>
           </a:p>
         </p:txBody>
       </p:sp>
@@ -4407,6 +5147,123 @@
               </a:rPr>
               <a:t>Leader Change</a:t>
             </a:r>
+          </a:p>
+        </p:txBody>
+      </p:sp>
+      <p:sp>
+        <p:nvSpPr>
+          <p:cNvPr id="3" name="Content Placeholder 2"/>
+          <p:cNvSpPr>
+            <a:spLocks noGrp="1"/>
+          </p:cNvSpPr>
+          <p:nvPr>
+            <p:ph idx="1"/>
+          </p:nvPr>
+        </p:nvSpPr>
+        <p:spPr/>
+        <p:txBody>
+          <a:bodyPr>
+            <a:normAutofit/>
+          </a:bodyPr>
+          <a:lstStyle/>
+          <a:p>
+            <a:r>
+              <a:rPr lang="en-US" dirty="0">
+                <a:latin typeface="Times New Roman" panose="02020603050405020304" pitchFamily="18" charset="0"/>
+                <a:cs typeface="Times New Roman" panose="02020603050405020304" pitchFamily="18" charset="0"/>
+              </a:rPr>
+              <a:t>Byzantine leader can intentionally drop or delay messages from honest nodes</a:t>
+            </a:r>
+          </a:p>
+          <a:p>
+            <a:r>
+              <a:rPr lang="en-US" dirty="0">
+                <a:solidFill>
+                  <a:srgbClr val="FF0000"/>
+                </a:solidFill>
+                <a:latin typeface="Times New Roman" panose="02020603050405020304" pitchFamily="18" charset="0"/>
+                <a:cs typeface="Times New Roman" panose="02020603050405020304" pitchFamily="18" charset="0"/>
+              </a:rPr>
+              <a:t>Periodically change leader</a:t>
+            </a:r>
+            <a:r>
+              <a:rPr lang="en-US" dirty="0">
+                <a:latin typeface="Times New Roman" panose="02020603050405020304" pitchFamily="18" charset="0"/>
+                <a:cs typeface="Times New Roman" panose="02020603050405020304" pitchFamily="18" charset="0"/>
+              </a:rPr>
+              <a:t> of each shard and DS committee</a:t>
+            </a:r>
+          </a:p>
+          <a:p>
+            <a:r>
+              <a:rPr lang="en-US" dirty="0">
+                <a:latin typeface="Times New Roman" panose="02020603050405020304" pitchFamily="18" charset="0"/>
+                <a:cs typeface="Times New Roman" panose="02020603050405020304" pitchFamily="18" charset="0"/>
+              </a:rPr>
+              <a:t>Leader of each shard is changed after every micro block</a:t>
+            </a:r>
+          </a:p>
+          <a:p>
+            <a:r>
+              <a:rPr lang="en-US" dirty="0">
+                <a:latin typeface="Times New Roman" panose="02020603050405020304" pitchFamily="18" charset="0"/>
+                <a:cs typeface="Times New Roman" panose="02020603050405020304" pitchFamily="18" charset="0"/>
+              </a:rPr>
+              <a:t>Leader of the DS Committee is changed after every final </a:t>
+            </a:r>
+            <a:r>
+              <a:rPr lang="en-US" dirty="0" smtClean="0">
+                <a:latin typeface="Times New Roman" panose="02020603050405020304" pitchFamily="18" charset="0"/>
+                <a:cs typeface="Times New Roman" panose="02020603050405020304" pitchFamily="18" charset="0"/>
+              </a:rPr>
+              <a:t>block</a:t>
+            </a:r>
+          </a:p>
+          <a:p>
+            <a:r>
+              <a:rPr lang="en-US" dirty="0" smtClean="0">
+                <a:latin typeface="Times New Roman" panose="02020603050405020304" pitchFamily="18" charset="0"/>
+                <a:cs typeface="Times New Roman" panose="02020603050405020304" pitchFamily="18" charset="0"/>
+              </a:rPr>
+              <a:t>If size of DS consensus group is </a:t>
+            </a:r>
+            <a:r>
+              <a:rPr lang="en-US" i="1" dirty="0" smtClean="0">
+                <a:latin typeface="Times New Roman" panose="02020603050405020304" pitchFamily="18" charset="0"/>
+                <a:cs typeface="Times New Roman" panose="02020603050405020304" pitchFamily="18" charset="0"/>
+              </a:rPr>
+              <a:t>n</a:t>
+            </a:r>
+            <a:r>
+              <a:rPr lang="en-US" dirty="0" smtClean="0">
+                <a:latin typeface="Times New Roman" panose="02020603050405020304" pitchFamily="18" charset="0"/>
+                <a:cs typeface="Times New Roman" panose="02020603050405020304" pitchFamily="18" charset="0"/>
+              </a:rPr>
+              <a:t>, then epoch lasts for generation of </a:t>
+            </a:r>
+            <a:r>
+              <a:rPr lang="en-US" i="1" dirty="0" smtClean="0">
+                <a:latin typeface="Times New Roman" panose="02020603050405020304" pitchFamily="18" charset="0"/>
+                <a:cs typeface="Times New Roman" panose="02020603050405020304" pitchFamily="18" charset="0"/>
+              </a:rPr>
+              <a:t>n</a:t>
+            </a:r>
+            <a:r>
+              <a:rPr lang="en-US" dirty="0" smtClean="0">
+                <a:latin typeface="Times New Roman" panose="02020603050405020304" pitchFamily="18" charset="0"/>
+                <a:cs typeface="Times New Roman" panose="02020603050405020304" pitchFamily="18" charset="0"/>
+              </a:rPr>
+              <a:t> final blocks with leader change after every final block</a:t>
+            </a:r>
+          </a:p>
+          <a:p>
+            <a:r>
+              <a:rPr lang="en-US" dirty="0" smtClean="0">
+                <a:latin typeface="Times New Roman" panose="02020603050405020304" pitchFamily="18" charset="0"/>
+                <a:cs typeface="Times New Roman" panose="02020603050405020304" pitchFamily="18" charset="0"/>
+              </a:rPr>
+              <a:t>Each final block consists of 1 micro-block from each shard</a:t>
+            </a:r>
             <a:endParaRPr lang="en-US" dirty="0">
               <a:latin typeface="Times New Roman" panose="02020603050405020304" pitchFamily="18" charset="0"/>
               <a:cs typeface="Times New Roman" panose="02020603050405020304" pitchFamily="18" charset="0"/>
@@ -4416,112 +5273,24 @@
       </p:sp>
       <p:sp>
         <p:nvSpPr>
-          <p:cNvPr id="3" name="Content Placeholder 2"/>
-          <p:cNvSpPr>
-            <a:spLocks noGrp="1"/>
-          </p:cNvSpPr>
-          <p:nvPr>
-            <p:ph idx="1"/>
-          </p:nvPr>
-        </p:nvSpPr>
-        <p:spPr/>
-        <p:txBody>
-          <a:bodyPr>
-            <a:normAutofit/>
-          </a:bodyPr>
-          <a:lstStyle/>
-          <a:p>
-            <a:r>
-              <a:rPr lang="en-US" dirty="0">
-                <a:latin typeface="Times New Roman" panose="02020603050405020304" pitchFamily="18" charset="0"/>
-                <a:cs typeface="Times New Roman" panose="02020603050405020304" pitchFamily="18" charset="0"/>
-              </a:rPr>
-              <a:t>Byzantine leader can intentionally drop or delay messages from honest nodes</a:t>
-            </a:r>
-          </a:p>
-          <a:p>
-            <a:r>
-              <a:rPr lang="en-US" dirty="0">
-                <a:latin typeface="Times New Roman" panose="02020603050405020304" pitchFamily="18" charset="0"/>
-                <a:cs typeface="Times New Roman" panose="02020603050405020304" pitchFamily="18" charset="0"/>
-              </a:rPr>
-              <a:t>Periodically change leader of each shard and DS committee</a:t>
-            </a:r>
-          </a:p>
-          <a:p>
-            <a:r>
-              <a:rPr lang="en-US" dirty="0">
-                <a:latin typeface="Times New Roman" panose="02020603050405020304" pitchFamily="18" charset="0"/>
-                <a:cs typeface="Times New Roman" panose="02020603050405020304" pitchFamily="18" charset="0"/>
-              </a:rPr>
-              <a:t>Leader of each shard is changed after every micro block</a:t>
-            </a:r>
-          </a:p>
-          <a:p>
-            <a:r>
-              <a:rPr lang="en-US" dirty="0">
-                <a:latin typeface="Times New Roman" panose="02020603050405020304" pitchFamily="18" charset="0"/>
-                <a:cs typeface="Times New Roman" panose="02020603050405020304" pitchFamily="18" charset="0"/>
-              </a:rPr>
-              <a:t>Leader of the DS Committee is changed after every final </a:t>
-            </a:r>
-            <a:r>
-              <a:rPr lang="en-US" dirty="0" smtClean="0">
-                <a:latin typeface="Times New Roman" panose="02020603050405020304" pitchFamily="18" charset="0"/>
-                <a:cs typeface="Times New Roman" panose="02020603050405020304" pitchFamily="18" charset="0"/>
-              </a:rPr>
-              <a:t>block</a:t>
-            </a:r>
-          </a:p>
-          <a:p>
-            <a:r>
-              <a:rPr lang="en-US" dirty="0" smtClean="0">
-                <a:latin typeface="Times New Roman" panose="02020603050405020304" pitchFamily="18" charset="0"/>
-                <a:cs typeface="Times New Roman" panose="02020603050405020304" pitchFamily="18" charset="0"/>
-              </a:rPr>
-              <a:t>If size of DS consensus group is </a:t>
-            </a:r>
-            <a:r>
-              <a:rPr lang="en-US" i="1" dirty="0" smtClean="0">
-                <a:latin typeface="Times New Roman" panose="02020603050405020304" pitchFamily="18" charset="0"/>
-                <a:cs typeface="Times New Roman" panose="02020603050405020304" pitchFamily="18" charset="0"/>
-              </a:rPr>
-              <a:t>n</a:t>
-            </a:r>
-            <a:r>
-              <a:rPr lang="en-US" dirty="0" smtClean="0">
-                <a:latin typeface="Times New Roman" panose="02020603050405020304" pitchFamily="18" charset="0"/>
-                <a:cs typeface="Times New Roman" panose="02020603050405020304" pitchFamily="18" charset="0"/>
-              </a:rPr>
-              <a:t>, then epoch lasts for generation of </a:t>
-            </a:r>
-            <a:r>
-              <a:rPr lang="en-US" i="1" dirty="0" smtClean="0">
-                <a:latin typeface="Times New Roman" panose="02020603050405020304" pitchFamily="18" charset="0"/>
-                <a:cs typeface="Times New Roman" panose="02020603050405020304" pitchFamily="18" charset="0"/>
-              </a:rPr>
-              <a:t>n</a:t>
-            </a:r>
-            <a:r>
-              <a:rPr lang="en-US" dirty="0" smtClean="0">
-                <a:latin typeface="Times New Roman" panose="02020603050405020304" pitchFamily="18" charset="0"/>
-                <a:cs typeface="Times New Roman" panose="02020603050405020304" pitchFamily="18" charset="0"/>
-              </a:rPr>
-              <a:t> final blocks with leader change after every final block</a:t>
-            </a:r>
-          </a:p>
-          <a:p>
-            <a:r>
-              <a:rPr lang="en-US" dirty="0" smtClean="0">
-                <a:latin typeface="Times New Roman" panose="02020603050405020304" pitchFamily="18" charset="0"/>
-                <a:cs typeface="Times New Roman" panose="02020603050405020304" pitchFamily="18" charset="0"/>
-              </a:rPr>
-              <a:t>Each final block consists of 1 micro-block from each shard</a:t>
-            </a:r>
-            <a:endParaRPr lang="en-US" dirty="0">
-              <a:latin typeface="Times New Roman" panose="02020603050405020304" pitchFamily="18" charset="0"/>
-              <a:cs typeface="Times New Roman" panose="02020603050405020304" pitchFamily="18" charset="0"/>
-            </a:endParaRPr>
+          <p:cNvPr id="4" name="Slide Number Placeholder 3"/>
+          <p:cNvSpPr>
+            <a:spLocks noGrp="1"/>
+          </p:cNvSpPr>
+          <p:nvPr>
+            <p:ph type="sldNum" sz="quarter" idx="12"/>
+          </p:nvPr>
+        </p:nvSpPr>
+        <p:spPr/>
+        <p:txBody>
+          <a:bodyPr/>
+          <a:lstStyle/>
+          <a:p>
+            <a:fld id="{E620486B-7F68-4355-9947-6125B76F9A8E}" type="slidenum">
+              <a:rPr lang="en-US" smtClean="0"/>
+              <a:t>16</a:t>
+            </a:fld>
+            <a:endParaRPr lang="en-US"/>
           </a:p>
         </p:txBody>
       </p:sp>
@@ -4694,6 +5463,29 @@
           </a:p>
         </p:txBody>
       </p:sp>
+      <p:sp>
+        <p:nvSpPr>
+          <p:cNvPr id="4" name="Slide Number Placeholder 3"/>
+          <p:cNvSpPr>
+            <a:spLocks noGrp="1"/>
+          </p:cNvSpPr>
+          <p:nvPr>
+            <p:ph type="sldNum" sz="quarter" idx="12"/>
+          </p:nvPr>
+        </p:nvSpPr>
+        <p:spPr/>
+        <p:txBody>
+          <a:bodyPr/>
+          <a:lstStyle/>
+          <a:p>
+            <a:fld id="{E620486B-7F68-4355-9947-6125B76F9A8E}" type="slidenum">
+              <a:rPr lang="en-US" smtClean="0"/>
+              <a:t>17</a:t>
+            </a:fld>
+            <a:endParaRPr lang="en-US"/>
+          </a:p>
+        </p:txBody>
+      </p:sp>
     </p:spTree>
     <p:extLst>
       <p:ext uri="{BB962C8B-B14F-4D97-AF65-F5344CB8AC3E}">
@@ -4791,7 +5583,24 @@
                 <a:latin typeface="Times New Roman" panose="02020603050405020304" pitchFamily="18" charset="0"/>
                 <a:cs typeface="Times New Roman" panose="02020603050405020304" pitchFamily="18" charset="0"/>
               </a:rPr>
-              <a:t>Requires the assumption of less than 1/3 malicious nodes in each shard to prevent forking</a:t>
+              <a:t>Requires the assumption of </a:t>
+            </a:r>
+            <a:r>
+              <a:rPr lang="en-US" dirty="0" smtClean="0">
+                <a:solidFill>
+                  <a:srgbClr val="FF0000"/>
+                </a:solidFill>
+                <a:latin typeface="Times New Roman" panose="02020603050405020304" pitchFamily="18" charset="0"/>
+                <a:cs typeface="Times New Roman" panose="02020603050405020304" pitchFamily="18" charset="0"/>
+              </a:rPr>
+              <a:t>less than 1/3 malicious nodes</a:t>
+            </a:r>
+            <a:r>
+              <a:rPr lang="en-US" dirty="0" smtClean="0">
+                <a:latin typeface="Times New Roman" panose="02020603050405020304" pitchFamily="18" charset="0"/>
+                <a:cs typeface="Times New Roman" panose="02020603050405020304" pitchFamily="18" charset="0"/>
+              </a:rPr>
+              <a:t> in each shard to prevent forking</a:t>
             </a:r>
           </a:p>
           <a:p>
@@ -4850,7 +5659,7 @@
         <p:spPr>
           <a:xfrm>
             <a:off x="4254813" y="5745408"/>
-            <a:ext cx="2548518" cy="369332"/>
+            <a:ext cx="2299027" cy="338554"/>
           </a:xfrm>
           <a:prstGeom prst="rect">
             <a:avLst/>
@@ -4864,16 +5673,47 @@
           <a:lstStyle/>
           <a:p>
             <a:r>
-              <a:rPr lang="en-US" dirty="0" smtClean="0"/>
+              <a:rPr lang="en-US" sz="1600" dirty="0" smtClean="0">
+                <a:latin typeface="Times New Roman" panose="02020603050405020304" pitchFamily="18" charset="0"/>
+                <a:cs typeface="Times New Roman" panose="02020603050405020304" pitchFamily="18" charset="0"/>
+              </a:rPr>
               <a:t>Image Courtesy: </a:t>
             </a:r>
             <a:r>
-              <a:rPr lang="en-US" dirty="0" smtClean="0">
+              <a:rPr lang="en-US" sz="1600" dirty="0" smtClean="0">
+                <a:latin typeface="Times New Roman" panose="02020603050405020304" pitchFamily="18" charset="0"/>
+                <a:cs typeface="Times New Roman" panose="02020603050405020304" pitchFamily="18" charset="0"/>
                 <a:hlinkClick r:id="rId3"/>
               </a:rPr>
               <a:t>Medium</a:t>
             </a:r>
-            <a:endParaRPr lang="en-US" dirty="0"/>
+            <a:endParaRPr lang="en-US" sz="1600" dirty="0">
+              <a:latin typeface="Times New Roman" panose="02020603050405020304" pitchFamily="18" charset="0"/>
+              <a:cs typeface="Times New Roman" panose="02020603050405020304" pitchFamily="18" charset="0"/>
+            </a:endParaRPr>
+          </a:p>
+        </p:txBody>
+      </p:sp>
+      <p:sp>
+        <p:nvSpPr>
+          <p:cNvPr id="6" name="Slide Number Placeholder 5"/>
+          <p:cNvSpPr>
+            <a:spLocks noGrp="1"/>
+          </p:cNvSpPr>
+          <p:nvPr>
+            <p:ph type="sldNum" sz="quarter" idx="12"/>
+          </p:nvPr>
+        </p:nvSpPr>
+        <p:spPr/>
+        <p:txBody>
+          <a:bodyPr/>
+          <a:lstStyle/>
+          <a:p>
+            <a:fld id="{E620486B-7F68-4355-9947-6125B76F9A8E}" type="slidenum">
+              <a:rPr lang="en-US" smtClean="0"/>
+              <a:t>18</a:t>
+            </a:fld>
+            <a:endParaRPr lang="en-US"/>
           </a:p>
         </p:txBody>
       </p:sp>
@@ -4971,10 +5811,20 @@
           <a:p>
             <a:r>
               <a:rPr lang="en-US" dirty="0" smtClean="0">
-                <a:latin typeface="Times New Roman" panose="02020603050405020304" pitchFamily="18" charset="0"/>
-                <a:cs typeface="Times New Roman" panose="02020603050405020304" pitchFamily="18" charset="0"/>
-              </a:rPr>
-              <a:t>Undirected Graph can be used that shares the cross-shard transaction history</a:t>
+                <a:solidFill>
+                  <a:srgbClr val="FF0000"/>
+                </a:solidFill>
+                <a:latin typeface="Times New Roman" panose="02020603050405020304" pitchFamily="18" charset="0"/>
+                <a:cs typeface="Times New Roman" panose="02020603050405020304" pitchFamily="18" charset="0"/>
+              </a:rPr>
+              <a:t>Undirected Graph </a:t>
+            </a:r>
+            <a:r>
+              <a:rPr lang="en-US" dirty="0" smtClean="0">
+                <a:latin typeface="Times New Roman" panose="02020603050405020304" pitchFamily="18" charset="0"/>
+                <a:cs typeface="Times New Roman" panose="02020603050405020304" pitchFamily="18" charset="0"/>
+              </a:rPr>
+              <a:t>can be used that shares the cross-shard transaction history</a:t>
             </a:r>
           </a:p>
           <a:p>
@@ -5056,8 +5906,8 @@
         </p:nvSpPr>
         <p:spPr>
           <a:xfrm>
-            <a:off x="4931274" y="4291752"/>
-            <a:ext cx="2548518" cy="369332"/>
+            <a:off x="5251314" y="4381446"/>
+            <a:ext cx="2299027" cy="338554"/>
           </a:xfrm>
           <a:prstGeom prst="rect">
             <a:avLst/>
@@ -5071,16 +5921,47 @@
           <a:lstStyle/>
           <a:p>
             <a:r>
-              <a:rPr lang="en-US" dirty="0" smtClean="0"/>
+              <a:rPr lang="en-US" sz="1600" dirty="0" smtClean="0">
+                <a:latin typeface="Times New Roman" panose="02020603050405020304" pitchFamily="18" charset="0"/>
+                <a:cs typeface="Times New Roman" panose="02020603050405020304" pitchFamily="18" charset="0"/>
+              </a:rPr>
               <a:t>Image Courtesy: </a:t>
             </a:r>
             <a:r>
-              <a:rPr lang="en-US" dirty="0" smtClean="0">
+              <a:rPr lang="en-US" sz="1600" dirty="0" smtClean="0">
+                <a:latin typeface="Times New Roman" panose="02020603050405020304" pitchFamily="18" charset="0"/>
+                <a:cs typeface="Times New Roman" panose="02020603050405020304" pitchFamily="18" charset="0"/>
                 <a:hlinkClick r:id="rId3"/>
               </a:rPr>
               <a:t>Medium</a:t>
             </a:r>
-            <a:endParaRPr lang="en-US" dirty="0"/>
+            <a:endParaRPr lang="en-US" sz="1600" dirty="0">
+              <a:latin typeface="Times New Roman" panose="02020603050405020304" pitchFamily="18" charset="0"/>
+              <a:cs typeface="Times New Roman" panose="02020603050405020304" pitchFamily="18" charset="0"/>
+            </a:endParaRPr>
+          </a:p>
+        </p:txBody>
+      </p:sp>
+      <p:sp>
+        <p:nvSpPr>
+          <p:cNvPr id="4" name="Slide Number Placeholder 3"/>
+          <p:cNvSpPr>
+            <a:spLocks noGrp="1"/>
+          </p:cNvSpPr>
+          <p:nvPr>
+            <p:ph type="sldNum" sz="quarter" idx="12"/>
+          </p:nvPr>
+        </p:nvSpPr>
+        <p:spPr/>
+        <p:txBody>
+          <a:bodyPr/>
+          <a:lstStyle/>
+          <a:p>
+            <a:fld id="{E620486B-7F68-4355-9947-6125B76F9A8E}" type="slidenum">
+              <a:rPr lang="en-US" smtClean="0"/>
+              <a:t>19</a:t>
+            </a:fld>
+            <a:endParaRPr lang="en-US"/>
           </a:p>
         </p:txBody>
       </p:sp>
@@ -5342,6 +6223,29 @@
               <a:latin typeface="Times New Roman" panose="02020603050405020304" pitchFamily="18" charset="0"/>
               <a:cs typeface="Times New Roman" panose="02020603050405020304" pitchFamily="18" charset="0"/>
             </a:endParaRPr>
+          </a:p>
+        </p:txBody>
+      </p:sp>
+      <p:sp>
+        <p:nvSpPr>
+          <p:cNvPr id="4" name="Slide Number Placeholder 3"/>
+          <p:cNvSpPr>
+            <a:spLocks noGrp="1"/>
+          </p:cNvSpPr>
+          <p:nvPr>
+            <p:ph type="sldNum" sz="quarter" idx="12"/>
+          </p:nvPr>
+        </p:nvSpPr>
+        <p:spPr/>
+        <p:txBody>
+          <a:bodyPr/>
+          <a:lstStyle/>
+          <a:p>
+            <a:fld id="{E620486B-7F68-4355-9947-6125B76F9A8E}" type="slidenum">
+              <a:rPr lang="en-US" smtClean="0"/>
+              <a:t>2</a:t>
+            </a:fld>
+            <a:endParaRPr lang="en-US"/>
           </a:p>
         </p:txBody>
       </p:sp>
@@ -5550,7 +6454,7 @@
         <p:spPr>
           <a:xfrm>
             <a:off x="3907341" y="4723828"/>
-            <a:ext cx="2548518" cy="369332"/>
+            <a:ext cx="2299027" cy="338554"/>
           </a:xfrm>
           <a:prstGeom prst="rect">
             <a:avLst/>
@@ -5564,16 +6468,47 @@
           <a:lstStyle/>
           <a:p>
             <a:r>
-              <a:rPr lang="en-US" dirty="0" smtClean="0"/>
+              <a:rPr lang="en-US" sz="1600" dirty="0" smtClean="0">
+                <a:latin typeface="Times New Roman" panose="02020603050405020304" pitchFamily="18" charset="0"/>
+                <a:cs typeface="Times New Roman" panose="02020603050405020304" pitchFamily="18" charset="0"/>
+              </a:rPr>
               <a:t>Image Courtesy: </a:t>
             </a:r>
             <a:r>
-              <a:rPr lang="en-US" dirty="0" smtClean="0">
+              <a:rPr lang="en-US" sz="1600" dirty="0" smtClean="0">
+                <a:latin typeface="Times New Roman" panose="02020603050405020304" pitchFamily="18" charset="0"/>
+                <a:cs typeface="Times New Roman" panose="02020603050405020304" pitchFamily="18" charset="0"/>
                 <a:hlinkClick r:id="rId3"/>
               </a:rPr>
               <a:t>Medium</a:t>
             </a:r>
-            <a:endParaRPr lang="en-US" dirty="0"/>
+            <a:endParaRPr lang="en-US" sz="1600" dirty="0">
+              <a:latin typeface="Times New Roman" panose="02020603050405020304" pitchFamily="18" charset="0"/>
+              <a:cs typeface="Times New Roman" panose="02020603050405020304" pitchFamily="18" charset="0"/>
+            </a:endParaRPr>
+          </a:p>
+        </p:txBody>
+      </p:sp>
+      <p:sp>
+        <p:nvSpPr>
+          <p:cNvPr id="5" name="Slide Number Placeholder 4"/>
+          <p:cNvSpPr>
+            <a:spLocks noGrp="1"/>
+          </p:cNvSpPr>
+          <p:nvPr>
+            <p:ph type="sldNum" sz="quarter" idx="12"/>
+          </p:nvPr>
+        </p:nvSpPr>
+        <p:spPr/>
+        <p:txBody>
+          <a:bodyPr/>
+          <a:lstStyle/>
+          <a:p>
+            <a:fld id="{E620486B-7F68-4355-9947-6125B76F9A8E}" type="slidenum">
+              <a:rPr lang="en-US" smtClean="0"/>
+              <a:t>20</a:t>
+            </a:fld>
+            <a:endParaRPr lang="en-US"/>
           </a:p>
         </p:txBody>
       </p:sp>
@@ -5771,7 +6706,7 @@
         <p:spPr>
           <a:xfrm>
             <a:off x="6638978" y="4989004"/>
-            <a:ext cx="2548518" cy="369332"/>
+            <a:ext cx="2299027" cy="338554"/>
           </a:xfrm>
           <a:prstGeom prst="rect">
             <a:avLst/>
@@ -5785,16 +6720,47 @@
           <a:lstStyle/>
           <a:p>
             <a:r>
-              <a:rPr lang="en-US" dirty="0" smtClean="0"/>
+              <a:rPr lang="en-US" sz="1600" dirty="0" smtClean="0">
+                <a:latin typeface="Times New Roman" panose="02020603050405020304" pitchFamily="18" charset="0"/>
+                <a:cs typeface="Times New Roman" panose="02020603050405020304" pitchFamily="18" charset="0"/>
+              </a:rPr>
               <a:t>Image Courtesy: </a:t>
             </a:r>
             <a:r>
-              <a:rPr lang="en-US" dirty="0" smtClean="0">
+              <a:rPr lang="en-US" sz="1600" dirty="0" smtClean="0">
+                <a:latin typeface="Times New Roman" panose="02020603050405020304" pitchFamily="18" charset="0"/>
+                <a:cs typeface="Times New Roman" panose="02020603050405020304" pitchFamily="18" charset="0"/>
                 <a:hlinkClick r:id="rId3"/>
               </a:rPr>
               <a:t>Medium</a:t>
             </a:r>
-            <a:endParaRPr lang="en-US" dirty="0"/>
+            <a:endParaRPr lang="en-US" sz="1600" dirty="0">
+              <a:latin typeface="Times New Roman" panose="02020603050405020304" pitchFamily="18" charset="0"/>
+              <a:cs typeface="Times New Roman" panose="02020603050405020304" pitchFamily="18" charset="0"/>
+            </a:endParaRPr>
+          </a:p>
+        </p:txBody>
+      </p:sp>
+      <p:sp>
+        <p:nvSpPr>
+          <p:cNvPr id="4" name="Slide Number Placeholder 3"/>
+          <p:cNvSpPr>
+            <a:spLocks noGrp="1"/>
+          </p:cNvSpPr>
+          <p:nvPr>
+            <p:ph type="sldNum" sz="quarter" idx="12"/>
+          </p:nvPr>
+        </p:nvSpPr>
+        <p:spPr/>
+        <p:txBody>
+          <a:bodyPr/>
+          <a:lstStyle/>
+          <a:p>
+            <a:fld id="{E620486B-7F68-4355-9947-6125B76F9A8E}" type="slidenum">
+              <a:rPr lang="en-US" smtClean="0"/>
+              <a:t>21</a:t>
+            </a:fld>
+            <a:endParaRPr lang="en-US"/>
           </a:p>
         </p:txBody>
       </p:sp>
@@ -5874,22 +6840,55 @@
           <a:p>
             <a:r>
               <a:rPr lang="en-US" dirty="0">
-                <a:latin typeface="Times New Roman" panose="02020603050405020304" pitchFamily="18" charset="0"/>
-                <a:cs typeface="Times New Roman" panose="02020603050405020304" pitchFamily="18" charset="0"/>
-              </a:rPr>
-              <a:t>Transaction data is not transmitted, only micro block header and final block header containing transaction hash is transmitted</a:t>
-            </a:r>
-          </a:p>
-          <a:p>
-            <a:r>
-              <a:rPr lang="en-US" dirty="0">
-                <a:latin typeface="Times New Roman" panose="02020603050405020304" pitchFamily="18" charset="0"/>
-                <a:cs typeface="Times New Roman" panose="02020603050405020304" pitchFamily="18" charset="0"/>
-              </a:rPr>
-              <a:t>Use of EC-</a:t>
+                <a:solidFill>
+                  <a:srgbClr val="FF0000"/>
+                </a:solidFill>
+                <a:latin typeface="Times New Roman" panose="02020603050405020304" pitchFamily="18" charset="0"/>
+                <a:cs typeface="Times New Roman" panose="02020603050405020304" pitchFamily="18" charset="0"/>
+              </a:rPr>
+              <a:t>Transaction data is not transmitted</a:t>
+            </a:r>
+            <a:r>
+              <a:rPr lang="en-US" dirty="0">
+                <a:latin typeface="Times New Roman" panose="02020603050405020304" pitchFamily="18" charset="0"/>
+                <a:cs typeface="Times New Roman" panose="02020603050405020304" pitchFamily="18" charset="0"/>
+              </a:rPr>
+              <a:t>, only micro block header and final block header containing </a:t>
+            </a:r>
+            <a:r>
+              <a:rPr lang="en-US" dirty="0">
+                <a:solidFill>
+                  <a:srgbClr val="FF0000"/>
+                </a:solidFill>
+                <a:latin typeface="Times New Roman" panose="02020603050405020304" pitchFamily="18" charset="0"/>
+                <a:cs typeface="Times New Roman" panose="02020603050405020304" pitchFamily="18" charset="0"/>
+              </a:rPr>
+              <a:t>transaction hash is transmitted</a:t>
+            </a:r>
+          </a:p>
+          <a:p>
+            <a:r>
+              <a:rPr lang="en-US" dirty="0">
+                <a:latin typeface="Times New Roman" panose="02020603050405020304" pitchFamily="18" charset="0"/>
+                <a:cs typeface="Times New Roman" panose="02020603050405020304" pitchFamily="18" charset="0"/>
+              </a:rPr>
+              <a:t>Use of </a:t>
+            </a:r>
+            <a:r>
+              <a:rPr lang="en-US" dirty="0">
+                <a:solidFill>
+                  <a:srgbClr val="FF0000"/>
+                </a:solidFill>
+                <a:latin typeface="Times New Roman" panose="02020603050405020304" pitchFamily="18" charset="0"/>
+                <a:cs typeface="Times New Roman" panose="02020603050405020304" pitchFamily="18" charset="0"/>
+              </a:rPr>
+              <a:t>EC-</a:t>
             </a:r>
             <a:r>
               <a:rPr lang="en-US" dirty="0" err="1">
+                <a:solidFill>
+                  <a:srgbClr val="FF0000"/>
+                </a:solidFill>
                 <a:latin typeface="Times New Roman" panose="02020603050405020304" pitchFamily="18" charset="0"/>
                 <a:cs typeface="Times New Roman" panose="02020603050405020304" pitchFamily="18" charset="0"/>
               </a:rPr>
@@ -5906,6 +6905,9 @@
           <a:p>
             <a:r>
               <a:rPr lang="en-US" dirty="0" err="1">
+                <a:solidFill>
+                  <a:srgbClr val="FF0000"/>
+                </a:solidFill>
                 <a:latin typeface="Times New Roman" panose="02020603050405020304" pitchFamily="18" charset="0"/>
                 <a:cs typeface="Times New Roman" panose="02020603050405020304" pitchFamily="18" charset="0"/>
               </a:rPr>
@@ -5916,7 +6918,24 @@
                 <a:latin typeface="Times New Roman" panose="02020603050405020304" pitchFamily="18" charset="0"/>
                 <a:cs typeface="Times New Roman" panose="02020603050405020304" pitchFamily="18" charset="0"/>
               </a:rPr>
-              <a:t> shows that the throughput scales up linearly in the computation capacity of the </a:t>
+              <a:t> shows that the </a:t>
+            </a:r>
+            <a:r>
+              <a:rPr lang="en-US" dirty="0">
+                <a:solidFill>
+                  <a:srgbClr val="FF0000"/>
+                </a:solidFill>
+                <a:latin typeface="Times New Roman" panose="02020603050405020304" pitchFamily="18" charset="0"/>
+                <a:cs typeface="Times New Roman" panose="02020603050405020304" pitchFamily="18" charset="0"/>
+              </a:rPr>
+              <a:t>throughput scales up linearly</a:t>
+            </a:r>
+            <a:r>
+              <a:rPr lang="en-US" dirty="0">
+                <a:latin typeface="Times New Roman" panose="02020603050405020304" pitchFamily="18" charset="0"/>
+                <a:cs typeface="Times New Roman" panose="02020603050405020304" pitchFamily="18" charset="0"/>
+              </a:rPr>
+              <a:t> in the computation capacity of the </a:t>
             </a:r>
             <a:r>
               <a:rPr lang="en-US" dirty="0" smtClean="0">
@@ -5939,7 +6958,24 @@
                 <a:latin typeface="Times New Roman" panose="02020603050405020304" pitchFamily="18" charset="0"/>
                 <a:cs typeface="Times New Roman" panose="02020603050405020304" pitchFamily="18" charset="0"/>
               </a:rPr>
-              <a:t> believes achieving 1000X scalability of </a:t>
+              <a:t> believes achieving </a:t>
+            </a:r>
+            <a:r>
+              <a:rPr lang="en-US" dirty="0" smtClean="0">
+                <a:solidFill>
+                  <a:srgbClr val="FF0000"/>
+                </a:solidFill>
+                <a:latin typeface="Times New Roman" panose="02020603050405020304" pitchFamily="18" charset="0"/>
+                <a:cs typeface="Times New Roman" panose="02020603050405020304" pitchFamily="18" charset="0"/>
+              </a:rPr>
+              <a:t>1000X</a:t>
+            </a:r>
+            <a:r>
+              <a:rPr lang="en-US" dirty="0" smtClean="0">
+                <a:latin typeface="Times New Roman" panose="02020603050405020304" pitchFamily="18" charset="0"/>
+                <a:cs typeface="Times New Roman" panose="02020603050405020304" pitchFamily="18" charset="0"/>
+              </a:rPr>
+              <a:t> scalability of </a:t>
             </a:r>
             <a:r>
               <a:rPr lang="en-US" dirty="0" err="1" smtClean="0">
@@ -5966,6 +7002,29 @@
               <a:latin typeface="Times New Roman" panose="02020603050405020304" pitchFamily="18" charset="0"/>
               <a:cs typeface="Times New Roman" panose="02020603050405020304" pitchFamily="18" charset="0"/>
             </a:endParaRPr>
+          </a:p>
+        </p:txBody>
+      </p:sp>
+      <p:sp>
+        <p:nvSpPr>
+          <p:cNvPr id="4" name="Slide Number Placeholder 3"/>
+          <p:cNvSpPr>
+            <a:spLocks noGrp="1"/>
+          </p:cNvSpPr>
+          <p:nvPr>
+            <p:ph type="sldNum" sz="quarter" idx="12"/>
+          </p:nvPr>
+        </p:nvSpPr>
+        <p:spPr/>
+        <p:txBody>
+          <a:bodyPr/>
+          <a:lstStyle/>
+          <a:p>
+            <a:fld id="{E620486B-7F68-4355-9947-6125B76F9A8E}" type="slidenum">
+              <a:rPr lang="en-US" smtClean="0"/>
+              <a:t>22</a:t>
+            </a:fld>
+            <a:endParaRPr lang="en-US"/>
           </a:p>
         </p:txBody>
       </p:sp>
@@ -6309,16 +7368,35 @@
               </a:rPr>
               <a:t> </a:t>
             </a:r>
-            <a:endParaRPr lang="en-US" dirty="0" smtClean="0">
-              <a:latin typeface="Times New Roman" panose="02020603050405020304" pitchFamily="18" charset="0"/>
-              <a:cs typeface="Times New Roman" panose="02020603050405020304" pitchFamily="18" charset="0"/>
-            </a:endParaRPr>
           </a:p>
           <a:p>
             <a:endParaRPr lang="en-US" dirty="0" smtClean="0"/>
           </a:p>
           <a:p>
             <a:endParaRPr lang="en-US" dirty="0"/>
+          </a:p>
+        </p:txBody>
+      </p:sp>
+      <p:sp>
+        <p:nvSpPr>
+          <p:cNvPr id="4" name="Slide Number Placeholder 3"/>
+          <p:cNvSpPr>
+            <a:spLocks noGrp="1"/>
+          </p:cNvSpPr>
+          <p:nvPr>
+            <p:ph type="sldNum" sz="quarter" idx="12"/>
+          </p:nvPr>
+        </p:nvSpPr>
+        <p:spPr/>
+        <p:txBody>
+          <a:bodyPr/>
+          <a:lstStyle/>
+          <a:p>
+            <a:fld id="{E620486B-7F68-4355-9947-6125B76F9A8E}" type="slidenum">
+              <a:rPr lang="en-US" smtClean="0"/>
+              <a:t>23</a:t>
+            </a:fld>
+            <a:endParaRPr lang="en-US"/>
           </a:p>
         </p:txBody>
       </p:sp>
@@ -6397,65 +7475,148 @@
           <a:lstStyle/>
           <a:p>
             <a:r>
+              <a:rPr lang="en-US" dirty="0" smtClean="0">
+                <a:latin typeface="Times New Roman" panose="02020603050405020304" pitchFamily="18" charset="0"/>
+                <a:cs typeface="Times New Roman" panose="02020603050405020304" pitchFamily="18" charset="0"/>
+              </a:rPr>
+              <a:t>Sharding- </a:t>
+            </a:r>
+            <a:r>
+              <a:rPr lang="en-US" dirty="0" smtClean="0">
+                <a:solidFill>
+                  <a:srgbClr val="FF0000"/>
+                </a:solidFill>
+                <a:latin typeface="Times New Roman" panose="02020603050405020304" pitchFamily="18" charset="0"/>
+                <a:cs typeface="Times New Roman" panose="02020603050405020304" pitchFamily="18" charset="0"/>
+              </a:rPr>
+              <a:t>partitioning</a:t>
+            </a:r>
+            <a:r>
+              <a:rPr lang="en-US" dirty="0" smtClean="0">
+                <a:latin typeface="Times New Roman" panose="02020603050405020304" pitchFamily="18" charset="0"/>
+                <a:cs typeface="Times New Roman" panose="02020603050405020304" pitchFamily="18" charset="0"/>
+              </a:rPr>
+              <a:t> of network into </a:t>
+            </a:r>
+            <a:r>
+              <a:rPr lang="en-US" dirty="0" smtClean="0">
+                <a:solidFill>
+                  <a:srgbClr val="FF0000"/>
+                </a:solidFill>
+                <a:latin typeface="Times New Roman" panose="02020603050405020304" pitchFamily="18" charset="0"/>
+                <a:cs typeface="Times New Roman" panose="02020603050405020304" pitchFamily="18" charset="0"/>
+              </a:rPr>
+              <a:t>smaller committees</a:t>
+            </a:r>
+            <a:r>
+              <a:rPr lang="en-US" dirty="0" smtClean="0">
+                <a:latin typeface="Times New Roman" panose="02020603050405020304" pitchFamily="18" charset="0"/>
+                <a:cs typeface="Times New Roman" panose="02020603050405020304" pitchFamily="18" charset="0"/>
+              </a:rPr>
+              <a:t>, each of which processes a disjoint set of transactions (or “shards</a:t>
+            </a:r>
+            <a:r>
+              <a:rPr lang="en-US" dirty="0" smtClean="0">
+                <a:latin typeface="Times New Roman" panose="02020603050405020304" pitchFamily="18" charset="0"/>
+                <a:cs typeface="Times New Roman" panose="02020603050405020304" pitchFamily="18" charset="0"/>
+              </a:rPr>
+              <a:t>”)</a:t>
+            </a:r>
+            <a:endParaRPr lang="en-US" dirty="0" smtClean="0">
+              <a:latin typeface="Times New Roman" panose="02020603050405020304" pitchFamily="18" charset="0"/>
+              <a:cs typeface="Times New Roman" panose="02020603050405020304" pitchFamily="18" charset="0"/>
+            </a:endParaRPr>
+          </a:p>
+          <a:p>
+            <a:r>
+              <a:rPr lang="en-US" dirty="0" smtClean="0">
+                <a:latin typeface="Times New Roman" panose="02020603050405020304" pitchFamily="18" charset="0"/>
+                <a:cs typeface="Times New Roman" panose="02020603050405020304" pitchFamily="18" charset="0"/>
+              </a:rPr>
+              <a:t>ELASTICO – first secure candidate for a sharding protocol to open blockchain that tolerate byzantine </a:t>
+            </a:r>
+            <a:r>
+              <a:rPr lang="en-US" dirty="0" smtClean="0">
+                <a:latin typeface="Times New Roman" panose="02020603050405020304" pitchFamily="18" charset="0"/>
+                <a:cs typeface="Times New Roman" panose="02020603050405020304" pitchFamily="18" charset="0"/>
+              </a:rPr>
+              <a:t>adversaries</a:t>
+            </a:r>
+          </a:p>
+          <a:p>
+            <a:r>
               <a:rPr lang="en-US" dirty="0" err="1" smtClean="0">
                 <a:latin typeface="Times New Roman" panose="02020603050405020304" pitchFamily="18" charset="0"/>
                 <a:cs typeface="Times New Roman" panose="02020603050405020304" pitchFamily="18" charset="0"/>
               </a:rPr>
-              <a:t>Sharding</a:t>
-            </a:r>
-            <a:r>
-              <a:rPr lang="en-US" dirty="0" smtClean="0">
-                <a:latin typeface="Times New Roman" panose="02020603050405020304" pitchFamily="18" charset="0"/>
-                <a:cs typeface="Times New Roman" panose="02020603050405020304" pitchFamily="18" charset="0"/>
-              </a:rPr>
-              <a:t>- partitioning of network into smaller committees, each of which processes a disjoint set of transactions (or “shards”)</a:t>
-            </a:r>
-          </a:p>
-          <a:p>
-            <a:r>
-              <a:rPr lang="en-US" dirty="0" smtClean="0">
-                <a:latin typeface="Times New Roman" panose="02020603050405020304" pitchFamily="18" charset="0"/>
-                <a:cs typeface="Times New Roman" panose="02020603050405020304" pitchFamily="18" charset="0"/>
-              </a:rPr>
-              <a:t>Makes use of Proof of Work and Byzantine consensus algorithms</a:t>
-            </a:r>
-          </a:p>
-          <a:p>
-            <a:r>
-              <a:rPr lang="en-US" dirty="0" smtClean="0">
-                <a:latin typeface="Times New Roman" panose="02020603050405020304" pitchFamily="18" charset="0"/>
-                <a:cs typeface="Times New Roman" panose="02020603050405020304" pitchFamily="18" charset="0"/>
-              </a:rPr>
-              <a:t>ELASTICO – first secure candidate for a </a:t>
+              <a:t>Elastico</a:t>
+            </a:r>
+            <a:r>
+              <a:rPr lang="en-US" dirty="0" smtClean="0">
+                <a:latin typeface="Times New Roman" panose="02020603050405020304" pitchFamily="18" charset="0"/>
+                <a:cs typeface="Times New Roman" panose="02020603050405020304" pitchFamily="18" charset="0"/>
+              </a:rPr>
+              <a:t> and </a:t>
             </a:r>
             <a:r>
               <a:rPr lang="en-US" dirty="0" err="1" smtClean="0">
                 <a:latin typeface="Times New Roman" panose="02020603050405020304" pitchFamily="18" charset="0"/>
                 <a:cs typeface="Times New Roman" panose="02020603050405020304" pitchFamily="18" charset="0"/>
               </a:rPr>
-              <a:t>sharding</a:t>
-            </a:r>
-            <a:r>
-              <a:rPr lang="en-US" dirty="0" smtClean="0">
-                <a:latin typeface="Times New Roman" panose="02020603050405020304" pitchFamily="18" charset="0"/>
-                <a:cs typeface="Times New Roman" panose="02020603050405020304" pitchFamily="18" charset="0"/>
-              </a:rPr>
-              <a:t> protocol to open </a:t>
-            </a:r>
-            <a:r>
-              <a:rPr lang="en-US" dirty="0" err="1" smtClean="0">
-                <a:latin typeface="Times New Roman" panose="02020603050405020304" pitchFamily="18" charset="0"/>
-                <a:cs typeface="Times New Roman" panose="02020603050405020304" pitchFamily="18" charset="0"/>
-              </a:rPr>
-              <a:t>blockchain</a:t>
-            </a:r>
-            <a:r>
-              <a:rPr lang="en-US" dirty="0" smtClean="0">
-                <a:latin typeface="Times New Roman" panose="02020603050405020304" pitchFamily="18" charset="0"/>
-                <a:cs typeface="Times New Roman" panose="02020603050405020304" pitchFamily="18" charset="0"/>
-              </a:rPr>
-              <a:t> that tolerate byzantine adversaries</a:t>
-            </a:r>
+              <a:t>Ziliqa</a:t>
+            </a:r>
+            <a:r>
+              <a:rPr lang="en-US" dirty="0" smtClean="0">
+                <a:latin typeface="Times New Roman" panose="02020603050405020304" pitchFamily="18" charset="0"/>
+                <a:cs typeface="Times New Roman" panose="02020603050405020304" pitchFamily="18" charset="0"/>
+              </a:rPr>
+              <a:t> make use </a:t>
+            </a:r>
+            <a:r>
+              <a:rPr lang="en-US" dirty="0">
+                <a:latin typeface="Times New Roman" panose="02020603050405020304" pitchFamily="18" charset="0"/>
+                <a:cs typeface="Times New Roman" panose="02020603050405020304" pitchFamily="18" charset="0"/>
+              </a:rPr>
+              <a:t>of </a:t>
+            </a:r>
+            <a:r>
+              <a:rPr lang="en-US" dirty="0">
+                <a:solidFill>
+                  <a:srgbClr val="FF0000"/>
+                </a:solidFill>
+                <a:latin typeface="Times New Roman" panose="02020603050405020304" pitchFamily="18" charset="0"/>
+                <a:cs typeface="Times New Roman" panose="02020603050405020304" pitchFamily="18" charset="0"/>
+              </a:rPr>
+              <a:t>Proof of Work</a:t>
+            </a:r>
+            <a:r>
+              <a:rPr lang="en-US" dirty="0">
+                <a:latin typeface="Times New Roman" panose="02020603050405020304" pitchFamily="18" charset="0"/>
+                <a:cs typeface="Times New Roman" panose="02020603050405020304" pitchFamily="18" charset="0"/>
+              </a:rPr>
+              <a:t> and </a:t>
+            </a:r>
+            <a:r>
+              <a:rPr lang="en-US" dirty="0">
+                <a:solidFill>
+                  <a:srgbClr val="FF0000"/>
+                </a:solidFill>
+                <a:latin typeface="Times New Roman" panose="02020603050405020304" pitchFamily="18" charset="0"/>
+                <a:cs typeface="Times New Roman" panose="02020603050405020304" pitchFamily="18" charset="0"/>
+              </a:rPr>
+              <a:t>Byzantine</a:t>
+            </a:r>
+            <a:r>
+              <a:rPr lang="en-US" dirty="0">
+                <a:latin typeface="Times New Roman" panose="02020603050405020304" pitchFamily="18" charset="0"/>
+                <a:cs typeface="Times New Roman" panose="02020603050405020304" pitchFamily="18" charset="0"/>
+              </a:rPr>
+              <a:t> consensus algorithms</a:t>
+            </a:r>
+            <a:endParaRPr lang="en-US" dirty="0" smtClean="0">
+              <a:latin typeface="Times New Roman" panose="02020603050405020304" pitchFamily="18" charset="0"/>
+              <a:cs typeface="Times New Roman" panose="02020603050405020304" pitchFamily="18" charset="0"/>
+            </a:endParaRPr>
           </a:p>
           <a:p>
             <a:r>
@@ -6465,6 +7626,29 @@
               </a:rPr>
               <a:t>Achieves linear transaction throughput with increase in the computational power of the network</a:t>
             </a:r>
+          </a:p>
+        </p:txBody>
+      </p:sp>
+      <p:sp>
+        <p:nvSpPr>
+          <p:cNvPr id="4" name="Slide Number Placeholder 3"/>
+          <p:cNvSpPr>
+            <a:spLocks noGrp="1"/>
+          </p:cNvSpPr>
+          <p:nvPr>
+            <p:ph type="sldNum" sz="quarter" idx="12"/>
+          </p:nvPr>
+        </p:nvSpPr>
+        <p:spPr/>
+        <p:txBody>
+          <a:bodyPr/>
+          <a:lstStyle/>
+          <a:p>
+            <a:fld id="{E620486B-7F68-4355-9947-6125B76F9A8E}" type="slidenum">
+              <a:rPr lang="en-US" smtClean="0"/>
+              <a:t>3</a:t>
+            </a:fld>
+            <a:endParaRPr lang="en-US"/>
           </a:p>
         </p:txBody>
       </p:sp>
@@ -6570,10 +7754,23 @@
                 <a:latin typeface="Times New Roman" panose="02020603050405020304" pitchFamily="18" charset="0"/>
                 <a:cs typeface="Times New Roman" panose="02020603050405020304" pitchFamily="18" charset="0"/>
               </a:rPr>
-              <a:t> miners in the network, can tolerate </a:t>
+              <a:t> miners in the network, can </a:t>
+            </a:r>
+            <a:r>
+              <a:rPr lang="en-US" dirty="0" smtClean="0">
+                <a:solidFill>
+                  <a:srgbClr val="FF0000"/>
+                </a:solidFill>
+                <a:latin typeface="Times New Roman" panose="02020603050405020304" pitchFamily="18" charset="0"/>
+                <a:cs typeface="Times New Roman" panose="02020603050405020304" pitchFamily="18" charset="0"/>
+              </a:rPr>
+              <a:t>tolerate </a:t>
             </a:r>
             <a:r>
               <a:rPr lang="en-US" dirty="0" err="1" smtClean="0">
+                <a:solidFill>
+                  <a:srgbClr val="FF0000"/>
+                </a:solidFill>
                 <a:latin typeface="Times New Roman" panose="02020603050405020304" pitchFamily="18" charset="0"/>
                 <a:cs typeface="Times New Roman" panose="02020603050405020304" pitchFamily="18" charset="0"/>
               </a:rPr>
@@ -6581,6 +7778,9 @@
             </a:r>
             <a:r>
               <a:rPr lang="en-US" dirty="0" smtClean="0">
+                <a:solidFill>
+                  <a:srgbClr val="FF0000"/>
+                </a:solidFill>
                 <a:latin typeface="Times New Roman" panose="02020603050405020304" pitchFamily="18" charset="0"/>
                 <a:cs typeface="Times New Roman" panose="02020603050405020304" pitchFamily="18" charset="0"/>
               </a:rPr>
@@ -6588,6 +7788,9 @@
             </a:r>
             <a:r>
               <a:rPr lang="en-US" i="1" dirty="0" smtClean="0">
+                <a:solidFill>
+                  <a:srgbClr val="FF0000"/>
+                </a:solidFill>
                 <a:latin typeface="Times New Roman" panose="02020603050405020304" pitchFamily="18" charset="0"/>
                 <a:cs typeface="Times New Roman" panose="02020603050405020304" pitchFamily="18" charset="0"/>
               </a:rPr>
@@ -6595,6 +7798,9 @@
             </a:r>
             <a:r>
               <a:rPr lang="en-US" dirty="0" smtClean="0">
+                <a:solidFill>
+                  <a:srgbClr val="FF0000"/>
+                </a:solidFill>
                 <a:latin typeface="Times New Roman" panose="02020603050405020304" pitchFamily="18" charset="0"/>
                 <a:cs typeface="Times New Roman" panose="02020603050405020304" pitchFamily="18" charset="0"/>
               </a:rPr>
@@ -6602,6 +7808,9 @@
             </a:r>
             <a:r>
               <a:rPr lang="en-US" i="1" dirty="0" smtClean="0">
+                <a:solidFill>
+                  <a:srgbClr val="FF0000"/>
+                </a:solidFill>
                 <a:latin typeface="Times New Roman" panose="02020603050405020304" pitchFamily="18" charset="0"/>
                 <a:cs typeface="Times New Roman" panose="02020603050405020304" pitchFamily="18" charset="0"/>
               </a:rPr>
@@ -6609,10 +7818,20 @@
             </a:r>
             <a:r>
               <a:rPr lang="en-US" dirty="0" smtClean="0">
-                <a:latin typeface="Times New Roman" panose="02020603050405020304" pitchFamily="18" charset="0"/>
-                <a:cs typeface="Times New Roman" panose="02020603050405020304" pitchFamily="18" charset="0"/>
-              </a:rPr>
-              <a:t>/4 byzantine adversaries.</a:t>
+                <a:solidFill>
+                  <a:srgbClr val="FF0000"/>
+                </a:solidFill>
+                <a:latin typeface="Times New Roman" panose="02020603050405020304" pitchFamily="18" charset="0"/>
+                <a:cs typeface="Times New Roman" panose="02020603050405020304" pitchFamily="18" charset="0"/>
+              </a:rPr>
+              <a:t>/4 byzantine adversaries</a:t>
+            </a:r>
+            <a:r>
+              <a:rPr lang="en-US" dirty="0" smtClean="0">
+                <a:latin typeface="Times New Roman" panose="02020603050405020304" pitchFamily="18" charset="0"/>
+                <a:cs typeface="Times New Roman" panose="02020603050405020304" pitchFamily="18" charset="0"/>
+              </a:rPr>
+              <a:t>.</a:t>
             </a:r>
           </a:p>
           <a:p>
@@ -6674,10 +7893,20 @@
           <a:p>
             <a:r>
               <a:rPr lang="en-US" dirty="0">
-                <a:latin typeface="Times New Roman" panose="02020603050405020304" pitchFamily="18" charset="0"/>
-                <a:cs typeface="Times New Roman" panose="02020603050405020304" pitchFamily="18" charset="0"/>
-              </a:rPr>
-              <a:t>Partially synchronous network- any broadcasted message will reach a node within a bounded delay of </a:t>
+                <a:solidFill>
+                  <a:srgbClr val="FF0000"/>
+                </a:solidFill>
+                <a:latin typeface="Times New Roman" panose="02020603050405020304" pitchFamily="18" charset="0"/>
+                <a:cs typeface="Times New Roman" panose="02020603050405020304" pitchFamily="18" charset="0"/>
+              </a:rPr>
+              <a:t>Partially synchronous network</a:t>
+            </a:r>
+            <a:r>
+              <a:rPr lang="en-US" dirty="0">
+                <a:latin typeface="Times New Roman" panose="02020603050405020304" pitchFamily="18" charset="0"/>
+                <a:cs typeface="Times New Roman" panose="02020603050405020304" pitchFamily="18" charset="0"/>
+              </a:rPr>
+              <a:t>- any broadcasted message will reach a node within a bounded delay of </a:t>
             </a:r>
             <a:r>
               <a:rPr lang="el-GR" dirty="0">
@@ -6704,6 +7933,29 @@
               <a:latin typeface="Times New Roman" panose="02020603050405020304" pitchFamily="18" charset="0"/>
               <a:cs typeface="Times New Roman" panose="02020603050405020304" pitchFamily="18" charset="0"/>
             </a:endParaRPr>
+          </a:p>
+        </p:txBody>
+      </p:sp>
+      <p:sp>
+        <p:nvSpPr>
+          <p:cNvPr id="4" name="Slide Number Placeholder 3"/>
+          <p:cNvSpPr>
+            <a:spLocks noGrp="1"/>
+          </p:cNvSpPr>
+          <p:nvPr>
+            <p:ph type="sldNum" sz="quarter" idx="12"/>
+          </p:nvPr>
+        </p:nvSpPr>
+        <p:spPr/>
+        <p:txBody>
+          <a:bodyPr/>
+          <a:lstStyle/>
+          <a:p>
+            <a:fld id="{E620486B-7F68-4355-9947-6125B76F9A8E}" type="slidenum">
+              <a:rPr lang="en-US" smtClean="0"/>
+              <a:t>4</a:t>
+            </a:fld>
+            <a:endParaRPr lang="en-US"/>
           </a:p>
         </p:txBody>
       </p:sp>
@@ -6798,7 +8050,17 @@
                 <a:latin typeface="Times New Roman" panose="02020603050405020304" pitchFamily="18" charset="0"/>
                 <a:cs typeface="Times New Roman" panose="02020603050405020304" pitchFamily="18" charset="0"/>
               </a:rPr>
-              <a:t>Parallelization is achieved by dividing total computational power into smaller shards </a:t>
+              <a:t>Parallelization is achieved by dividing total computational power into </a:t>
+            </a:r>
+            <a:r>
+              <a:rPr lang="en-US" dirty="0">
+                <a:solidFill>
+                  <a:srgbClr val="FF0000"/>
+                </a:solidFill>
+                <a:latin typeface="Times New Roman" panose="02020603050405020304" pitchFamily="18" charset="0"/>
+                <a:cs typeface="Times New Roman" panose="02020603050405020304" pitchFamily="18" charset="0"/>
+              </a:rPr>
+              <a:t>smaller shards </a:t>
             </a:r>
             <a:r>
               <a:rPr lang="en-US" dirty="0" smtClean="0">
@@ -6809,10 +8071,20 @@
             </a:r>
             <a:r>
               <a:rPr lang="en-US" dirty="0" smtClean="0">
-                <a:latin typeface="Times New Roman" panose="02020603050405020304" pitchFamily="18" charset="0"/>
-                <a:cs typeface="Times New Roman" panose="02020603050405020304" pitchFamily="18" charset="0"/>
-              </a:rPr>
-              <a:t>Directory Service committee, </a:t>
+                <a:solidFill>
+                  <a:srgbClr val="FF0000"/>
+                </a:solidFill>
+                <a:latin typeface="Times New Roman" panose="02020603050405020304" pitchFamily="18" charset="0"/>
+                <a:cs typeface="Times New Roman" panose="02020603050405020304" pitchFamily="18" charset="0"/>
+              </a:rPr>
+              <a:t>Directory Service committee</a:t>
+            </a:r>
+            <a:r>
+              <a:rPr lang="en-US" dirty="0" smtClean="0">
+                <a:latin typeface="Times New Roman" panose="02020603050405020304" pitchFamily="18" charset="0"/>
+                <a:cs typeface="Times New Roman" panose="02020603050405020304" pitchFamily="18" charset="0"/>
+              </a:rPr>
+              <a:t>, </a:t>
             </a:r>
             <a:r>
               <a:rPr lang="en-US" dirty="0">
@@ -6947,10 +8219,20 @@
             </a:r>
             <a:r>
               <a:rPr lang="en-US" dirty="0" smtClean="0">
-                <a:latin typeface="Times New Roman" panose="02020603050405020304" pitchFamily="18" charset="0"/>
-                <a:cs typeface="Times New Roman" panose="02020603050405020304" pitchFamily="18" charset="0"/>
-              </a:rPr>
-              <a:t>epochs or rounds</a:t>
+                <a:solidFill>
+                  <a:srgbClr val="FF0000"/>
+                </a:solidFill>
+                <a:latin typeface="Times New Roman" panose="02020603050405020304" pitchFamily="18" charset="0"/>
+                <a:cs typeface="Times New Roman" panose="02020603050405020304" pitchFamily="18" charset="0"/>
+              </a:rPr>
+              <a:t>epochs</a:t>
+            </a:r>
+            <a:r>
+              <a:rPr lang="en-US" dirty="0" smtClean="0">
+                <a:latin typeface="Times New Roman" panose="02020603050405020304" pitchFamily="18" charset="0"/>
+                <a:cs typeface="Times New Roman" panose="02020603050405020304" pitchFamily="18" charset="0"/>
+              </a:rPr>
+              <a:t> or rounds</a:t>
             </a:r>
             <a:endParaRPr lang="en-US" dirty="0">
               <a:latin typeface="Times New Roman" panose="02020603050405020304" pitchFamily="18" charset="0"/>
@@ -6959,6 +8241,29 @@
           </a:p>
           <a:p>
             <a:endParaRPr lang="en-US" dirty="0"/>
+          </a:p>
+        </p:txBody>
+      </p:sp>
+      <p:sp>
+        <p:nvSpPr>
+          <p:cNvPr id="4" name="Slide Number Placeholder 3"/>
+          <p:cNvSpPr>
+            <a:spLocks noGrp="1"/>
+          </p:cNvSpPr>
+          <p:nvPr>
+            <p:ph type="sldNum" sz="quarter" idx="12"/>
+          </p:nvPr>
+        </p:nvSpPr>
+        <p:spPr/>
+        <p:txBody>
+          <a:bodyPr/>
+          <a:lstStyle/>
+          <a:p>
+            <a:fld id="{E620486B-7F68-4355-9947-6125B76F9A8E}" type="slidenum">
+              <a:rPr lang="en-US" smtClean="0"/>
+              <a:t>5</a:t>
+            </a:fld>
+            <a:endParaRPr lang="en-US"/>
           </a:p>
         </p:txBody>
       </p:sp>
@@ -7191,6 +8496,29 @@
           </a:p>
         </p:txBody>
       </p:sp>
+      <p:sp>
+        <p:nvSpPr>
+          <p:cNvPr id="4" name="Slide Number Placeholder 3"/>
+          <p:cNvSpPr>
+            <a:spLocks noGrp="1"/>
+          </p:cNvSpPr>
+          <p:nvPr>
+            <p:ph type="sldNum" sz="quarter" idx="12"/>
+          </p:nvPr>
+        </p:nvSpPr>
+        <p:spPr/>
+        <p:txBody>
+          <a:bodyPr/>
+          <a:lstStyle/>
+          <a:p>
+            <a:fld id="{E620486B-7F68-4355-9947-6125B76F9A8E}" type="slidenum">
+              <a:rPr lang="en-US" smtClean="0"/>
+              <a:t>6</a:t>
+            </a:fld>
+            <a:endParaRPr lang="en-US"/>
+          </a:p>
+        </p:txBody>
+      </p:sp>
     </p:spTree>
     <p:extLst>
       <p:ext uri="{BB962C8B-B14F-4D97-AF65-F5344CB8AC3E}">
@@ -7301,7 +8629,17 @@
                 <a:latin typeface="Times New Roman" panose="02020603050405020304" pitchFamily="18" charset="0"/>
                 <a:cs typeface="Times New Roman" panose="02020603050405020304" pitchFamily="18" charset="0"/>
               </a:rPr>
-              <a:t>Pseudonymous identity using public key and IP address</a:t>
+              <a:t>Pseudonymous identity using </a:t>
+            </a:r>
+            <a:r>
+              <a:rPr lang="en-US" dirty="0">
+                <a:solidFill>
+                  <a:srgbClr val="FF0000"/>
+                </a:solidFill>
+                <a:latin typeface="Times New Roman" panose="02020603050405020304" pitchFamily="18" charset="0"/>
+                <a:cs typeface="Times New Roman" panose="02020603050405020304" pitchFamily="18" charset="0"/>
+              </a:rPr>
+              <a:t>public key and IP address</a:t>
             </a:r>
           </a:p>
           <a:p>
@@ -7311,7 +8649,17 @@
                 <a:latin typeface="Times New Roman" panose="02020603050405020304" pitchFamily="18" charset="0"/>
                 <a:cs typeface="Times New Roman" panose="02020603050405020304" pitchFamily="18" charset="0"/>
               </a:rPr>
-              <a:t>Two group of nodes/miners- DS nodes and regular nodes</a:t>
+              <a:t>Two group of nodes/miners- </a:t>
+            </a:r>
+            <a:r>
+              <a:rPr lang="en-US" dirty="0">
+                <a:solidFill>
+                  <a:srgbClr val="FF0000"/>
+                </a:solidFill>
+                <a:latin typeface="Times New Roman" panose="02020603050405020304" pitchFamily="18" charset="0"/>
+                <a:cs typeface="Times New Roman" panose="02020603050405020304" pitchFamily="18" charset="0"/>
+              </a:rPr>
+              <a:t>DS nodes and regular nodes</a:t>
             </a:r>
           </a:p>
           <a:p>
@@ -7342,6 +8690,9 @@
             <a:pPr lvl="1"/>
             <a:r>
               <a:rPr lang="en-US" dirty="0">
+                <a:solidFill>
+                  <a:srgbClr val="FF0000"/>
+                </a:solidFill>
                 <a:latin typeface="Times New Roman" panose="02020603050405020304" pitchFamily="18" charset="0"/>
                 <a:cs typeface="Times New Roman" panose="02020603050405020304" pitchFamily="18" charset="0"/>
               </a:rPr>
@@ -7349,6 +8700,9 @@
             </a:r>
             <a:r>
               <a:rPr lang="en-US" dirty="0" err="1">
+                <a:solidFill>
+                  <a:srgbClr val="FF0000"/>
+                </a:solidFill>
                 <a:latin typeface="Times New Roman" panose="02020603050405020304" pitchFamily="18" charset="0"/>
                 <a:cs typeface="Times New Roman" panose="02020603050405020304" pitchFamily="18" charset="0"/>
               </a:rPr>
@@ -7356,6 +8710,9 @@
             </a:r>
             <a:r>
               <a:rPr lang="en-US" dirty="0">
+                <a:solidFill>
+                  <a:srgbClr val="FF0000"/>
+                </a:solidFill>
                 <a:latin typeface="Times New Roman" panose="02020603050405020304" pitchFamily="18" charset="0"/>
                 <a:cs typeface="Times New Roman" panose="02020603050405020304" pitchFamily="18" charset="0"/>
               </a:rPr>
@@ -7363,6 +8720,9 @@
             </a:r>
             <a:r>
               <a:rPr lang="el-GR" baseline="30000" dirty="0">
+                <a:solidFill>
+                  <a:srgbClr val="FF0000"/>
+                </a:solidFill>
                 <a:latin typeface="Times New Roman" panose="02020603050405020304" pitchFamily="18" charset="0"/>
                 <a:cs typeface="Times New Roman" panose="02020603050405020304" pitchFamily="18" charset="0"/>
               </a:rPr>
@@ -7370,6 +8730,9 @@
             </a:r>
             <a:r>
               <a:rPr lang="en-US" baseline="30000" dirty="0">
+                <a:solidFill>
+                  <a:srgbClr val="FF0000"/>
+                </a:solidFill>
                 <a:latin typeface="Times New Roman" panose="02020603050405020304" pitchFamily="18" charset="0"/>
                 <a:cs typeface="Times New Roman" panose="02020603050405020304" pitchFamily="18" charset="0"/>
               </a:rPr>
@@ -7386,18 +8749,25 @@
           <a:p>
             <a:pPr lvl="2"/>
             <a:r>
-              <a:rPr lang="el-GR" sz="2400" dirty="0">
+              <a:rPr lang="el-GR" sz="2400" dirty="0" smtClean="0">
                 <a:latin typeface="Times New Roman" panose="02020603050405020304" pitchFamily="18" charset="0"/>
                 <a:cs typeface="Times New Roman" panose="02020603050405020304" pitchFamily="18" charset="0"/>
               </a:rPr>
               <a:t>γ</a:t>
             </a:r>
             <a:r>
+              <a:rPr lang="en-US" sz="2400" dirty="0" smtClean="0">
+                <a:latin typeface="Times New Roman" panose="02020603050405020304" pitchFamily="18" charset="0"/>
+                <a:cs typeface="Times New Roman" panose="02020603050405020304" pitchFamily="18" charset="0"/>
+              </a:rPr>
+              <a:t> is </a:t>
+            </a:r>
+            <a:r>
               <a:rPr lang="en-US" sz="2400" dirty="0">
                 <a:latin typeface="Times New Roman" panose="02020603050405020304" pitchFamily="18" charset="0"/>
                 <a:cs typeface="Times New Roman" panose="02020603050405020304" pitchFamily="18" charset="0"/>
               </a:rPr>
-              <a:t> is the length of hash output</a:t>
+              <a:t>the length of hash output</a:t>
             </a:r>
           </a:p>
           <a:p>
@@ -7450,6 +8820,29 @@
               </a:rPr>
               <a:t>Epoch randomness prevents byzantine adversary from precomputing the hash value output before a specified time or epoch</a:t>
             </a:r>
+          </a:p>
+        </p:txBody>
+      </p:sp>
+      <p:sp>
+        <p:nvSpPr>
+          <p:cNvPr id="4" name="Slide Number Placeholder 3"/>
+          <p:cNvSpPr>
+            <a:spLocks noGrp="1"/>
+          </p:cNvSpPr>
+          <p:nvPr>
+            <p:ph type="sldNum" sz="quarter" idx="12"/>
+          </p:nvPr>
+        </p:nvSpPr>
+        <p:spPr/>
+        <p:txBody>
+          <a:bodyPr/>
+          <a:lstStyle/>
+          <a:p>
+            <a:fld id="{E620486B-7F68-4355-9947-6125B76F9A8E}" type="slidenum">
+              <a:rPr lang="en-US" smtClean="0"/>
+              <a:t>7</a:t>
+            </a:fld>
+            <a:endParaRPr lang="en-US"/>
           </a:p>
         </p:txBody>
       </p:sp>
@@ -7661,6 +9054,29 @@
           <a:p>
             <a:pPr lvl="1"/>
             <a:endParaRPr lang="en-US" dirty="0" smtClean="0"/>
+          </a:p>
+        </p:txBody>
+      </p:sp>
+      <p:sp>
+        <p:nvSpPr>
+          <p:cNvPr id="4" name="Slide Number Placeholder 3"/>
+          <p:cNvSpPr>
+            <a:spLocks noGrp="1"/>
+          </p:cNvSpPr>
+          <p:nvPr>
+            <p:ph type="sldNum" sz="quarter" idx="12"/>
+          </p:nvPr>
+        </p:nvSpPr>
+        <p:spPr/>
+        <p:txBody>
+          <a:bodyPr/>
+          <a:lstStyle/>
+          <a:p>
+            <a:fld id="{E620486B-7F68-4355-9947-6125B76F9A8E}" type="slidenum">
+              <a:rPr lang="en-US" smtClean="0"/>
+              <a:t>8</a:t>
+            </a:fld>
+            <a:endParaRPr lang="en-US"/>
           </a:p>
         </p:txBody>
       </p:sp>
@@ -7822,6 +9238,65 @@
           </a:prstGeom>
         </p:spPr>
       </p:pic>
+      <p:sp>
+        <p:nvSpPr>
+          <p:cNvPr id="5" name="Slide Number Placeholder 4"/>
+          <p:cNvSpPr>
+            <a:spLocks noGrp="1"/>
+          </p:cNvSpPr>
+          <p:nvPr>
+            <p:ph type="sldNum" sz="quarter" idx="12"/>
+          </p:nvPr>
+        </p:nvSpPr>
+        <p:spPr/>
+        <p:txBody>
+          <a:bodyPr/>
+          <a:lstStyle/>
+          <a:p>
+            <a:fld id="{E620486B-7F68-4355-9947-6125B76F9A8E}" type="slidenum">
+              <a:rPr lang="en-US" smtClean="0"/>
+              <a:t>9</a:t>
+            </a:fld>
+            <a:endParaRPr lang="en-US"/>
+          </a:p>
+        </p:txBody>
+      </p:sp>
+      <p:sp>
+        <p:nvSpPr>
+          <p:cNvPr id="6" name="TextBox 5"/>
+          <p:cNvSpPr txBox="1"/>
+          <p:nvPr/>
+        </p:nvSpPr>
+        <p:spPr>
+          <a:xfrm>
+            <a:off x="4445421" y="6439916"/>
+            <a:ext cx="3791294" cy="338554"/>
+          </a:xfrm>
+          <a:prstGeom prst="rect">
+            <a:avLst/>
+          </a:prstGeom>
+          <a:noFill/>
+        </p:spPr>
+        <p:txBody>
+          <a:bodyPr wrap="none" rtlCol="0">
+            <a:spAutoFit/>
+          </a:bodyPr>
+          <a:lstStyle/>
+          <a:p>
+            <a:r>
+              <a:rPr lang="en-US" sz="1600" dirty="0" smtClean="0">
+                <a:latin typeface="Times New Roman" panose="02020603050405020304" pitchFamily="18" charset="0"/>
+                <a:cs typeface="Times New Roman" panose="02020603050405020304" pitchFamily="18" charset="0"/>
+              </a:rPr>
+              <a:t>Fig 1. Algorithm for DS committee election</a:t>
+            </a:r>
+            <a:endParaRPr lang="en-US" sz="1600" dirty="0">
+              <a:latin typeface="Times New Roman" panose="02020603050405020304" pitchFamily="18" charset="0"/>
+              <a:cs typeface="Times New Roman" panose="02020603050405020304" pitchFamily="18" charset="0"/>
+            </a:endParaRPr>
+          </a:p>
+        </p:txBody>
+      </p:sp>
     </p:spTree>
     <p:extLst>
       <p:ext uri="{BB962C8B-B14F-4D97-AF65-F5344CB8AC3E}">
@@ -7843,6 +9318,267 @@
 </file>
 
 <file path=ppt/theme/theme1.xml><?xml version="1.0" encoding="utf-8"?>
+<a:theme xmlns:a="http://schemas.openxmlformats.org/drawingml/2006/main" name="Office Theme">
+  <a:themeElements>
+    <a:clrScheme name="Office">
+      <a:dk1>
+        <a:sysClr val="windowText" lastClr="000000"/>
+      </a:dk1>
+      <a:lt1>
+        <a:sysClr val="window" lastClr="FFFFFF"/>
+      </a:lt1>
+      <a:dk2>
+        <a:srgbClr val="44546A"/>
+      </a:dk2>
+      <a:lt2>
+        <a:srgbClr val="E7E6E6"/>
+      </a:lt2>
+      <a:accent1>
+        <a:srgbClr val="5B9BD5"/>
+      </a:accent1>
+      <a:accent2>
+        <a:srgbClr val="ED7D31"/>
+      </a:accent2>
+      <a:accent3>
+        <a:srgbClr val="A5A5A5"/>
+      </a:accent3>
+      <a:accent4>
+        <a:srgbClr val="FFC000"/>
+      </a:accent4>
+      <a:accent5>
+        <a:srgbClr val="4472C4"/>
+      </a:accent5>
+      <a:accent6>
+        <a:srgbClr val="70AD47"/>
+      </a:accent6>
+      <a:hlink>
+        <a:srgbClr val="0563C1"/>
+      </a:hlink>
+      <a:folHlink>
+        <a:srgbClr val="954F72"/>
+      </a:folHlink>
+    </a:clrScheme>
+    <a:fontScheme name="Office">
+      <a:majorFont>
+        <a:latin typeface="Calibri Light" panose="020F0302020204030204"/>
+        <a:ea typeface=""/>
+        <a:cs typeface=""/>
+        <a:font script="Jpan" typeface="游ゴシック Light"/>
+        <a:font script="Hang" typeface="맑은 고딕"/>
+        <a:font script="Hans" typeface="等线 Light"/>
+        <a:font script="Hant" typeface="新細明體"/>
+        <a:font script="Arab" typeface="Times New Roman"/>
+        <a:font script="Hebr" typeface="Times New Roman"/>
+        <a:font script="Thai" typeface="Angsana New"/>
+        <a:font script="Ethi" typeface="Nyala"/>
+        <a:font script="Beng" typeface="Vrinda"/>
+        <a:font script="Gujr" typeface="Shruti"/>
+        <a:font script="Khmr" typeface="MoolBoran"/>
+        <a:font script="Knda" typeface="Tunga"/>
+        <a:font script="Guru" typeface="Raavi"/>
+        <a:font script="Cans" typeface="Euphemia"/>
+        <a:font script="Cher" typeface="Plantagenet Cherokee"/>
+        <a:font script="Yiii" typeface="Microsoft Yi Baiti"/>
+        <a:font script="Tibt" typeface="Microsoft Himalaya"/>
+        <a:font script="Thaa" typeface="MV Boli"/>
+        <a:font script="Deva" typeface="Mangal"/>
+        <a:font script="Telu" typeface="Gautami"/>
+        <a:font script="Taml" typeface="Latha"/>
+        <a:font script="Syrc" typeface="Estrangelo Edessa"/>
+        <a:font script="Orya" typeface="Kalinga"/>
+        <a:font script="Mlym" typeface="Kartika"/>
+        <a:font script="Laoo" typeface="DokChampa"/>
+        <a:font script="Sinh" typeface="Iskoola Pota"/>
+        <a:font script="Mong" typeface="Mongolian Baiti"/>
+        <a:font script="Viet" typeface="Times New Roman"/>
+        <a:font script="Uigh" typeface="Microsoft Uighur"/>
+        <a:font script="Geor" typeface="Sylfaen"/>
+      </a:majorFont>
+      <a:minorFont>
+        <a:latin typeface="Calibri" panose="020F0502020204030204"/>
+        <a:ea typeface=""/>
+        <a:cs typeface=""/>
+        <a:font script="Jpan" typeface="游ゴシック"/>
+        <a:font script="Hang" typeface="맑은 고딕"/>
+        <a:font script="Hans" typeface="等线"/>
+        <a:font script="Hant" typeface="新細明體"/>
+        <a:font script="Arab" typeface="Arial"/>
+        <a:font script="Hebr" typeface="Arial"/>
+        <a:font script="Thai" typeface="Cordia New"/>
+        <a:font script="Ethi" typeface="Nyala"/>
+        <a:font script="Beng" typeface="Vrinda"/>
+        <a:font script="Gujr" typeface="Shruti"/>
+        <a:font script="Khmr" typeface="DaunPenh"/>
+        <a:font script="Knda" typeface="Tunga"/>
+        <a:font script="Guru" typeface="Raavi"/>
+        <a:font script="Cans" typeface="Euphemia"/>
+        <a:font script="Cher" typeface="Plantagenet Cherokee"/>
+        <a:font script="Yiii" typeface="Microsoft Yi Baiti"/>
+        <a:font script="Tibt" typeface="Microsoft Himalaya"/>
+        <a:font script="Thaa" typeface="MV Boli"/>
+        <a:font script="Deva" typeface="Mangal"/>
+        <a:font script="Telu" typeface="Gautami"/>
+        <a:font script="Taml" typeface="Latha"/>
+        <a:font script="Syrc" typeface="Estrangelo Edessa"/>
+        <a:font script="Orya" typeface="Kalinga"/>
+        <a:font script="Mlym" typeface="Kartika"/>
+        <a:font script="Laoo" typeface="DokChampa"/>
+        <a:font script="Sinh" typeface="Iskoola Pota"/>
+        <a:font script="Mong" typeface="Mongolian Baiti"/>
+        <a:font script="Viet" typeface="Arial"/>
+        <a:font script="Uigh" typeface="Microsoft Uighur"/>
+        <a:font script="Geor" typeface="Sylfaen"/>
+      </a:minorFont>
+    </a:fontScheme>
+    <a:fmtScheme name="Office">
+      <a:fillStyleLst>
+        <a:solidFill>
+          <a:schemeClr val="phClr"/>
+        </a:solidFill>
+        <a:gradFill rotWithShape="1">
+          <a:gsLst>
+            <a:gs pos="0">
+              <a:schemeClr val="phClr">
+                <a:lumMod val="110000"/>
+                <a:satMod val="105000"/>
+                <a:tint val="67000"/>
+              </a:schemeClr>
+            </a:gs>
+            <a:gs pos="50000">
+              <a:schemeClr val="phClr">
+                <a:lumMod val="105000"/>
+                <a:satMod val="103000"/>
+                <a:tint val="73000"/>
+              </a:schemeClr>
+            </a:gs>
+            <a:gs pos="100000">
+              <a:schemeClr val="phClr">
+                <a:lumMod val="105000"/>
+                <a:satMod val="109000"/>
+                <a:tint val="81000"/>
+              </a:schemeClr>
+            </a:gs>
+          </a:gsLst>
+          <a:lin ang="5400000" scaled="0"/>
+        </a:gradFill>
+        <a:gradFill rotWithShape="1">
+          <a:gsLst>
+            <a:gs pos="0">
+              <a:schemeClr val="phClr">
+                <a:satMod val="103000"/>
+                <a:lumMod val="102000"/>
+                <a:tint val="94000"/>
+              </a:schemeClr>
+            </a:gs>
+            <a:gs pos="50000">
+              <a:schemeClr val="phClr">
+                <a:satMod val="110000"/>
+                <a:lumMod val="100000"/>
+                <a:shade val="100000"/>
+              </a:schemeClr>
+            </a:gs>
+            <a:gs pos="100000">
+              <a:schemeClr val="phClr">
+                <a:lumMod val="99000"/>
+                <a:satMod val="120000"/>
+                <a:shade val="78000"/>
+              </a:schemeClr>
+            </a:gs>
+          </a:gsLst>
+          <a:lin ang="5400000" scaled="0"/>
+        </a:gradFill>
+      </a:fillStyleLst>
+      <a:lnStyleLst>
+        <a:ln w="6350" cap="flat" cmpd="sng" algn="ctr">
+          <a:solidFill>
+            <a:schemeClr val="phClr"/>
+          </a:solidFill>
+          <a:prstDash val="solid"/>
+          <a:miter lim="800000"/>
+        </a:ln>
+        <a:ln w="12700" cap="flat" cmpd="sng" algn="ctr">
+          <a:solidFill>
+            <a:schemeClr val="phClr"/>
+          </a:solidFill>
+          <a:prstDash val="solid"/>
+          <a:miter lim="800000"/>
+        </a:ln>
+        <a:ln w="19050" cap="flat" cmpd="sng" algn="ctr">
+          <a:solidFill>
+            <a:schemeClr val="phClr"/>
+          </a:solidFill>
+          <a:prstDash val="solid"/>
+          <a:miter lim="800000"/>
+        </a:ln>
+      </a:lnStyleLst>
+      <a:effectStyleLst>
+        <a:effectStyle>
+          <a:effectLst/>
+        </a:effectStyle>
+        <a:effectStyle>
+          <a:effectLst/>
+        </a:effectStyle>
+        <a:effectStyle>
+          <a:effectLst>
+            <a:outerShdw blurRad="57150" dist="19050" dir="5400000" algn="ctr" rotWithShape="0">
+              <a:srgbClr val="000000">
+                <a:alpha val="63000"/>
+              </a:srgbClr>
+            </a:outerShdw>
+          </a:effectLst>
+        </a:effectStyle>
+      </a:effectStyleLst>
+      <a:bgFillStyleLst>
+        <a:solidFill>
+          <a:schemeClr val="phClr"/>
+        </a:solidFill>
+        <a:solidFill>
+          <a:schemeClr val="phClr">
+            <a:tint val="95000"/>
+            <a:satMod val="170000"/>
+          </a:schemeClr>
+        </a:solidFill>
+        <a:gradFill rotWithShape="1">
+          <a:gsLst>
+            <a:gs pos="0">
+              <a:schemeClr val="phClr">
+                <a:tint val="93000"/>
+                <a:satMod val="150000"/>
+                <a:shade val="98000"/>
+                <a:lumMod val="102000"/>
+              </a:schemeClr>
+            </a:gs>
+            <a:gs pos="50000">
+              <a:schemeClr val="phClr">
+                <a:tint val="98000"/>
+                <a:satMod val="130000"/>
+                <a:shade val="90000"/>
+                <a:lumMod val="103000"/>
+              </a:schemeClr>
+            </a:gs>
+            <a:gs pos="100000">
+              <a:schemeClr val="phClr">
+                <a:shade val="63000"/>
+                <a:satMod val="120000"/>
+              </a:schemeClr>
+            </a:gs>
+          </a:gsLst>
+          <a:lin ang="5400000" scaled="0"/>
+        </a:gradFill>
+      </a:bgFillStyleLst>
+    </a:fmtScheme>
+  </a:themeElements>
+  <a:objectDefaults/>
+  <a:extraClrSchemeLst/>
+  <a:extLst>
+    <a:ext uri="{05A4C25C-085E-4340-85A3-A5531E510DB2}">
+      <thm15:themeFamily xmlns:thm15="http://schemas.microsoft.com/office/thememl/2012/main" name="Office Theme" id="{62F939B6-93AF-4DB8-9C6B-D6C7DFDC589F}" vid="{4A3C46E8-61CC-4603-A589-7422A47A8E4A}"/>
+    </a:ext>
+  </a:extLst>
+</a:theme>
+</file>
+
+<file path=ppt/theme/theme2.xml><?xml version="1.0" encoding="utf-8"?>
 <a:theme xmlns:a="http://schemas.openxmlformats.org/drawingml/2006/main" name="Office Theme">
   <a:themeElements>
     <a:clrScheme name="Office">

</xml_diff>